<commit_message>
polish course intro for Sp24
</commit_message>
<xml_diff>
--- a/slides/00-CourseIntroduction.pptx
+++ b/slides/00-CourseIntroduction.pptx
@@ -226,7 +226,7 @@
           <a:p>
             <a:fld id="{C5B45307-6ED4-B142-BD64-10F739779302}" type="datetimeFigureOut">
               <a:rPr lang="en-US" smtClean="0"/>
-              <a:t>8/22/23</a:t>
+              <a:t>1/16/24</a:t>
             </a:fld>
             <a:endParaRPr lang="en-US"/>
           </a:p>
@@ -729,7 +729,7 @@
           <a:noFill/>
           <a:extLst>
             <a:ext uri="{909E8E84-426E-40dd-AFC4-6F175D3DCCD1}">
-              <a14:hiddenFill xmlns="" xmlns:a14="http://schemas.microsoft.com/office/drawing/2010/main">
+              <a14:hiddenFill xmlns:a14="http://schemas.microsoft.com/office/drawing/2010/main" xmlns="">
                 <a:solidFill>
                   <a:srgbClr val="FFFFFF"/>
                 </a:solidFill>
@@ -788,7 +788,7 @@
             </a:ln>
             <a:extLst>
               <a:ext uri="{91240B29-F687-4f45-9708-019B960494DF}">
-                <a14:hiddenLine xmlns="" xmlns:a14="http://schemas.microsoft.com/office/drawing/2010/main" w="9525">
+                <a14:hiddenLine xmlns:a14="http://schemas.microsoft.com/office/drawing/2010/main" xmlns="" w="9525">
                   <a:solidFill>
                     <a:srgbClr val="000000"/>
                   </a:solidFill>
@@ -878,7 +878,7 @@
             </a:ln>
             <a:extLst>
               <a:ext uri="{91240B29-F687-4f45-9708-019B960494DF}">
-                <a14:hiddenLine xmlns="" xmlns:a14="http://schemas.microsoft.com/office/drawing/2010/main" w="9525">
+                <a14:hiddenLine xmlns:a14="http://schemas.microsoft.com/office/drawing/2010/main" xmlns="" w="9525">
                   <a:solidFill>
                     <a:srgbClr val="000000"/>
                   </a:solidFill>
@@ -968,7 +968,7 @@
             </a:ln>
             <a:extLst>
               <a:ext uri="{91240B29-F687-4f45-9708-019B960494DF}">
-                <a14:hiddenLine xmlns="" xmlns:a14="http://schemas.microsoft.com/office/drawing/2010/main" w="9525">
+                <a14:hiddenLine xmlns:a14="http://schemas.microsoft.com/office/drawing/2010/main" xmlns="" w="9525">
                   <a:solidFill>
                     <a:srgbClr val="000000"/>
                   </a:solidFill>
@@ -1002,7 +1002,7 @@
             </a:ln>
             <a:extLst>
               <a:ext uri="{91240B29-F687-4f45-9708-019B960494DF}">
-                <a14:hiddenLine xmlns="" xmlns:a14="http://schemas.microsoft.com/office/drawing/2010/main" w="9525">
+                <a14:hiddenLine xmlns:a14="http://schemas.microsoft.com/office/drawing/2010/main" xmlns="" w="9525">
                   <a:solidFill>
                     <a:srgbClr val="000000"/>
                   </a:solidFill>
@@ -1092,7 +1092,7 @@
             </a:ln>
             <a:extLst>
               <a:ext uri="{91240B29-F687-4f45-9708-019B960494DF}">
-                <a14:hiddenLine xmlns="" xmlns:a14="http://schemas.microsoft.com/office/drawing/2010/main" w="9525">
+                <a14:hiddenLine xmlns:a14="http://schemas.microsoft.com/office/drawing/2010/main" xmlns="" w="9525">
                   <a:solidFill>
                     <a:srgbClr val="000000"/>
                   </a:solidFill>
@@ -1154,7 +1154,7 @@
             </a:ln>
             <a:extLst>
               <a:ext uri="{91240B29-F687-4f45-9708-019B960494DF}">
-                <a14:hiddenLine xmlns="" xmlns:a14="http://schemas.microsoft.com/office/drawing/2010/main" w="9525">
+                <a14:hiddenLine xmlns:a14="http://schemas.microsoft.com/office/drawing/2010/main" xmlns="" w="9525">
                   <a:solidFill>
                     <a:srgbClr val="000000"/>
                   </a:solidFill>
@@ -1216,7 +1216,7 @@
             </a:ln>
             <a:extLst>
               <a:ext uri="{91240B29-F687-4f45-9708-019B960494DF}">
-                <a14:hiddenLine xmlns="" xmlns:a14="http://schemas.microsoft.com/office/drawing/2010/main" w="9525">
+                <a14:hiddenLine xmlns:a14="http://schemas.microsoft.com/office/drawing/2010/main" xmlns="" w="9525">
                   <a:solidFill>
                     <a:srgbClr val="000000"/>
                   </a:solidFill>
@@ -1306,7 +1306,7 @@
             </a:ln>
             <a:extLst>
               <a:ext uri="{91240B29-F687-4f45-9708-019B960494DF}">
-                <a14:hiddenLine xmlns="" xmlns:a14="http://schemas.microsoft.com/office/drawing/2010/main" w="9525">
+                <a14:hiddenLine xmlns:a14="http://schemas.microsoft.com/office/drawing/2010/main" xmlns="" w="9525">
                   <a:solidFill>
                     <a:srgbClr val="000000"/>
                   </a:solidFill>
@@ -1368,7 +1368,7 @@
             </a:ln>
             <a:extLst>
               <a:ext uri="{91240B29-F687-4f45-9708-019B960494DF}">
-                <a14:hiddenLine xmlns="" xmlns:a14="http://schemas.microsoft.com/office/drawing/2010/main" w="9525">
+                <a14:hiddenLine xmlns:a14="http://schemas.microsoft.com/office/drawing/2010/main" xmlns="" w="9525">
                   <a:solidFill>
                     <a:srgbClr val="000000"/>
                   </a:solidFill>
@@ -1430,7 +1430,7 @@
             </a:ln>
             <a:extLst>
               <a:ext uri="{91240B29-F687-4f45-9708-019B960494DF}">
-                <a14:hiddenLine xmlns="" xmlns:a14="http://schemas.microsoft.com/office/drawing/2010/main" w="9525">
+                <a14:hiddenLine xmlns:a14="http://schemas.microsoft.com/office/drawing/2010/main" xmlns="" w="9525">
                   <a:solidFill>
                     <a:srgbClr val="000000"/>
                   </a:solidFill>
@@ -1520,7 +1520,7 @@
             </a:ln>
             <a:extLst>
               <a:ext uri="{91240B29-F687-4f45-9708-019B960494DF}">
-                <a14:hiddenLine xmlns="" xmlns:a14="http://schemas.microsoft.com/office/drawing/2010/main" w="9525">
+                <a14:hiddenLine xmlns:a14="http://schemas.microsoft.com/office/drawing/2010/main" xmlns="" w="9525">
                   <a:solidFill>
                     <a:srgbClr val="000000"/>
                   </a:solidFill>
@@ -1610,7 +1610,7 @@
             </a:ln>
             <a:extLst>
               <a:ext uri="{91240B29-F687-4f45-9708-019B960494DF}">
-                <a14:hiddenLine xmlns="" xmlns:a14="http://schemas.microsoft.com/office/drawing/2010/main" w="9525">
+                <a14:hiddenLine xmlns:a14="http://schemas.microsoft.com/office/drawing/2010/main" xmlns="" w="9525">
                   <a:solidFill>
                     <a:srgbClr val="000000"/>
                   </a:solidFill>
@@ -1672,7 +1672,7 @@
             </a:ln>
             <a:extLst>
               <a:ext uri="{91240B29-F687-4f45-9708-019B960494DF}">
-                <a14:hiddenLine xmlns="" xmlns:a14="http://schemas.microsoft.com/office/drawing/2010/main" w="9525">
+                <a14:hiddenLine xmlns:a14="http://schemas.microsoft.com/office/drawing/2010/main" xmlns="" w="9525">
                   <a:solidFill>
                     <a:srgbClr val="000000"/>
                   </a:solidFill>
@@ -1782,7 +1782,7 @@
             </a:ln>
             <a:extLst>
               <a:ext uri="{91240B29-F687-4f45-9708-019B960494DF}">
-                <a14:hiddenLine xmlns="" xmlns:a14="http://schemas.microsoft.com/office/drawing/2010/main" w="9525">
+                <a14:hiddenLine xmlns:a14="http://schemas.microsoft.com/office/drawing/2010/main" xmlns="" w="9525">
                   <a:solidFill>
                     <a:srgbClr val="000000"/>
                   </a:solidFill>
@@ -1844,7 +1844,7 @@
             </a:ln>
             <a:extLst>
               <a:ext uri="{91240B29-F687-4f45-9708-019B960494DF}">
-                <a14:hiddenLine xmlns="" xmlns:a14="http://schemas.microsoft.com/office/drawing/2010/main" w="9525">
+                <a14:hiddenLine xmlns:a14="http://schemas.microsoft.com/office/drawing/2010/main" xmlns="" w="9525">
                   <a:solidFill>
                     <a:srgbClr val="000000"/>
                   </a:solidFill>
@@ -1934,7 +1934,7 @@
             </a:ln>
             <a:extLst>
               <a:ext uri="{91240B29-F687-4f45-9708-019B960494DF}">
-                <a14:hiddenLine xmlns="" xmlns:a14="http://schemas.microsoft.com/office/drawing/2010/main" w="9525">
+                <a14:hiddenLine xmlns:a14="http://schemas.microsoft.com/office/drawing/2010/main" xmlns="" w="9525">
                   <a:solidFill>
                     <a:srgbClr val="000000"/>
                   </a:solidFill>
@@ -2024,7 +2024,7 @@
             </a:ln>
             <a:extLst>
               <a:ext uri="{91240B29-F687-4f45-9708-019B960494DF}">
-                <a14:hiddenLine xmlns="" xmlns:a14="http://schemas.microsoft.com/office/drawing/2010/main" w="9525">
+                <a14:hiddenLine xmlns:a14="http://schemas.microsoft.com/office/drawing/2010/main" xmlns="" w="9525">
                   <a:solidFill>
                     <a:srgbClr val="000000"/>
                   </a:solidFill>
@@ -2086,7 +2086,7 @@
             </a:ln>
             <a:extLst>
               <a:ext uri="{91240B29-F687-4f45-9708-019B960494DF}">
-                <a14:hiddenLine xmlns="" xmlns:a14="http://schemas.microsoft.com/office/drawing/2010/main" w="9525">
+                <a14:hiddenLine xmlns:a14="http://schemas.microsoft.com/office/drawing/2010/main" xmlns="" w="9525">
                   <a:solidFill>
                     <a:srgbClr val="000000"/>
                   </a:solidFill>
@@ -2176,7 +2176,7 @@
             </a:ln>
             <a:extLst>
               <a:ext uri="{91240B29-F687-4f45-9708-019B960494DF}">
-                <a14:hiddenLine xmlns="" xmlns:a14="http://schemas.microsoft.com/office/drawing/2010/main" w="9525">
+                <a14:hiddenLine xmlns:a14="http://schemas.microsoft.com/office/drawing/2010/main" xmlns="" w="9525">
                   <a:solidFill>
                     <a:srgbClr val="000000"/>
                   </a:solidFill>
@@ -2266,7 +2266,7 @@
             </a:ln>
             <a:extLst>
               <a:ext uri="{91240B29-F687-4f45-9708-019B960494DF}">
-                <a14:hiddenLine xmlns="" xmlns:a14="http://schemas.microsoft.com/office/drawing/2010/main" w="9525">
+                <a14:hiddenLine xmlns:a14="http://schemas.microsoft.com/office/drawing/2010/main" xmlns="" w="9525">
                   <a:solidFill>
                     <a:srgbClr val="000000"/>
                   </a:solidFill>
@@ -2322,7 +2322,7 @@
             </a:ln>
             <a:extLst>
               <a:ext uri="{91240B29-F687-4f45-9708-019B960494DF}">
-                <a14:hiddenLine xmlns="" xmlns:a14="http://schemas.microsoft.com/office/drawing/2010/main" w="9525">
+                <a14:hiddenLine xmlns:a14="http://schemas.microsoft.com/office/drawing/2010/main" xmlns="" w="9525">
                   <a:solidFill>
                     <a:srgbClr val="000000"/>
                   </a:solidFill>
@@ -2412,7 +2412,7 @@
             </a:ln>
             <a:extLst>
               <a:ext uri="{91240B29-F687-4f45-9708-019B960494DF}">
-                <a14:hiddenLine xmlns="" xmlns:a14="http://schemas.microsoft.com/office/drawing/2010/main" w="9525">
+                <a14:hiddenLine xmlns:a14="http://schemas.microsoft.com/office/drawing/2010/main" xmlns="" w="9525">
                   <a:solidFill>
                     <a:srgbClr val="000000"/>
                   </a:solidFill>
@@ -2468,7 +2468,7 @@
             </a:ln>
             <a:extLst>
               <a:ext uri="{91240B29-F687-4f45-9708-019B960494DF}">
-                <a14:hiddenLine xmlns="" xmlns:a14="http://schemas.microsoft.com/office/drawing/2010/main" w="9525">
+                <a14:hiddenLine xmlns:a14="http://schemas.microsoft.com/office/drawing/2010/main" xmlns="" w="9525">
                   <a:solidFill>
                     <a:srgbClr val="000000"/>
                   </a:solidFill>
@@ -2558,7 +2558,7 @@
             </a:ln>
             <a:extLst>
               <a:ext uri="{91240B29-F687-4f45-9708-019B960494DF}">
-                <a14:hiddenLine xmlns="" xmlns:a14="http://schemas.microsoft.com/office/drawing/2010/main" w="9525">
+                <a14:hiddenLine xmlns:a14="http://schemas.microsoft.com/office/drawing/2010/main" xmlns="" w="9525">
                   <a:solidFill>
                     <a:srgbClr val="000000"/>
                   </a:solidFill>
@@ -2626,7 +2626,7 @@
             </a:ln>
             <a:extLst>
               <a:ext uri="{91240B29-F687-4f45-9708-019B960494DF}">
-                <a14:hiddenLine xmlns="" xmlns:a14="http://schemas.microsoft.com/office/drawing/2010/main" w="9525">
+                <a14:hiddenLine xmlns:a14="http://schemas.microsoft.com/office/drawing/2010/main" xmlns="" w="9525">
                   <a:solidFill>
                     <a:srgbClr val="000000"/>
                   </a:solidFill>
@@ -2716,7 +2716,7 @@
             </a:ln>
             <a:extLst>
               <a:ext uri="{91240B29-F687-4f45-9708-019B960494DF}">
-                <a14:hiddenLine xmlns="" xmlns:a14="http://schemas.microsoft.com/office/drawing/2010/main" w="9525">
+                <a14:hiddenLine xmlns:a14="http://schemas.microsoft.com/office/drawing/2010/main" xmlns="" w="9525">
                   <a:solidFill>
                     <a:srgbClr val="000000"/>
                   </a:solidFill>
@@ -2784,7 +2784,7 @@
             </a:ln>
             <a:extLst>
               <a:ext uri="{91240B29-F687-4f45-9708-019B960494DF}">
-                <a14:hiddenLine xmlns="" xmlns:a14="http://schemas.microsoft.com/office/drawing/2010/main" w="9525">
+                <a14:hiddenLine xmlns:a14="http://schemas.microsoft.com/office/drawing/2010/main" xmlns="" w="9525">
                   <a:solidFill>
                     <a:srgbClr val="000000"/>
                   </a:solidFill>
@@ -2874,7 +2874,7 @@
             </a:ln>
             <a:extLst>
               <a:ext uri="{91240B29-F687-4f45-9708-019B960494DF}">
-                <a14:hiddenLine xmlns="" xmlns:a14="http://schemas.microsoft.com/office/drawing/2010/main" w="9525">
+                <a14:hiddenLine xmlns:a14="http://schemas.microsoft.com/office/drawing/2010/main" xmlns="" w="9525">
                   <a:solidFill>
                     <a:srgbClr val="000000"/>
                   </a:solidFill>
@@ -2908,7 +2908,7 @@
             </a:ln>
             <a:extLst>
               <a:ext uri="{91240B29-F687-4f45-9708-019B960494DF}">
-                <a14:hiddenLine xmlns="" xmlns:a14="http://schemas.microsoft.com/office/drawing/2010/main" w="9525">
+                <a14:hiddenLine xmlns:a14="http://schemas.microsoft.com/office/drawing/2010/main" xmlns="" w="9525">
                   <a:solidFill>
                     <a:srgbClr val="000000"/>
                   </a:solidFill>
@@ -2998,7 +2998,7 @@
             </a:ln>
             <a:extLst>
               <a:ext uri="{91240B29-F687-4f45-9708-019B960494DF}">
-                <a14:hiddenLine xmlns="" xmlns:a14="http://schemas.microsoft.com/office/drawing/2010/main" w="9525">
+                <a14:hiddenLine xmlns:a14="http://schemas.microsoft.com/office/drawing/2010/main" xmlns="" w="9525">
                   <a:solidFill>
                     <a:srgbClr val="000000"/>
                   </a:solidFill>
@@ -3060,7 +3060,7 @@
             </a:ln>
             <a:extLst>
               <a:ext uri="{91240B29-F687-4f45-9708-019B960494DF}">
-                <a14:hiddenLine xmlns="" xmlns:a14="http://schemas.microsoft.com/office/drawing/2010/main" w="9525">
+                <a14:hiddenLine xmlns:a14="http://schemas.microsoft.com/office/drawing/2010/main" xmlns="" w="9525">
                   <a:solidFill>
                     <a:srgbClr val="000000"/>
                   </a:solidFill>
@@ -3122,7 +3122,7 @@
             </a:ln>
             <a:extLst>
               <a:ext uri="{91240B29-F687-4f45-9708-019B960494DF}">
-                <a14:hiddenLine xmlns="" xmlns:a14="http://schemas.microsoft.com/office/drawing/2010/main" w="9525">
+                <a14:hiddenLine xmlns:a14="http://schemas.microsoft.com/office/drawing/2010/main" xmlns="" w="9525">
                   <a:solidFill>
                     <a:srgbClr val="000000"/>
                   </a:solidFill>
@@ -3212,7 +3212,7 @@
             </a:ln>
             <a:extLst>
               <a:ext uri="{91240B29-F687-4f45-9708-019B960494DF}">
-                <a14:hiddenLine xmlns="" xmlns:a14="http://schemas.microsoft.com/office/drawing/2010/main" w="9525">
+                <a14:hiddenLine xmlns:a14="http://schemas.microsoft.com/office/drawing/2010/main" xmlns="" w="9525">
                   <a:solidFill>
                     <a:srgbClr val="000000"/>
                   </a:solidFill>
@@ -3280,7 +3280,7 @@
             </a:ln>
             <a:extLst>
               <a:ext uri="{91240B29-F687-4f45-9708-019B960494DF}">
-                <a14:hiddenLine xmlns="" xmlns:a14="http://schemas.microsoft.com/office/drawing/2010/main" w="9525">
+                <a14:hiddenLine xmlns:a14="http://schemas.microsoft.com/office/drawing/2010/main" xmlns="" w="9525">
                   <a:solidFill>
                     <a:srgbClr val="000000"/>
                   </a:solidFill>
@@ -3342,7 +3342,7 @@
             </a:ln>
             <a:extLst>
               <a:ext uri="{91240B29-F687-4f45-9708-019B960494DF}">
-                <a14:hiddenLine xmlns="" xmlns:a14="http://schemas.microsoft.com/office/drawing/2010/main" w="9525">
+                <a14:hiddenLine xmlns:a14="http://schemas.microsoft.com/office/drawing/2010/main" xmlns="" w="9525">
                   <a:solidFill>
                     <a:srgbClr val="000000"/>
                   </a:solidFill>
@@ -3432,7 +3432,7 @@
             </a:ln>
             <a:extLst>
               <a:ext uri="{91240B29-F687-4f45-9708-019B960494DF}">
-                <a14:hiddenLine xmlns="" xmlns:a14="http://schemas.microsoft.com/office/drawing/2010/main" w="9525">
+                <a14:hiddenLine xmlns:a14="http://schemas.microsoft.com/office/drawing/2010/main" xmlns="" w="9525">
                   <a:solidFill>
                     <a:srgbClr val="000000"/>
                   </a:solidFill>
@@ -3494,7 +3494,7 @@
             </a:ln>
             <a:extLst>
               <a:ext uri="{91240B29-F687-4f45-9708-019B960494DF}">
-                <a14:hiddenLine xmlns="" xmlns:a14="http://schemas.microsoft.com/office/drawing/2010/main" w="9525">
+                <a14:hiddenLine xmlns:a14="http://schemas.microsoft.com/office/drawing/2010/main" xmlns="" w="9525">
                   <a:solidFill>
                     <a:srgbClr val="000000"/>
                   </a:solidFill>
@@ -3584,7 +3584,7 @@
             </a:ln>
             <a:extLst>
               <a:ext uri="{91240B29-F687-4f45-9708-019B960494DF}">
-                <a14:hiddenLine xmlns="" xmlns:a14="http://schemas.microsoft.com/office/drawing/2010/main" w="9525">
+                <a14:hiddenLine xmlns:a14="http://schemas.microsoft.com/office/drawing/2010/main" xmlns="" w="9525">
                   <a:solidFill>
                     <a:srgbClr val="000000"/>
                   </a:solidFill>
@@ -3646,7 +3646,7 @@
             </a:ln>
             <a:extLst>
               <a:ext uri="{91240B29-F687-4f45-9708-019B960494DF}">
-                <a14:hiddenLine xmlns="" xmlns:a14="http://schemas.microsoft.com/office/drawing/2010/main" w="9525">
+                <a14:hiddenLine xmlns:a14="http://schemas.microsoft.com/office/drawing/2010/main" xmlns="" w="9525">
                   <a:solidFill>
                     <a:srgbClr val="000000"/>
                   </a:solidFill>
@@ -3736,7 +3736,7 @@
             </a:ln>
             <a:extLst>
               <a:ext uri="{91240B29-F687-4f45-9708-019B960494DF}">
-                <a14:hiddenLine xmlns="" xmlns:a14="http://schemas.microsoft.com/office/drawing/2010/main" w="9525">
+                <a14:hiddenLine xmlns:a14="http://schemas.microsoft.com/office/drawing/2010/main" xmlns="" w="9525">
                   <a:solidFill>
                     <a:srgbClr val="000000"/>
                   </a:solidFill>
@@ -3770,7 +3770,7 @@
             </a:ln>
             <a:extLst>
               <a:ext uri="{91240B29-F687-4f45-9708-019B960494DF}">
-                <a14:hiddenLine xmlns="" xmlns:a14="http://schemas.microsoft.com/office/drawing/2010/main" w="9525">
+                <a14:hiddenLine xmlns:a14="http://schemas.microsoft.com/office/drawing/2010/main" xmlns="" w="9525">
                   <a:solidFill>
                     <a:srgbClr val="000000"/>
                   </a:solidFill>
@@ -3835,7 +3835,7 @@
             </a:ln>
             <a:extLst>
               <a:ext uri="{91240B29-F687-4f45-9708-019B960494DF}">
-                <a14:hiddenLine xmlns="" xmlns:a14="http://schemas.microsoft.com/office/drawing/2010/main" w="9525">
+                <a14:hiddenLine xmlns:a14="http://schemas.microsoft.com/office/drawing/2010/main" xmlns="" w="9525">
                   <a:solidFill>
                     <a:srgbClr val="000000"/>
                   </a:solidFill>
@@ -3925,7 +3925,7 @@
             </a:ln>
             <a:extLst>
               <a:ext uri="{91240B29-F687-4f45-9708-019B960494DF}">
-                <a14:hiddenLine xmlns="" xmlns:a14="http://schemas.microsoft.com/office/drawing/2010/main" w="9525">
+                <a14:hiddenLine xmlns:a14="http://schemas.microsoft.com/office/drawing/2010/main" xmlns="" w="9525">
                   <a:solidFill>
                     <a:srgbClr val="000000"/>
                   </a:solidFill>
@@ -3987,7 +3987,7 @@
             </a:ln>
             <a:extLst>
               <a:ext uri="{91240B29-F687-4f45-9708-019B960494DF}">
-                <a14:hiddenLine xmlns="" xmlns:a14="http://schemas.microsoft.com/office/drawing/2010/main" w="9525">
+                <a14:hiddenLine xmlns:a14="http://schemas.microsoft.com/office/drawing/2010/main" xmlns="" w="9525">
                   <a:solidFill>
                     <a:srgbClr val="000000"/>
                   </a:solidFill>
@@ -4077,7 +4077,7 @@
             </a:ln>
             <a:extLst>
               <a:ext uri="{91240B29-F687-4f45-9708-019B960494DF}">
-                <a14:hiddenLine xmlns="" xmlns:a14="http://schemas.microsoft.com/office/drawing/2010/main" w="9525">
+                <a14:hiddenLine xmlns:a14="http://schemas.microsoft.com/office/drawing/2010/main" xmlns="" w="9525">
                   <a:solidFill>
                     <a:srgbClr val="000000"/>
                   </a:solidFill>
@@ -4167,7 +4167,7 @@
             </a:ln>
             <a:extLst>
               <a:ext uri="{91240B29-F687-4f45-9708-019B960494DF}">
-                <a14:hiddenLine xmlns="" xmlns:a14="http://schemas.microsoft.com/office/drawing/2010/main" w="9525">
+                <a14:hiddenLine xmlns:a14="http://schemas.microsoft.com/office/drawing/2010/main" xmlns="" w="9525">
                   <a:solidFill>
                     <a:srgbClr val="000000"/>
                   </a:solidFill>
@@ -4232,7 +4232,7 @@
             </a:ln>
             <a:extLst>
               <a:ext uri="{91240B29-F687-4f45-9708-019B960494DF}">
-                <a14:hiddenLine xmlns="" xmlns:a14="http://schemas.microsoft.com/office/drawing/2010/main" w="9525">
+                <a14:hiddenLine xmlns:a14="http://schemas.microsoft.com/office/drawing/2010/main" xmlns="" w="9525">
                   <a:solidFill>
                     <a:srgbClr val="000000"/>
                   </a:solidFill>
@@ -4294,7 +4294,7 @@
             </a:ln>
             <a:extLst>
               <a:ext uri="{91240B29-F687-4f45-9708-019B960494DF}">
-                <a14:hiddenLine xmlns="" xmlns:a14="http://schemas.microsoft.com/office/drawing/2010/main" w="9525">
+                <a14:hiddenLine xmlns:a14="http://schemas.microsoft.com/office/drawing/2010/main" xmlns="" w="9525">
                   <a:solidFill>
                     <a:srgbClr val="000000"/>
                   </a:solidFill>
@@ -4384,7 +4384,7 @@
             </a:ln>
             <a:extLst>
               <a:ext uri="{91240B29-F687-4f45-9708-019B960494DF}">
-                <a14:hiddenLine xmlns="" xmlns:a14="http://schemas.microsoft.com/office/drawing/2010/main" w="9525">
+                <a14:hiddenLine xmlns:a14="http://schemas.microsoft.com/office/drawing/2010/main" xmlns="" w="9525">
                   <a:solidFill>
                     <a:srgbClr val="000000"/>
                   </a:solidFill>
@@ -4474,7 +4474,7 @@
             </a:ln>
             <a:extLst>
               <a:ext uri="{91240B29-F687-4f45-9708-019B960494DF}">
-                <a14:hiddenLine xmlns="" xmlns:a14="http://schemas.microsoft.com/office/drawing/2010/main" w="9525">
+                <a14:hiddenLine xmlns:a14="http://schemas.microsoft.com/office/drawing/2010/main" xmlns="" w="9525">
                   <a:solidFill>
                     <a:srgbClr val="000000"/>
                   </a:solidFill>
@@ -4536,7 +4536,7 @@
             </a:ln>
             <a:extLst>
               <a:ext uri="{91240B29-F687-4f45-9708-019B960494DF}">
-                <a14:hiddenLine xmlns="" xmlns:a14="http://schemas.microsoft.com/office/drawing/2010/main" w="9525">
+                <a14:hiddenLine xmlns:a14="http://schemas.microsoft.com/office/drawing/2010/main" xmlns="" w="9525">
                   <a:solidFill>
                     <a:srgbClr val="000000"/>
                   </a:solidFill>
@@ -4656,7 +4656,7 @@
             </a:ln>
             <a:extLst>
               <a:ext uri="{91240B29-F687-4f45-9708-019B960494DF}">
-                <a14:hiddenLine xmlns="" xmlns:a14="http://schemas.microsoft.com/office/drawing/2010/main" w="9525">
+                <a14:hiddenLine xmlns:a14="http://schemas.microsoft.com/office/drawing/2010/main" xmlns="" w="9525">
                   <a:solidFill>
                     <a:srgbClr val="000000"/>
                   </a:solidFill>
@@ -4724,7 +4724,7 @@
             </a:ln>
             <a:extLst>
               <a:ext uri="{91240B29-F687-4f45-9708-019B960494DF}">
-                <a14:hiddenLine xmlns="" xmlns:a14="http://schemas.microsoft.com/office/drawing/2010/main" w="9525">
+                <a14:hiddenLine xmlns:a14="http://schemas.microsoft.com/office/drawing/2010/main" xmlns="" w="9525">
                   <a:solidFill>
                     <a:srgbClr val="000000"/>
                   </a:solidFill>
@@ -4814,7 +4814,7 @@
             </a:ln>
             <a:extLst>
               <a:ext uri="{91240B29-F687-4f45-9708-019B960494DF}">
-                <a14:hiddenLine xmlns="" xmlns:a14="http://schemas.microsoft.com/office/drawing/2010/main" w="9525">
+                <a14:hiddenLine xmlns:a14="http://schemas.microsoft.com/office/drawing/2010/main" xmlns="" w="9525">
                   <a:solidFill>
                     <a:srgbClr val="000000"/>
                   </a:solidFill>
@@ -4954,7 +4954,7 @@
           <a:p>
             <a:fld id="{EC4347D3-4C9A-C240-8F14-750059DFEEB0}" type="datetimeFigureOut">
               <a:rPr lang="en-US" smtClean="0"/>
-              <a:t>8/22/23</a:t>
+              <a:t>1/16/24</a:t>
             </a:fld>
             <a:endParaRPr lang="en-US"/>
           </a:p>
@@ -5221,7 +5221,7 @@
           <a:p>
             <a:fld id="{EC4347D3-4C9A-C240-8F14-750059DFEEB0}" type="datetimeFigureOut">
               <a:rPr lang="en-US" smtClean="0"/>
-              <a:t>8/22/23</a:t>
+              <a:t>1/16/24</a:t>
             </a:fld>
             <a:endParaRPr lang="en-US"/>
           </a:p>
@@ -5417,7 +5417,7 @@
           <a:p>
             <a:fld id="{EC4347D3-4C9A-C240-8F14-750059DFEEB0}" type="datetimeFigureOut">
               <a:rPr lang="en-US" smtClean="0"/>
-              <a:t>8/22/23</a:t>
+              <a:t>1/16/24</a:t>
             </a:fld>
             <a:endParaRPr lang="en-US"/>
           </a:p>
@@ -5680,7 +5680,7 @@
           <a:p>
             <a:fld id="{EC4347D3-4C9A-C240-8F14-750059DFEEB0}" type="datetimeFigureOut">
               <a:rPr lang="en-US" smtClean="0"/>
-              <a:t>8/22/23</a:t>
+              <a:t>1/16/24</a:t>
             </a:fld>
             <a:endParaRPr lang="en-US"/>
           </a:p>
@@ -6114,7 +6114,7 @@
           <a:p>
             <a:fld id="{EC4347D3-4C9A-C240-8F14-750059DFEEB0}" type="datetimeFigureOut">
               <a:rPr lang="en-US" smtClean="0"/>
-              <a:t>8/22/23</a:t>
+              <a:t>1/16/24</a:t>
             </a:fld>
             <a:endParaRPr lang="en-US"/>
           </a:p>
@@ -6660,7 +6660,7 @@
           <a:p>
             <a:fld id="{EC4347D3-4C9A-C240-8F14-750059DFEEB0}" type="datetimeFigureOut">
               <a:rPr lang="en-US" smtClean="0"/>
-              <a:t>8/22/23</a:t>
+              <a:t>1/16/24</a:t>
             </a:fld>
             <a:endParaRPr lang="en-US"/>
           </a:p>
@@ -7380,7 +7380,7 @@
           <a:p>
             <a:fld id="{EC4347D3-4C9A-C240-8F14-750059DFEEB0}" type="datetimeFigureOut">
               <a:rPr lang="en-US" smtClean="0"/>
-              <a:t>8/22/23</a:t>
+              <a:t>1/16/24</a:t>
             </a:fld>
             <a:endParaRPr lang="en-US"/>
           </a:p>
@@ -7550,7 +7550,7 @@
           <a:p>
             <a:fld id="{EC4347D3-4C9A-C240-8F14-750059DFEEB0}" type="datetimeFigureOut">
               <a:rPr lang="en-US" smtClean="0"/>
-              <a:t>8/22/23</a:t>
+              <a:t>1/16/24</a:t>
             </a:fld>
             <a:endParaRPr lang="en-US"/>
           </a:p>
@@ -7730,7 +7730,7 @@
           <a:p>
             <a:fld id="{EC4347D3-4C9A-C240-8F14-750059DFEEB0}" type="datetimeFigureOut">
               <a:rPr lang="en-US" smtClean="0"/>
-              <a:t>8/22/23</a:t>
+              <a:t>1/16/24</a:t>
             </a:fld>
             <a:endParaRPr lang="en-US"/>
           </a:p>
@@ -7900,7 +7900,7 @@
           <a:p>
             <a:fld id="{EC4347D3-4C9A-C240-8F14-750059DFEEB0}" type="datetimeFigureOut">
               <a:rPr lang="en-US" smtClean="0"/>
-              <a:t>8/22/23</a:t>
+              <a:t>1/16/24</a:t>
             </a:fld>
             <a:endParaRPr lang="en-US"/>
           </a:p>
@@ -8150,7 +8150,7 @@
           <a:p>
             <a:fld id="{EC4347D3-4C9A-C240-8F14-750059DFEEB0}" type="datetimeFigureOut">
               <a:rPr lang="en-US" smtClean="0"/>
-              <a:t>8/22/23</a:t>
+              <a:t>1/16/24</a:t>
             </a:fld>
             <a:endParaRPr lang="en-US"/>
           </a:p>
@@ -8382,7 +8382,7 @@
           <a:p>
             <a:fld id="{EC4347D3-4C9A-C240-8F14-750059DFEEB0}" type="datetimeFigureOut">
               <a:rPr lang="en-US" smtClean="0"/>
-              <a:t>8/22/23</a:t>
+              <a:t>1/16/24</a:t>
             </a:fld>
             <a:endParaRPr lang="en-US"/>
           </a:p>
@@ -8768,7 +8768,7 @@
           <a:p>
             <a:fld id="{EC4347D3-4C9A-C240-8F14-750059DFEEB0}" type="datetimeFigureOut">
               <a:rPr lang="en-US" smtClean="0"/>
-              <a:t>8/22/23</a:t>
+              <a:t>1/16/24</a:t>
             </a:fld>
             <a:endParaRPr lang="en-US"/>
           </a:p>
@@ -8891,7 +8891,7 @@
           <a:p>
             <a:fld id="{EC4347D3-4C9A-C240-8F14-750059DFEEB0}" type="datetimeFigureOut">
               <a:rPr lang="en-US" smtClean="0"/>
-              <a:t>8/22/23</a:t>
+              <a:t>1/16/24</a:t>
             </a:fld>
             <a:endParaRPr lang="en-US"/>
           </a:p>
@@ -8986,7 +8986,7 @@
           <a:p>
             <a:fld id="{EC4347D3-4C9A-C240-8F14-750059DFEEB0}" type="datetimeFigureOut">
               <a:rPr lang="en-US" smtClean="0"/>
-              <a:t>8/22/23</a:t>
+              <a:t>1/16/24</a:t>
             </a:fld>
             <a:endParaRPr lang="en-US"/>
           </a:p>
@@ -9235,7 +9235,7 @@
           <a:p>
             <a:fld id="{EC4347D3-4C9A-C240-8F14-750059DFEEB0}" type="datetimeFigureOut">
               <a:rPr lang="en-US" smtClean="0"/>
-              <a:t>8/22/23</a:t>
+              <a:t>1/16/24</a:t>
             </a:fld>
             <a:endParaRPr lang="en-US"/>
           </a:p>
@@ -9520,7 +9520,7 @@
           <a:p>
             <a:fld id="{EC4347D3-4C9A-C240-8F14-750059DFEEB0}" type="datetimeFigureOut">
               <a:rPr lang="en-US" smtClean="0"/>
-              <a:t>8/22/23</a:t>
+              <a:t>1/16/24</a:t>
             </a:fld>
             <a:endParaRPr lang="en-US"/>
           </a:p>
@@ -9643,7 +9643,7 @@
           <a:noFill/>
           <a:extLst>
             <a:ext uri="{909E8E84-426E-40dd-AFC4-6F175D3DCCD1}">
-              <a14:hiddenFill xmlns="" xmlns:a14="http://schemas.microsoft.com/office/drawing/2010/main">
+              <a14:hiddenFill xmlns:a14="http://schemas.microsoft.com/office/drawing/2010/main" xmlns="">
                 <a:solidFill>
                   <a:srgbClr val="FFFFFF"/>
                 </a:solidFill>
@@ -9717,7 +9717,7 @@
               </a:ln>
               <a:extLst>
                 <a:ext uri="{91240B29-F687-4f45-9708-019B960494DF}">
-                  <a14:hiddenLine xmlns="" xmlns:a14="http://schemas.microsoft.com/office/drawing/2010/main" w="9525">
+                  <a14:hiddenLine xmlns:a14="http://schemas.microsoft.com/office/drawing/2010/main" xmlns="" w="9525">
                     <a:solidFill>
                       <a:srgbClr val="000000"/>
                     </a:solidFill>
@@ -9807,7 +9807,7 @@
               </a:ln>
               <a:extLst>
                 <a:ext uri="{91240B29-F687-4f45-9708-019B960494DF}">
-                  <a14:hiddenLine xmlns="" xmlns:a14="http://schemas.microsoft.com/office/drawing/2010/main" w="9525">
+                  <a14:hiddenLine xmlns:a14="http://schemas.microsoft.com/office/drawing/2010/main" xmlns="" w="9525">
                     <a:solidFill>
                       <a:srgbClr val="000000"/>
                     </a:solidFill>
@@ -9897,7 +9897,7 @@
               </a:ln>
               <a:extLst>
                 <a:ext uri="{91240B29-F687-4f45-9708-019B960494DF}">
-                  <a14:hiddenLine xmlns="" xmlns:a14="http://schemas.microsoft.com/office/drawing/2010/main" w="9525">
+                  <a14:hiddenLine xmlns:a14="http://schemas.microsoft.com/office/drawing/2010/main" xmlns="" w="9525">
                     <a:solidFill>
                       <a:srgbClr val="000000"/>
                     </a:solidFill>
@@ -9959,7 +9959,7 @@
               </a:ln>
               <a:extLst>
                 <a:ext uri="{91240B29-F687-4f45-9708-019B960494DF}">
-                  <a14:hiddenLine xmlns="" xmlns:a14="http://schemas.microsoft.com/office/drawing/2010/main" w="9525">
+                  <a14:hiddenLine xmlns:a14="http://schemas.microsoft.com/office/drawing/2010/main" xmlns="" w="9525">
                     <a:solidFill>
                       <a:srgbClr val="000000"/>
                     </a:solidFill>
@@ -10049,7 +10049,7 @@
               </a:ln>
               <a:extLst>
                 <a:ext uri="{91240B29-F687-4f45-9708-019B960494DF}">
-                  <a14:hiddenLine xmlns="" xmlns:a14="http://schemas.microsoft.com/office/drawing/2010/main" w="9525">
+                  <a14:hiddenLine xmlns:a14="http://schemas.microsoft.com/office/drawing/2010/main" xmlns="" w="9525">
                     <a:solidFill>
                       <a:srgbClr val="000000"/>
                     </a:solidFill>
@@ -10111,7 +10111,7 @@
               </a:ln>
               <a:extLst>
                 <a:ext uri="{91240B29-F687-4f45-9708-019B960494DF}">
-                  <a14:hiddenLine xmlns="" xmlns:a14="http://schemas.microsoft.com/office/drawing/2010/main" w="9525">
+                  <a14:hiddenLine xmlns:a14="http://schemas.microsoft.com/office/drawing/2010/main" xmlns="" w="9525">
                     <a:solidFill>
                       <a:srgbClr val="000000"/>
                     </a:solidFill>
@@ -10173,7 +10173,7 @@
               </a:ln>
               <a:extLst>
                 <a:ext uri="{91240B29-F687-4f45-9708-019B960494DF}">
-                  <a14:hiddenLine xmlns="" xmlns:a14="http://schemas.microsoft.com/office/drawing/2010/main" w="9525">
+                  <a14:hiddenLine xmlns:a14="http://schemas.microsoft.com/office/drawing/2010/main" xmlns="" w="9525">
                     <a:solidFill>
                       <a:srgbClr val="000000"/>
                     </a:solidFill>
@@ -10263,7 +10263,7 @@
               </a:ln>
               <a:extLst>
                 <a:ext uri="{91240B29-F687-4f45-9708-019B960494DF}">
-                  <a14:hiddenLine xmlns="" xmlns:a14="http://schemas.microsoft.com/office/drawing/2010/main" w="9525">
+                  <a14:hiddenLine xmlns:a14="http://schemas.microsoft.com/office/drawing/2010/main" xmlns="" w="9525">
                     <a:solidFill>
                       <a:srgbClr val="000000"/>
                     </a:solidFill>
@@ -10353,7 +10353,7 @@
               </a:ln>
               <a:extLst>
                 <a:ext uri="{91240B29-F687-4f45-9708-019B960494DF}">
-                  <a14:hiddenLine xmlns="" xmlns:a14="http://schemas.microsoft.com/office/drawing/2010/main" w="9525">
+                  <a14:hiddenLine xmlns:a14="http://schemas.microsoft.com/office/drawing/2010/main" xmlns="" w="9525">
                     <a:solidFill>
                       <a:srgbClr val="000000"/>
                     </a:solidFill>
@@ -10415,7 +10415,7 @@
               </a:ln>
               <a:extLst>
                 <a:ext uri="{91240B29-F687-4f45-9708-019B960494DF}">
-                  <a14:hiddenLine xmlns="" xmlns:a14="http://schemas.microsoft.com/office/drawing/2010/main" w="9525">
+                  <a14:hiddenLine xmlns:a14="http://schemas.microsoft.com/office/drawing/2010/main" xmlns="" w="9525">
                     <a:solidFill>
                       <a:srgbClr val="000000"/>
                     </a:solidFill>
@@ -10525,7 +10525,7 @@
               </a:ln>
               <a:extLst>
                 <a:ext uri="{91240B29-F687-4f45-9708-019B960494DF}">
-                  <a14:hiddenLine xmlns="" xmlns:a14="http://schemas.microsoft.com/office/drawing/2010/main" w="9525">
+                  <a14:hiddenLine xmlns:a14="http://schemas.microsoft.com/office/drawing/2010/main" xmlns="" w="9525">
                     <a:solidFill>
                       <a:srgbClr val="000000"/>
                     </a:solidFill>
@@ -10609,7 +10609,7 @@
               </a:ln>
               <a:extLst>
                 <a:ext uri="{91240B29-F687-4f45-9708-019B960494DF}">
-                  <a14:hiddenLine xmlns="" xmlns:a14="http://schemas.microsoft.com/office/drawing/2010/main" w="9525">
+                  <a14:hiddenLine xmlns:a14="http://schemas.microsoft.com/office/drawing/2010/main" xmlns="" w="9525">
                     <a:solidFill>
                       <a:srgbClr val="000000"/>
                     </a:solidFill>
@@ -10671,7 +10671,7 @@
               </a:ln>
               <a:extLst>
                 <a:ext uri="{91240B29-F687-4f45-9708-019B960494DF}">
-                  <a14:hiddenLine xmlns="" xmlns:a14="http://schemas.microsoft.com/office/drawing/2010/main" w="9525">
+                  <a14:hiddenLine xmlns:a14="http://schemas.microsoft.com/office/drawing/2010/main" xmlns="" w="9525">
                     <a:solidFill>
                       <a:srgbClr val="000000"/>
                     </a:solidFill>
@@ -10733,7 +10733,7 @@
               </a:ln>
               <a:extLst>
                 <a:ext uri="{91240B29-F687-4f45-9708-019B960494DF}">
-                  <a14:hiddenLine xmlns="" xmlns:a14="http://schemas.microsoft.com/office/drawing/2010/main" w="9525">
+                  <a14:hiddenLine xmlns:a14="http://schemas.microsoft.com/office/drawing/2010/main" xmlns="" w="9525">
                     <a:solidFill>
                       <a:srgbClr val="000000"/>
                     </a:solidFill>
@@ -10823,7 +10823,7 @@
               </a:ln>
               <a:extLst>
                 <a:ext uri="{91240B29-F687-4f45-9708-019B960494DF}">
-                  <a14:hiddenLine xmlns="" xmlns:a14="http://schemas.microsoft.com/office/drawing/2010/main" w="9525">
+                  <a14:hiddenLine xmlns:a14="http://schemas.microsoft.com/office/drawing/2010/main" xmlns="" w="9525">
                     <a:solidFill>
                       <a:srgbClr val="000000"/>
                     </a:solidFill>
@@ -10857,7 +10857,7 @@
               </a:ln>
               <a:extLst>
                 <a:ext uri="{91240B29-F687-4f45-9708-019B960494DF}">
-                  <a14:hiddenLine xmlns="" xmlns:a14="http://schemas.microsoft.com/office/drawing/2010/main" w="9525">
+                  <a14:hiddenLine xmlns:a14="http://schemas.microsoft.com/office/drawing/2010/main" xmlns="" w="9525">
                     <a:solidFill>
                       <a:srgbClr val="000000"/>
                     </a:solidFill>
@@ -10922,7 +10922,7 @@
               </a:ln>
               <a:extLst>
                 <a:ext uri="{91240B29-F687-4f45-9708-019B960494DF}">
-                  <a14:hiddenLine xmlns="" xmlns:a14="http://schemas.microsoft.com/office/drawing/2010/main" w="9525">
+                  <a14:hiddenLine xmlns:a14="http://schemas.microsoft.com/office/drawing/2010/main" xmlns="" w="9525">
                     <a:solidFill>
                       <a:srgbClr val="000000"/>
                     </a:solidFill>
@@ -11012,7 +11012,7 @@
               </a:ln>
               <a:extLst>
                 <a:ext uri="{91240B29-F687-4f45-9708-019B960494DF}">
-                  <a14:hiddenLine xmlns="" xmlns:a14="http://schemas.microsoft.com/office/drawing/2010/main" w="9525">
+                  <a14:hiddenLine xmlns:a14="http://schemas.microsoft.com/office/drawing/2010/main" xmlns="" w="9525">
                     <a:solidFill>
                       <a:srgbClr val="000000"/>
                     </a:solidFill>
@@ -11074,7 +11074,7 @@
               </a:ln>
               <a:extLst>
                 <a:ext uri="{91240B29-F687-4f45-9708-019B960494DF}">
-                  <a14:hiddenLine xmlns="" xmlns:a14="http://schemas.microsoft.com/office/drawing/2010/main" w="9525">
+                  <a14:hiddenLine xmlns:a14="http://schemas.microsoft.com/office/drawing/2010/main" xmlns="" w="9525">
                     <a:solidFill>
                       <a:srgbClr val="000000"/>
                     </a:solidFill>
@@ -11164,7 +11164,7 @@
               </a:ln>
               <a:extLst>
                 <a:ext uri="{91240B29-F687-4f45-9708-019B960494DF}">
-                  <a14:hiddenLine xmlns="" xmlns:a14="http://schemas.microsoft.com/office/drawing/2010/main" w="9525">
+                  <a14:hiddenLine xmlns:a14="http://schemas.microsoft.com/office/drawing/2010/main" xmlns="" w="9525">
                     <a:solidFill>
                       <a:srgbClr val="000000"/>
                     </a:solidFill>
@@ -11229,7 +11229,7 @@
               </a:ln>
               <a:extLst>
                 <a:ext uri="{91240B29-F687-4f45-9708-019B960494DF}">
-                  <a14:hiddenLine xmlns="" xmlns:a14="http://schemas.microsoft.com/office/drawing/2010/main" w="9525">
+                  <a14:hiddenLine xmlns:a14="http://schemas.microsoft.com/office/drawing/2010/main" xmlns="" w="9525">
                     <a:solidFill>
                       <a:srgbClr val="000000"/>
                     </a:solidFill>
@@ -11291,7 +11291,7 @@
               </a:ln>
               <a:extLst>
                 <a:ext uri="{91240B29-F687-4f45-9708-019B960494DF}">
-                  <a14:hiddenLine xmlns="" xmlns:a14="http://schemas.microsoft.com/office/drawing/2010/main" w="9525">
+                  <a14:hiddenLine xmlns:a14="http://schemas.microsoft.com/office/drawing/2010/main" xmlns="" w="9525">
                     <a:solidFill>
                       <a:srgbClr val="000000"/>
                     </a:solidFill>
@@ -11381,7 +11381,7 @@
               </a:ln>
               <a:extLst>
                 <a:ext uri="{91240B29-F687-4f45-9708-019B960494DF}">
-                  <a14:hiddenLine xmlns="" xmlns:a14="http://schemas.microsoft.com/office/drawing/2010/main" w="9525">
+                  <a14:hiddenLine xmlns:a14="http://schemas.microsoft.com/office/drawing/2010/main" xmlns="" w="9525">
                     <a:solidFill>
                       <a:srgbClr val="000000"/>
                     </a:solidFill>
@@ -11471,7 +11471,7 @@
               </a:ln>
               <a:extLst>
                 <a:ext uri="{91240B29-F687-4f45-9708-019B960494DF}">
-                  <a14:hiddenLine xmlns="" xmlns:a14="http://schemas.microsoft.com/office/drawing/2010/main" w="9525">
+                  <a14:hiddenLine xmlns:a14="http://schemas.microsoft.com/office/drawing/2010/main" xmlns="" w="9525">
                     <a:solidFill>
                       <a:srgbClr val="000000"/>
                     </a:solidFill>
@@ -11536,7 +11536,7 @@
               </a:ln>
               <a:extLst>
                 <a:ext uri="{91240B29-F687-4f45-9708-019B960494DF}">
-                  <a14:hiddenLine xmlns="" xmlns:a14="http://schemas.microsoft.com/office/drawing/2010/main" w="9525">
+                  <a14:hiddenLine xmlns:a14="http://schemas.microsoft.com/office/drawing/2010/main" xmlns="" w="9525">
                     <a:solidFill>
                       <a:srgbClr val="000000"/>
                     </a:solidFill>
@@ -11656,7 +11656,7 @@
               </a:ln>
               <a:extLst>
                 <a:ext uri="{91240B29-F687-4f45-9708-019B960494DF}">
-                  <a14:hiddenLine xmlns="" xmlns:a14="http://schemas.microsoft.com/office/drawing/2010/main" w="9525">
+                  <a14:hiddenLine xmlns:a14="http://schemas.microsoft.com/office/drawing/2010/main" xmlns="" w="9525">
                     <a:solidFill>
                       <a:srgbClr val="000000"/>
                     </a:solidFill>
@@ -11737,7 +11737,7 @@
               </a:ln>
               <a:extLst>
                 <a:ext uri="{91240B29-F687-4f45-9708-019B960494DF}">
-                  <a14:hiddenLine xmlns="" xmlns:a14="http://schemas.microsoft.com/office/drawing/2010/main" w="9525">
+                  <a14:hiddenLine xmlns:a14="http://schemas.microsoft.com/office/drawing/2010/main" xmlns="" w="9525">
                     <a:solidFill>
                       <a:srgbClr val="000000"/>
                     </a:solidFill>
@@ -11852,7 +11852,7 @@
               </a:ln>
               <a:extLst>
                 <a:ext uri="{91240B29-F687-4f45-9708-019B960494DF}">
-                  <a14:hiddenLine xmlns="" xmlns:a14="http://schemas.microsoft.com/office/drawing/2010/main" w="9525">
+                  <a14:hiddenLine xmlns:a14="http://schemas.microsoft.com/office/drawing/2010/main" xmlns="" w="9525">
                     <a:solidFill>
                       <a:srgbClr val="000000"/>
                     </a:solidFill>
@@ -11942,7 +11942,7 @@
               </a:ln>
               <a:extLst>
                 <a:ext uri="{91240B29-F687-4f45-9708-019B960494DF}">
-                  <a14:hiddenLine xmlns="" xmlns:a14="http://schemas.microsoft.com/office/drawing/2010/main" w="9525">
+                  <a14:hiddenLine xmlns:a14="http://schemas.microsoft.com/office/drawing/2010/main" xmlns="" w="9525">
                     <a:solidFill>
                       <a:srgbClr val="000000"/>
                     </a:solidFill>
@@ -12007,7 +12007,7 @@
               </a:ln>
               <a:extLst>
                 <a:ext uri="{91240B29-F687-4f45-9708-019B960494DF}">
-                  <a14:hiddenLine xmlns="" xmlns:a14="http://schemas.microsoft.com/office/drawing/2010/main" w="9525">
+                  <a14:hiddenLine xmlns:a14="http://schemas.microsoft.com/office/drawing/2010/main" xmlns="" w="9525">
                     <a:solidFill>
                       <a:srgbClr val="000000"/>
                     </a:solidFill>
@@ -12097,7 +12097,7 @@
               </a:ln>
               <a:extLst>
                 <a:ext uri="{91240B29-F687-4f45-9708-019B960494DF}">
-                  <a14:hiddenLine xmlns="" xmlns:a14="http://schemas.microsoft.com/office/drawing/2010/main" w="9525">
+                  <a14:hiddenLine xmlns:a14="http://schemas.microsoft.com/office/drawing/2010/main" xmlns="" w="9525">
                     <a:solidFill>
                       <a:srgbClr val="000000"/>
                     </a:solidFill>
@@ -12165,7 +12165,7 @@
               </a:ln>
               <a:extLst>
                 <a:ext uri="{91240B29-F687-4f45-9708-019B960494DF}">
-                  <a14:hiddenLine xmlns="" xmlns:a14="http://schemas.microsoft.com/office/drawing/2010/main" w="9525">
+                  <a14:hiddenLine xmlns:a14="http://schemas.microsoft.com/office/drawing/2010/main" xmlns="" w="9525">
                     <a:solidFill>
                       <a:srgbClr val="000000"/>
                     </a:solidFill>
@@ -12255,7 +12255,7 @@
               </a:ln>
               <a:extLst>
                 <a:ext uri="{91240B29-F687-4f45-9708-019B960494DF}">
-                  <a14:hiddenLine xmlns="" xmlns:a14="http://schemas.microsoft.com/office/drawing/2010/main" w="9525">
+                  <a14:hiddenLine xmlns:a14="http://schemas.microsoft.com/office/drawing/2010/main" xmlns="" w="9525">
                     <a:solidFill>
                       <a:srgbClr val="000000"/>
                     </a:solidFill>
@@ -12323,7 +12323,7 @@
               </a:ln>
               <a:extLst>
                 <a:ext uri="{91240B29-F687-4f45-9708-019B960494DF}">
-                  <a14:hiddenLine xmlns="" xmlns:a14="http://schemas.microsoft.com/office/drawing/2010/main" w="9525">
+                  <a14:hiddenLine xmlns:a14="http://schemas.microsoft.com/office/drawing/2010/main" xmlns="" w="9525">
                     <a:solidFill>
                       <a:srgbClr val="000000"/>
                     </a:solidFill>
@@ -12413,7 +12413,7 @@
               </a:ln>
               <a:extLst>
                 <a:ext uri="{91240B29-F687-4f45-9708-019B960494DF}">
-                  <a14:hiddenLine xmlns="" xmlns:a14="http://schemas.microsoft.com/office/drawing/2010/main" w="9525">
+                  <a14:hiddenLine xmlns:a14="http://schemas.microsoft.com/office/drawing/2010/main" xmlns="" w="9525">
                     <a:solidFill>
                       <a:srgbClr val="000000"/>
                     </a:solidFill>
@@ -12447,7 +12447,7 @@
               </a:ln>
               <a:extLst>
                 <a:ext uri="{91240B29-F687-4f45-9708-019B960494DF}">
-                  <a14:hiddenLine xmlns="" xmlns:a14="http://schemas.microsoft.com/office/drawing/2010/main" w="9525">
+                  <a14:hiddenLine xmlns:a14="http://schemas.microsoft.com/office/drawing/2010/main" xmlns="" w="9525">
                     <a:solidFill>
                       <a:srgbClr val="000000"/>
                     </a:solidFill>
@@ -12587,7 +12587,7 @@
           <a:p>
             <a:fld id="{EC4347D3-4C9A-C240-8F14-750059DFEEB0}" type="datetimeFigureOut">
               <a:rPr lang="en-US" smtClean="0"/>
-              <a:t>8/22/23</a:t>
+              <a:t>1/16/24</a:t>
             </a:fld>
             <a:endParaRPr lang="en-US"/>
           </a:p>
@@ -14200,7 +14200,7 @@
             <a:pPr lvl="1"/>
             <a:r>
               <a:rPr lang="en-US" dirty="0"/>
-              <a:t>Tu / Th 12:30 - 1:45 pm @ Gilmer Hall 301</a:t>
+              <a:t>Tu / Th 11:30 - 12:15 pm @ John W. Warner Hall 209</a:t>
             </a:r>
           </a:p>
           <a:p>
@@ -14218,6 +14218,13 @@
             <a:r>
               <a:rPr lang="en-US" dirty="0"/>
               <a:t>Using Panopto, so no live broadcast</a:t>
+            </a:r>
+          </a:p>
+          <a:p>
+            <a:pPr lvl="1"/>
+            <a:r>
+              <a:rPr lang="en-US" dirty="0"/>
+              <a:t>A note about recordings…they are a privilege, not a right.</a:t>
             </a:r>
           </a:p>
           <a:p>
@@ -14699,25 +14706,52 @@
             <a:pPr lvl="1"/>
             <a:r>
               <a:rPr lang="en-US" sz="2000" dirty="0"/>
-              <a:t>Thu., Oct. 12			Mod 1-2</a:t>
+              <a:t>Thu., Feb. 8			Mod 1</a:t>
             </a:r>
           </a:p>
           <a:p>
             <a:pPr lvl="1"/>
             <a:r>
               <a:rPr lang="en-US" sz="2000" dirty="0"/>
-              <a:t>Thu., Nov. 9			Mod 3-4</a:t>
+              <a:t>Thu., Feb. </a:t>
+            </a:r>
+            <a:r>
+              <a:rPr lang="en-US" dirty="0"/>
+              <a:t>29</a:t>
+            </a:r>
+            <a:r>
+              <a:rPr lang="en-US" sz="2000" dirty="0"/>
+              <a:t>			Mod </a:t>
+            </a:r>
+            <a:r>
+              <a:rPr lang="en-US" dirty="0"/>
+              <a:t>2</a:t>
             </a:r>
           </a:p>
           <a:p>
             <a:pPr lvl="1"/>
             <a:r>
               <a:rPr lang="en-US" sz="2000" dirty="0"/>
-              <a:t>Fri, Dec. 8 (Final Exa</a:t>
-            </a:r>
-            <a:r>
-              <a:rPr lang="en-US" dirty="0"/>
-              <a:t>m Day)</a:t>
+              <a:t>Thu., Mar. 28			Mod 3</a:t>
+            </a:r>
+          </a:p>
+          <a:p>
+            <a:pPr lvl="1"/>
+            <a:r>
+              <a:rPr lang="en-US" dirty="0"/>
+              <a:t>Thu., Apr. 18			Mod 4</a:t>
+            </a:r>
+            <a:endParaRPr lang="en-US" sz="2000" dirty="0"/>
+          </a:p>
+          <a:p>
+            <a:pPr lvl="1"/>
+            <a:r>
+              <a:rPr lang="en-US" sz="2000" dirty="0"/>
+              <a:t>Thu., May. 2 (Final </a:t>
+            </a:r>
+            <a:r>
+              <a:rPr lang="en-US" dirty="0"/>
+              <a:t>Day)</a:t>
             </a:r>
             <a:r>
               <a:rPr lang="en-US" sz="2000" dirty="0"/>
@@ -15061,7 +15095,7 @@
           <a:p>
             <a:r>
               <a:rPr lang="en-US" dirty="0"/>
-              <a:t>You can attempt all four retakes if you want, but the exams are designed for their to be enough time to do three retakes.</a:t>
+              <a:t>You can attempt all four retakes if you want, but the exams are designed for their to be enough time to do two (maybe three) retakes.</a:t>
             </a:r>
           </a:p>
         </p:txBody>
@@ -15233,7 +15267,7 @@
             <a:pPr lvl="1"/>
             <a:r>
               <a:rPr lang="en-US" dirty="0"/>
-              <a:t>Can be written in Java, C++, or Python (your choice)</a:t>
+              <a:t>Is written in Java</a:t>
             </a:r>
           </a:p>
           <a:p>
@@ -16005,7 +16039,7 @@
             </a:r>
             <a:r>
               <a:rPr lang="en-US" dirty="0"/>
-              <a:t>: 25 percent (split over about 6 </a:t>
+              <a:t>: 25 percent (split over about 6 or 7 </a:t>
             </a:r>
             <a:r>
               <a:rPr lang="en-US" dirty="0" err="1"/>
@@ -17871,22 +17905,14 @@
             <a:pPr lvl="1"/>
             <a:r>
               <a:rPr lang="en-US" dirty="0"/>
-              <a:t>Undergraduates (~10-18)</a:t>
+              <a:t>Undergraduates (~25)</a:t>
             </a:r>
           </a:p>
           <a:p>
             <a:pPr lvl="2"/>
             <a:r>
               <a:rPr lang="en-US" dirty="0"/>
-              <a:t>Having some trouble finding </a:t>
-            </a:r>
-            <a:r>
-              <a:rPr lang="en-US" dirty="0" err="1"/>
-              <a:t>Tas</a:t>
-            </a:r>
-            <a:r>
-              <a:rPr lang="en-US" dirty="0"/>
-              <a:t> but I think we will get there!</a:t>
+              <a:t>We have a good sized staff this year!</a:t>
             </a:r>
           </a:p>
           <a:p>

</xml_diff>

<commit_message>
polish leading up to first lecture
</commit_message>
<xml_diff>
--- a/slides/00-CourseIntroduction.pptx
+++ b/slides/00-CourseIntroduction.pptx
@@ -226,7 +226,7 @@
           <a:p>
             <a:fld id="{C5B45307-6ED4-B142-BD64-10F739779302}" type="datetimeFigureOut">
               <a:rPr lang="en-US" smtClean="0"/>
-              <a:t>1/16/24</a:t>
+              <a:t>1/18/24</a:t>
             </a:fld>
             <a:endParaRPr lang="en-US"/>
           </a:p>
@@ -729,7 +729,7 @@
           <a:noFill/>
           <a:extLst>
             <a:ext uri="{909E8E84-426E-40dd-AFC4-6F175D3DCCD1}">
-              <a14:hiddenFill xmlns:a14="http://schemas.microsoft.com/office/drawing/2010/main" xmlns="">
+              <a14:hiddenFill xmlns="" xmlns:a14="http://schemas.microsoft.com/office/drawing/2010/main">
                 <a:solidFill>
                   <a:srgbClr val="FFFFFF"/>
                 </a:solidFill>
@@ -788,7 +788,7 @@
             </a:ln>
             <a:extLst>
               <a:ext uri="{91240B29-F687-4f45-9708-019B960494DF}">
-                <a14:hiddenLine xmlns:a14="http://schemas.microsoft.com/office/drawing/2010/main" xmlns="" w="9525">
+                <a14:hiddenLine xmlns="" xmlns:a14="http://schemas.microsoft.com/office/drawing/2010/main" w="9525">
                   <a:solidFill>
                     <a:srgbClr val="000000"/>
                   </a:solidFill>
@@ -878,7 +878,7 @@
             </a:ln>
             <a:extLst>
               <a:ext uri="{91240B29-F687-4f45-9708-019B960494DF}">
-                <a14:hiddenLine xmlns:a14="http://schemas.microsoft.com/office/drawing/2010/main" xmlns="" w="9525">
+                <a14:hiddenLine xmlns="" xmlns:a14="http://schemas.microsoft.com/office/drawing/2010/main" w="9525">
                   <a:solidFill>
                     <a:srgbClr val="000000"/>
                   </a:solidFill>
@@ -968,7 +968,7 @@
             </a:ln>
             <a:extLst>
               <a:ext uri="{91240B29-F687-4f45-9708-019B960494DF}">
-                <a14:hiddenLine xmlns:a14="http://schemas.microsoft.com/office/drawing/2010/main" xmlns="" w="9525">
+                <a14:hiddenLine xmlns="" xmlns:a14="http://schemas.microsoft.com/office/drawing/2010/main" w="9525">
                   <a:solidFill>
                     <a:srgbClr val="000000"/>
                   </a:solidFill>
@@ -1002,7 +1002,7 @@
             </a:ln>
             <a:extLst>
               <a:ext uri="{91240B29-F687-4f45-9708-019B960494DF}">
-                <a14:hiddenLine xmlns:a14="http://schemas.microsoft.com/office/drawing/2010/main" xmlns="" w="9525">
+                <a14:hiddenLine xmlns="" xmlns:a14="http://schemas.microsoft.com/office/drawing/2010/main" w="9525">
                   <a:solidFill>
                     <a:srgbClr val="000000"/>
                   </a:solidFill>
@@ -1092,7 +1092,7 @@
             </a:ln>
             <a:extLst>
               <a:ext uri="{91240B29-F687-4f45-9708-019B960494DF}">
-                <a14:hiddenLine xmlns:a14="http://schemas.microsoft.com/office/drawing/2010/main" xmlns="" w="9525">
+                <a14:hiddenLine xmlns="" xmlns:a14="http://schemas.microsoft.com/office/drawing/2010/main" w="9525">
                   <a:solidFill>
                     <a:srgbClr val="000000"/>
                   </a:solidFill>
@@ -1154,7 +1154,7 @@
             </a:ln>
             <a:extLst>
               <a:ext uri="{91240B29-F687-4f45-9708-019B960494DF}">
-                <a14:hiddenLine xmlns:a14="http://schemas.microsoft.com/office/drawing/2010/main" xmlns="" w="9525">
+                <a14:hiddenLine xmlns="" xmlns:a14="http://schemas.microsoft.com/office/drawing/2010/main" w="9525">
                   <a:solidFill>
                     <a:srgbClr val="000000"/>
                   </a:solidFill>
@@ -1216,7 +1216,7 @@
             </a:ln>
             <a:extLst>
               <a:ext uri="{91240B29-F687-4f45-9708-019B960494DF}">
-                <a14:hiddenLine xmlns:a14="http://schemas.microsoft.com/office/drawing/2010/main" xmlns="" w="9525">
+                <a14:hiddenLine xmlns="" xmlns:a14="http://schemas.microsoft.com/office/drawing/2010/main" w="9525">
                   <a:solidFill>
                     <a:srgbClr val="000000"/>
                   </a:solidFill>
@@ -1306,7 +1306,7 @@
             </a:ln>
             <a:extLst>
               <a:ext uri="{91240B29-F687-4f45-9708-019B960494DF}">
-                <a14:hiddenLine xmlns:a14="http://schemas.microsoft.com/office/drawing/2010/main" xmlns="" w="9525">
+                <a14:hiddenLine xmlns="" xmlns:a14="http://schemas.microsoft.com/office/drawing/2010/main" w="9525">
                   <a:solidFill>
                     <a:srgbClr val="000000"/>
                   </a:solidFill>
@@ -1368,7 +1368,7 @@
             </a:ln>
             <a:extLst>
               <a:ext uri="{91240B29-F687-4f45-9708-019B960494DF}">
-                <a14:hiddenLine xmlns:a14="http://schemas.microsoft.com/office/drawing/2010/main" xmlns="" w="9525">
+                <a14:hiddenLine xmlns="" xmlns:a14="http://schemas.microsoft.com/office/drawing/2010/main" w="9525">
                   <a:solidFill>
                     <a:srgbClr val="000000"/>
                   </a:solidFill>
@@ -1430,7 +1430,7 @@
             </a:ln>
             <a:extLst>
               <a:ext uri="{91240B29-F687-4f45-9708-019B960494DF}">
-                <a14:hiddenLine xmlns:a14="http://schemas.microsoft.com/office/drawing/2010/main" xmlns="" w="9525">
+                <a14:hiddenLine xmlns="" xmlns:a14="http://schemas.microsoft.com/office/drawing/2010/main" w="9525">
                   <a:solidFill>
                     <a:srgbClr val="000000"/>
                   </a:solidFill>
@@ -1520,7 +1520,7 @@
             </a:ln>
             <a:extLst>
               <a:ext uri="{91240B29-F687-4f45-9708-019B960494DF}">
-                <a14:hiddenLine xmlns:a14="http://schemas.microsoft.com/office/drawing/2010/main" xmlns="" w="9525">
+                <a14:hiddenLine xmlns="" xmlns:a14="http://schemas.microsoft.com/office/drawing/2010/main" w="9525">
                   <a:solidFill>
                     <a:srgbClr val="000000"/>
                   </a:solidFill>
@@ -1610,7 +1610,7 @@
             </a:ln>
             <a:extLst>
               <a:ext uri="{91240B29-F687-4f45-9708-019B960494DF}">
-                <a14:hiddenLine xmlns:a14="http://schemas.microsoft.com/office/drawing/2010/main" xmlns="" w="9525">
+                <a14:hiddenLine xmlns="" xmlns:a14="http://schemas.microsoft.com/office/drawing/2010/main" w="9525">
                   <a:solidFill>
                     <a:srgbClr val="000000"/>
                   </a:solidFill>
@@ -1672,7 +1672,7 @@
             </a:ln>
             <a:extLst>
               <a:ext uri="{91240B29-F687-4f45-9708-019B960494DF}">
-                <a14:hiddenLine xmlns:a14="http://schemas.microsoft.com/office/drawing/2010/main" xmlns="" w="9525">
+                <a14:hiddenLine xmlns="" xmlns:a14="http://schemas.microsoft.com/office/drawing/2010/main" w="9525">
                   <a:solidFill>
                     <a:srgbClr val="000000"/>
                   </a:solidFill>
@@ -1782,7 +1782,7 @@
             </a:ln>
             <a:extLst>
               <a:ext uri="{91240B29-F687-4f45-9708-019B960494DF}">
-                <a14:hiddenLine xmlns:a14="http://schemas.microsoft.com/office/drawing/2010/main" xmlns="" w="9525">
+                <a14:hiddenLine xmlns="" xmlns:a14="http://schemas.microsoft.com/office/drawing/2010/main" w="9525">
                   <a:solidFill>
                     <a:srgbClr val="000000"/>
                   </a:solidFill>
@@ -1844,7 +1844,7 @@
             </a:ln>
             <a:extLst>
               <a:ext uri="{91240B29-F687-4f45-9708-019B960494DF}">
-                <a14:hiddenLine xmlns:a14="http://schemas.microsoft.com/office/drawing/2010/main" xmlns="" w="9525">
+                <a14:hiddenLine xmlns="" xmlns:a14="http://schemas.microsoft.com/office/drawing/2010/main" w="9525">
                   <a:solidFill>
                     <a:srgbClr val="000000"/>
                   </a:solidFill>
@@ -1934,7 +1934,7 @@
             </a:ln>
             <a:extLst>
               <a:ext uri="{91240B29-F687-4f45-9708-019B960494DF}">
-                <a14:hiddenLine xmlns:a14="http://schemas.microsoft.com/office/drawing/2010/main" xmlns="" w="9525">
+                <a14:hiddenLine xmlns="" xmlns:a14="http://schemas.microsoft.com/office/drawing/2010/main" w="9525">
                   <a:solidFill>
                     <a:srgbClr val="000000"/>
                   </a:solidFill>
@@ -2024,7 +2024,7 @@
             </a:ln>
             <a:extLst>
               <a:ext uri="{91240B29-F687-4f45-9708-019B960494DF}">
-                <a14:hiddenLine xmlns:a14="http://schemas.microsoft.com/office/drawing/2010/main" xmlns="" w="9525">
+                <a14:hiddenLine xmlns="" xmlns:a14="http://schemas.microsoft.com/office/drawing/2010/main" w="9525">
                   <a:solidFill>
                     <a:srgbClr val="000000"/>
                   </a:solidFill>
@@ -2086,7 +2086,7 @@
             </a:ln>
             <a:extLst>
               <a:ext uri="{91240B29-F687-4f45-9708-019B960494DF}">
-                <a14:hiddenLine xmlns:a14="http://schemas.microsoft.com/office/drawing/2010/main" xmlns="" w="9525">
+                <a14:hiddenLine xmlns="" xmlns:a14="http://schemas.microsoft.com/office/drawing/2010/main" w="9525">
                   <a:solidFill>
                     <a:srgbClr val="000000"/>
                   </a:solidFill>
@@ -2176,7 +2176,7 @@
             </a:ln>
             <a:extLst>
               <a:ext uri="{91240B29-F687-4f45-9708-019B960494DF}">
-                <a14:hiddenLine xmlns:a14="http://schemas.microsoft.com/office/drawing/2010/main" xmlns="" w="9525">
+                <a14:hiddenLine xmlns="" xmlns:a14="http://schemas.microsoft.com/office/drawing/2010/main" w="9525">
                   <a:solidFill>
                     <a:srgbClr val="000000"/>
                   </a:solidFill>
@@ -2266,7 +2266,7 @@
             </a:ln>
             <a:extLst>
               <a:ext uri="{91240B29-F687-4f45-9708-019B960494DF}">
-                <a14:hiddenLine xmlns:a14="http://schemas.microsoft.com/office/drawing/2010/main" xmlns="" w="9525">
+                <a14:hiddenLine xmlns="" xmlns:a14="http://schemas.microsoft.com/office/drawing/2010/main" w="9525">
                   <a:solidFill>
                     <a:srgbClr val="000000"/>
                   </a:solidFill>
@@ -2322,7 +2322,7 @@
             </a:ln>
             <a:extLst>
               <a:ext uri="{91240B29-F687-4f45-9708-019B960494DF}">
-                <a14:hiddenLine xmlns:a14="http://schemas.microsoft.com/office/drawing/2010/main" xmlns="" w="9525">
+                <a14:hiddenLine xmlns="" xmlns:a14="http://schemas.microsoft.com/office/drawing/2010/main" w="9525">
                   <a:solidFill>
                     <a:srgbClr val="000000"/>
                   </a:solidFill>
@@ -2412,7 +2412,7 @@
             </a:ln>
             <a:extLst>
               <a:ext uri="{91240B29-F687-4f45-9708-019B960494DF}">
-                <a14:hiddenLine xmlns:a14="http://schemas.microsoft.com/office/drawing/2010/main" xmlns="" w="9525">
+                <a14:hiddenLine xmlns="" xmlns:a14="http://schemas.microsoft.com/office/drawing/2010/main" w="9525">
                   <a:solidFill>
                     <a:srgbClr val="000000"/>
                   </a:solidFill>
@@ -2468,7 +2468,7 @@
             </a:ln>
             <a:extLst>
               <a:ext uri="{91240B29-F687-4f45-9708-019B960494DF}">
-                <a14:hiddenLine xmlns:a14="http://schemas.microsoft.com/office/drawing/2010/main" xmlns="" w="9525">
+                <a14:hiddenLine xmlns="" xmlns:a14="http://schemas.microsoft.com/office/drawing/2010/main" w="9525">
                   <a:solidFill>
                     <a:srgbClr val="000000"/>
                   </a:solidFill>
@@ -2558,7 +2558,7 @@
             </a:ln>
             <a:extLst>
               <a:ext uri="{91240B29-F687-4f45-9708-019B960494DF}">
-                <a14:hiddenLine xmlns:a14="http://schemas.microsoft.com/office/drawing/2010/main" xmlns="" w="9525">
+                <a14:hiddenLine xmlns="" xmlns:a14="http://schemas.microsoft.com/office/drawing/2010/main" w="9525">
                   <a:solidFill>
                     <a:srgbClr val="000000"/>
                   </a:solidFill>
@@ -2626,7 +2626,7 @@
             </a:ln>
             <a:extLst>
               <a:ext uri="{91240B29-F687-4f45-9708-019B960494DF}">
-                <a14:hiddenLine xmlns:a14="http://schemas.microsoft.com/office/drawing/2010/main" xmlns="" w="9525">
+                <a14:hiddenLine xmlns="" xmlns:a14="http://schemas.microsoft.com/office/drawing/2010/main" w="9525">
                   <a:solidFill>
                     <a:srgbClr val="000000"/>
                   </a:solidFill>
@@ -2716,7 +2716,7 @@
             </a:ln>
             <a:extLst>
               <a:ext uri="{91240B29-F687-4f45-9708-019B960494DF}">
-                <a14:hiddenLine xmlns:a14="http://schemas.microsoft.com/office/drawing/2010/main" xmlns="" w="9525">
+                <a14:hiddenLine xmlns="" xmlns:a14="http://schemas.microsoft.com/office/drawing/2010/main" w="9525">
                   <a:solidFill>
                     <a:srgbClr val="000000"/>
                   </a:solidFill>
@@ -2784,7 +2784,7 @@
             </a:ln>
             <a:extLst>
               <a:ext uri="{91240B29-F687-4f45-9708-019B960494DF}">
-                <a14:hiddenLine xmlns:a14="http://schemas.microsoft.com/office/drawing/2010/main" xmlns="" w="9525">
+                <a14:hiddenLine xmlns="" xmlns:a14="http://schemas.microsoft.com/office/drawing/2010/main" w="9525">
                   <a:solidFill>
                     <a:srgbClr val="000000"/>
                   </a:solidFill>
@@ -2874,7 +2874,7 @@
             </a:ln>
             <a:extLst>
               <a:ext uri="{91240B29-F687-4f45-9708-019B960494DF}">
-                <a14:hiddenLine xmlns:a14="http://schemas.microsoft.com/office/drawing/2010/main" xmlns="" w="9525">
+                <a14:hiddenLine xmlns="" xmlns:a14="http://schemas.microsoft.com/office/drawing/2010/main" w="9525">
                   <a:solidFill>
                     <a:srgbClr val="000000"/>
                   </a:solidFill>
@@ -2908,7 +2908,7 @@
             </a:ln>
             <a:extLst>
               <a:ext uri="{91240B29-F687-4f45-9708-019B960494DF}">
-                <a14:hiddenLine xmlns:a14="http://schemas.microsoft.com/office/drawing/2010/main" xmlns="" w="9525">
+                <a14:hiddenLine xmlns="" xmlns:a14="http://schemas.microsoft.com/office/drawing/2010/main" w="9525">
                   <a:solidFill>
                     <a:srgbClr val="000000"/>
                   </a:solidFill>
@@ -2998,7 +2998,7 @@
             </a:ln>
             <a:extLst>
               <a:ext uri="{91240B29-F687-4f45-9708-019B960494DF}">
-                <a14:hiddenLine xmlns:a14="http://schemas.microsoft.com/office/drawing/2010/main" xmlns="" w="9525">
+                <a14:hiddenLine xmlns="" xmlns:a14="http://schemas.microsoft.com/office/drawing/2010/main" w="9525">
                   <a:solidFill>
                     <a:srgbClr val="000000"/>
                   </a:solidFill>
@@ -3060,7 +3060,7 @@
             </a:ln>
             <a:extLst>
               <a:ext uri="{91240B29-F687-4f45-9708-019B960494DF}">
-                <a14:hiddenLine xmlns:a14="http://schemas.microsoft.com/office/drawing/2010/main" xmlns="" w="9525">
+                <a14:hiddenLine xmlns="" xmlns:a14="http://schemas.microsoft.com/office/drawing/2010/main" w="9525">
                   <a:solidFill>
                     <a:srgbClr val="000000"/>
                   </a:solidFill>
@@ -3122,7 +3122,7 @@
             </a:ln>
             <a:extLst>
               <a:ext uri="{91240B29-F687-4f45-9708-019B960494DF}">
-                <a14:hiddenLine xmlns:a14="http://schemas.microsoft.com/office/drawing/2010/main" xmlns="" w="9525">
+                <a14:hiddenLine xmlns="" xmlns:a14="http://schemas.microsoft.com/office/drawing/2010/main" w="9525">
                   <a:solidFill>
                     <a:srgbClr val="000000"/>
                   </a:solidFill>
@@ -3212,7 +3212,7 @@
             </a:ln>
             <a:extLst>
               <a:ext uri="{91240B29-F687-4f45-9708-019B960494DF}">
-                <a14:hiddenLine xmlns:a14="http://schemas.microsoft.com/office/drawing/2010/main" xmlns="" w="9525">
+                <a14:hiddenLine xmlns="" xmlns:a14="http://schemas.microsoft.com/office/drawing/2010/main" w="9525">
                   <a:solidFill>
                     <a:srgbClr val="000000"/>
                   </a:solidFill>
@@ -3280,7 +3280,7 @@
             </a:ln>
             <a:extLst>
               <a:ext uri="{91240B29-F687-4f45-9708-019B960494DF}">
-                <a14:hiddenLine xmlns:a14="http://schemas.microsoft.com/office/drawing/2010/main" xmlns="" w="9525">
+                <a14:hiddenLine xmlns="" xmlns:a14="http://schemas.microsoft.com/office/drawing/2010/main" w="9525">
                   <a:solidFill>
                     <a:srgbClr val="000000"/>
                   </a:solidFill>
@@ -3342,7 +3342,7 @@
             </a:ln>
             <a:extLst>
               <a:ext uri="{91240B29-F687-4f45-9708-019B960494DF}">
-                <a14:hiddenLine xmlns:a14="http://schemas.microsoft.com/office/drawing/2010/main" xmlns="" w="9525">
+                <a14:hiddenLine xmlns="" xmlns:a14="http://schemas.microsoft.com/office/drawing/2010/main" w="9525">
                   <a:solidFill>
                     <a:srgbClr val="000000"/>
                   </a:solidFill>
@@ -3432,7 +3432,7 @@
             </a:ln>
             <a:extLst>
               <a:ext uri="{91240B29-F687-4f45-9708-019B960494DF}">
-                <a14:hiddenLine xmlns:a14="http://schemas.microsoft.com/office/drawing/2010/main" xmlns="" w="9525">
+                <a14:hiddenLine xmlns="" xmlns:a14="http://schemas.microsoft.com/office/drawing/2010/main" w="9525">
                   <a:solidFill>
                     <a:srgbClr val="000000"/>
                   </a:solidFill>
@@ -3494,7 +3494,7 @@
             </a:ln>
             <a:extLst>
               <a:ext uri="{91240B29-F687-4f45-9708-019B960494DF}">
-                <a14:hiddenLine xmlns:a14="http://schemas.microsoft.com/office/drawing/2010/main" xmlns="" w="9525">
+                <a14:hiddenLine xmlns="" xmlns:a14="http://schemas.microsoft.com/office/drawing/2010/main" w="9525">
                   <a:solidFill>
                     <a:srgbClr val="000000"/>
                   </a:solidFill>
@@ -3584,7 +3584,7 @@
             </a:ln>
             <a:extLst>
               <a:ext uri="{91240B29-F687-4f45-9708-019B960494DF}">
-                <a14:hiddenLine xmlns:a14="http://schemas.microsoft.com/office/drawing/2010/main" xmlns="" w="9525">
+                <a14:hiddenLine xmlns="" xmlns:a14="http://schemas.microsoft.com/office/drawing/2010/main" w="9525">
                   <a:solidFill>
                     <a:srgbClr val="000000"/>
                   </a:solidFill>
@@ -3646,7 +3646,7 @@
             </a:ln>
             <a:extLst>
               <a:ext uri="{91240B29-F687-4f45-9708-019B960494DF}">
-                <a14:hiddenLine xmlns:a14="http://schemas.microsoft.com/office/drawing/2010/main" xmlns="" w="9525">
+                <a14:hiddenLine xmlns="" xmlns:a14="http://schemas.microsoft.com/office/drawing/2010/main" w="9525">
                   <a:solidFill>
                     <a:srgbClr val="000000"/>
                   </a:solidFill>
@@ -3736,7 +3736,7 @@
             </a:ln>
             <a:extLst>
               <a:ext uri="{91240B29-F687-4f45-9708-019B960494DF}">
-                <a14:hiddenLine xmlns:a14="http://schemas.microsoft.com/office/drawing/2010/main" xmlns="" w="9525">
+                <a14:hiddenLine xmlns="" xmlns:a14="http://schemas.microsoft.com/office/drawing/2010/main" w="9525">
                   <a:solidFill>
                     <a:srgbClr val="000000"/>
                   </a:solidFill>
@@ -3770,7 +3770,7 @@
             </a:ln>
             <a:extLst>
               <a:ext uri="{91240B29-F687-4f45-9708-019B960494DF}">
-                <a14:hiddenLine xmlns:a14="http://schemas.microsoft.com/office/drawing/2010/main" xmlns="" w="9525">
+                <a14:hiddenLine xmlns="" xmlns:a14="http://schemas.microsoft.com/office/drawing/2010/main" w="9525">
                   <a:solidFill>
                     <a:srgbClr val="000000"/>
                   </a:solidFill>
@@ -3835,7 +3835,7 @@
             </a:ln>
             <a:extLst>
               <a:ext uri="{91240B29-F687-4f45-9708-019B960494DF}">
-                <a14:hiddenLine xmlns:a14="http://schemas.microsoft.com/office/drawing/2010/main" xmlns="" w="9525">
+                <a14:hiddenLine xmlns="" xmlns:a14="http://schemas.microsoft.com/office/drawing/2010/main" w="9525">
                   <a:solidFill>
                     <a:srgbClr val="000000"/>
                   </a:solidFill>
@@ -3925,7 +3925,7 @@
             </a:ln>
             <a:extLst>
               <a:ext uri="{91240B29-F687-4f45-9708-019B960494DF}">
-                <a14:hiddenLine xmlns:a14="http://schemas.microsoft.com/office/drawing/2010/main" xmlns="" w="9525">
+                <a14:hiddenLine xmlns="" xmlns:a14="http://schemas.microsoft.com/office/drawing/2010/main" w="9525">
                   <a:solidFill>
                     <a:srgbClr val="000000"/>
                   </a:solidFill>
@@ -3987,7 +3987,7 @@
             </a:ln>
             <a:extLst>
               <a:ext uri="{91240B29-F687-4f45-9708-019B960494DF}">
-                <a14:hiddenLine xmlns:a14="http://schemas.microsoft.com/office/drawing/2010/main" xmlns="" w="9525">
+                <a14:hiddenLine xmlns="" xmlns:a14="http://schemas.microsoft.com/office/drawing/2010/main" w="9525">
                   <a:solidFill>
                     <a:srgbClr val="000000"/>
                   </a:solidFill>
@@ -4077,7 +4077,7 @@
             </a:ln>
             <a:extLst>
               <a:ext uri="{91240B29-F687-4f45-9708-019B960494DF}">
-                <a14:hiddenLine xmlns:a14="http://schemas.microsoft.com/office/drawing/2010/main" xmlns="" w="9525">
+                <a14:hiddenLine xmlns="" xmlns:a14="http://schemas.microsoft.com/office/drawing/2010/main" w="9525">
                   <a:solidFill>
                     <a:srgbClr val="000000"/>
                   </a:solidFill>
@@ -4167,7 +4167,7 @@
             </a:ln>
             <a:extLst>
               <a:ext uri="{91240B29-F687-4f45-9708-019B960494DF}">
-                <a14:hiddenLine xmlns:a14="http://schemas.microsoft.com/office/drawing/2010/main" xmlns="" w="9525">
+                <a14:hiddenLine xmlns="" xmlns:a14="http://schemas.microsoft.com/office/drawing/2010/main" w="9525">
                   <a:solidFill>
                     <a:srgbClr val="000000"/>
                   </a:solidFill>
@@ -4232,7 +4232,7 @@
             </a:ln>
             <a:extLst>
               <a:ext uri="{91240B29-F687-4f45-9708-019B960494DF}">
-                <a14:hiddenLine xmlns:a14="http://schemas.microsoft.com/office/drawing/2010/main" xmlns="" w="9525">
+                <a14:hiddenLine xmlns="" xmlns:a14="http://schemas.microsoft.com/office/drawing/2010/main" w="9525">
                   <a:solidFill>
                     <a:srgbClr val="000000"/>
                   </a:solidFill>
@@ -4294,7 +4294,7 @@
             </a:ln>
             <a:extLst>
               <a:ext uri="{91240B29-F687-4f45-9708-019B960494DF}">
-                <a14:hiddenLine xmlns:a14="http://schemas.microsoft.com/office/drawing/2010/main" xmlns="" w="9525">
+                <a14:hiddenLine xmlns="" xmlns:a14="http://schemas.microsoft.com/office/drawing/2010/main" w="9525">
                   <a:solidFill>
                     <a:srgbClr val="000000"/>
                   </a:solidFill>
@@ -4384,7 +4384,7 @@
             </a:ln>
             <a:extLst>
               <a:ext uri="{91240B29-F687-4f45-9708-019B960494DF}">
-                <a14:hiddenLine xmlns:a14="http://schemas.microsoft.com/office/drawing/2010/main" xmlns="" w="9525">
+                <a14:hiddenLine xmlns="" xmlns:a14="http://schemas.microsoft.com/office/drawing/2010/main" w="9525">
                   <a:solidFill>
                     <a:srgbClr val="000000"/>
                   </a:solidFill>
@@ -4474,7 +4474,7 @@
             </a:ln>
             <a:extLst>
               <a:ext uri="{91240B29-F687-4f45-9708-019B960494DF}">
-                <a14:hiddenLine xmlns:a14="http://schemas.microsoft.com/office/drawing/2010/main" xmlns="" w="9525">
+                <a14:hiddenLine xmlns="" xmlns:a14="http://schemas.microsoft.com/office/drawing/2010/main" w="9525">
                   <a:solidFill>
                     <a:srgbClr val="000000"/>
                   </a:solidFill>
@@ -4536,7 +4536,7 @@
             </a:ln>
             <a:extLst>
               <a:ext uri="{91240B29-F687-4f45-9708-019B960494DF}">
-                <a14:hiddenLine xmlns:a14="http://schemas.microsoft.com/office/drawing/2010/main" xmlns="" w="9525">
+                <a14:hiddenLine xmlns="" xmlns:a14="http://schemas.microsoft.com/office/drawing/2010/main" w="9525">
                   <a:solidFill>
                     <a:srgbClr val="000000"/>
                   </a:solidFill>
@@ -4656,7 +4656,7 @@
             </a:ln>
             <a:extLst>
               <a:ext uri="{91240B29-F687-4f45-9708-019B960494DF}">
-                <a14:hiddenLine xmlns:a14="http://schemas.microsoft.com/office/drawing/2010/main" xmlns="" w="9525">
+                <a14:hiddenLine xmlns="" xmlns:a14="http://schemas.microsoft.com/office/drawing/2010/main" w="9525">
                   <a:solidFill>
                     <a:srgbClr val="000000"/>
                   </a:solidFill>
@@ -4724,7 +4724,7 @@
             </a:ln>
             <a:extLst>
               <a:ext uri="{91240B29-F687-4f45-9708-019B960494DF}">
-                <a14:hiddenLine xmlns:a14="http://schemas.microsoft.com/office/drawing/2010/main" xmlns="" w="9525">
+                <a14:hiddenLine xmlns="" xmlns:a14="http://schemas.microsoft.com/office/drawing/2010/main" w="9525">
                   <a:solidFill>
                     <a:srgbClr val="000000"/>
                   </a:solidFill>
@@ -4814,7 +4814,7 @@
             </a:ln>
             <a:extLst>
               <a:ext uri="{91240B29-F687-4f45-9708-019B960494DF}">
-                <a14:hiddenLine xmlns:a14="http://schemas.microsoft.com/office/drawing/2010/main" xmlns="" w="9525">
+                <a14:hiddenLine xmlns="" xmlns:a14="http://schemas.microsoft.com/office/drawing/2010/main" w="9525">
                   <a:solidFill>
                     <a:srgbClr val="000000"/>
                   </a:solidFill>
@@ -4954,7 +4954,7 @@
           <a:p>
             <a:fld id="{EC4347D3-4C9A-C240-8F14-750059DFEEB0}" type="datetimeFigureOut">
               <a:rPr lang="en-US" smtClean="0"/>
-              <a:t>1/16/24</a:t>
+              <a:t>1/18/24</a:t>
             </a:fld>
             <a:endParaRPr lang="en-US"/>
           </a:p>
@@ -5221,7 +5221,7 @@
           <a:p>
             <a:fld id="{EC4347D3-4C9A-C240-8F14-750059DFEEB0}" type="datetimeFigureOut">
               <a:rPr lang="en-US" smtClean="0"/>
-              <a:t>1/16/24</a:t>
+              <a:t>1/18/24</a:t>
             </a:fld>
             <a:endParaRPr lang="en-US"/>
           </a:p>
@@ -5417,7 +5417,7 @@
           <a:p>
             <a:fld id="{EC4347D3-4C9A-C240-8F14-750059DFEEB0}" type="datetimeFigureOut">
               <a:rPr lang="en-US" smtClean="0"/>
-              <a:t>1/16/24</a:t>
+              <a:t>1/18/24</a:t>
             </a:fld>
             <a:endParaRPr lang="en-US"/>
           </a:p>
@@ -5680,7 +5680,7 @@
           <a:p>
             <a:fld id="{EC4347D3-4C9A-C240-8F14-750059DFEEB0}" type="datetimeFigureOut">
               <a:rPr lang="en-US" smtClean="0"/>
-              <a:t>1/16/24</a:t>
+              <a:t>1/18/24</a:t>
             </a:fld>
             <a:endParaRPr lang="en-US"/>
           </a:p>
@@ -6114,7 +6114,7 @@
           <a:p>
             <a:fld id="{EC4347D3-4C9A-C240-8F14-750059DFEEB0}" type="datetimeFigureOut">
               <a:rPr lang="en-US" smtClean="0"/>
-              <a:t>1/16/24</a:t>
+              <a:t>1/18/24</a:t>
             </a:fld>
             <a:endParaRPr lang="en-US"/>
           </a:p>
@@ -6660,7 +6660,7 @@
           <a:p>
             <a:fld id="{EC4347D3-4C9A-C240-8F14-750059DFEEB0}" type="datetimeFigureOut">
               <a:rPr lang="en-US" smtClean="0"/>
-              <a:t>1/16/24</a:t>
+              <a:t>1/18/24</a:t>
             </a:fld>
             <a:endParaRPr lang="en-US"/>
           </a:p>
@@ -7380,7 +7380,7 @@
           <a:p>
             <a:fld id="{EC4347D3-4C9A-C240-8F14-750059DFEEB0}" type="datetimeFigureOut">
               <a:rPr lang="en-US" smtClean="0"/>
-              <a:t>1/16/24</a:t>
+              <a:t>1/18/24</a:t>
             </a:fld>
             <a:endParaRPr lang="en-US"/>
           </a:p>
@@ -7550,7 +7550,7 @@
           <a:p>
             <a:fld id="{EC4347D3-4C9A-C240-8F14-750059DFEEB0}" type="datetimeFigureOut">
               <a:rPr lang="en-US" smtClean="0"/>
-              <a:t>1/16/24</a:t>
+              <a:t>1/18/24</a:t>
             </a:fld>
             <a:endParaRPr lang="en-US"/>
           </a:p>
@@ -7730,7 +7730,7 @@
           <a:p>
             <a:fld id="{EC4347D3-4C9A-C240-8F14-750059DFEEB0}" type="datetimeFigureOut">
               <a:rPr lang="en-US" smtClean="0"/>
-              <a:t>1/16/24</a:t>
+              <a:t>1/18/24</a:t>
             </a:fld>
             <a:endParaRPr lang="en-US"/>
           </a:p>
@@ -7900,7 +7900,7 @@
           <a:p>
             <a:fld id="{EC4347D3-4C9A-C240-8F14-750059DFEEB0}" type="datetimeFigureOut">
               <a:rPr lang="en-US" smtClean="0"/>
-              <a:t>1/16/24</a:t>
+              <a:t>1/18/24</a:t>
             </a:fld>
             <a:endParaRPr lang="en-US"/>
           </a:p>
@@ -8150,7 +8150,7 @@
           <a:p>
             <a:fld id="{EC4347D3-4C9A-C240-8F14-750059DFEEB0}" type="datetimeFigureOut">
               <a:rPr lang="en-US" smtClean="0"/>
-              <a:t>1/16/24</a:t>
+              <a:t>1/18/24</a:t>
             </a:fld>
             <a:endParaRPr lang="en-US"/>
           </a:p>
@@ -8382,7 +8382,7 @@
           <a:p>
             <a:fld id="{EC4347D3-4C9A-C240-8F14-750059DFEEB0}" type="datetimeFigureOut">
               <a:rPr lang="en-US" smtClean="0"/>
-              <a:t>1/16/24</a:t>
+              <a:t>1/18/24</a:t>
             </a:fld>
             <a:endParaRPr lang="en-US"/>
           </a:p>
@@ -8768,7 +8768,7 @@
           <a:p>
             <a:fld id="{EC4347D3-4C9A-C240-8F14-750059DFEEB0}" type="datetimeFigureOut">
               <a:rPr lang="en-US" smtClean="0"/>
-              <a:t>1/16/24</a:t>
+              <a:t>1/18/24</a:t>
             </a:fld>
             <a:endParaRPr lang="en-US"/>
           </a:p>
@@ -8891,7 +8891,7 @@
           <a:p>
             <a:fld id="{EC4347D3-4C9A-C240-8F14-750059DFEEB0}" type="datetimeFigureOut">
               <a:rPr lang="en-US" smtClean="0"/>
-              <a:t>1/16/24</a:t>
+              <a:t>1/18/24</a:t>
             </a:fld>
             <a:endParaRPr lang="en-US"/>
           </a:p>
@@ -8986,7 +8986,7 @@
           <a:p>
             <a:fld id="{EC4347D3-4C9A-C240-8F14-750059DFEEB0}" type="datetimeFigureOut">
               <a:rPr lang="en-US" smtClean="0"/>
-              <a:t>1/16/24</a:t>
+              <a:t>1/18/24</a:t>
             </a:fld>
             <a:endParaRPr lang="en-US"/>
           </a:p>
@@ -9235,7 +9235,7 @@
           <a:p>
             <a:fld id="{EC4347D3-4C9A-C240-8F14-750059DFEEB0}" type="datetimeFigureOut">
               <a:rPr lang="en-US" smtClean="0"/>
-              <a:t>1/16/24</a:t>
+              <a:t>1/18/24</a:t>
             </a:fld>
             <a:endParaRPr lang="en-US"/>
           </a:p>
@@ -9520,7 +9520,7 @@
           <a:p>
             <a:fld id="{EC4347D3-4C9A-C240-8F14-750059DFEEB0}" type="datetimeFigureOut">
               <a:rPr lang="en-US" smtClean="0"/>
-              <a:t>1/16/24</a:t>
+              <a:t>1/18/24</a:t>
             </a:fld>
             <a:endParaRPr lang="en-US"/>
           </a:p>
@@ -9643,7 +9643,7 @@
           <a:noFill/>
           <a:extLst>
             <a:ext uri="{909E8E84-426E-40dd-AFC4-6F175D3DCCD1}">
-              <a14:hiddenFill xmlns:a14="http://schemas.microsoft.com/office/drawing/2010/main" xmlns="">
+              <a14:hiddenFill xmlns="" xmlns:a14="http://schemas.microsoft.com/office/drawing/2010/main">
                 <a:solidFill>
                   <a:srgbClr val="FFFFFF"/>
                 </a:solidFill>
@@ -9717,7 +9717,7 @@
               </a:ln>
               <a:extLst>
                 <a:ext uri="{91240B29-F687-4f45-9708-019B960494DF}">
-                  <a14:hiddenLine xmlns:a14="http://schemas.microsoft.com/office/drawing/2010/main" xmlns="" w="9525">
+                  <a14:hiddenLine xmlns="" xmlns:a14="http://schemas.microsoft.com/office/drawing/2010/main" w="9525">
                     <a:solidFill>
                       <a:srgbClr val="000000"/>
                     </a:solidFill>
@@ -9807,7 +9807,7 @@
               </a:ln>
               <a:extLst>
                 <a:ext uri="{91240B29-F687-4f45-9708-019B960494DF}">
-                  <a14:hiddenLine xmlns:a14="http://schemas.microsoft.com/office/drawing/2010/main" xmlns="" w="9525">
+                  <a14:hiddenLine xmlns="" xmlns:a14="http://schemas.microsoft.com/office/drawing/2010/main" w="9525">
                     <a:solidFill>
                       <a:srgbClr val="000000"/>
                     </a:solidFill>
@@ -9897,7 +9897,7 @@
               </a:ln>
               <a:extLst>
                 <a:ext uri="{91240B29-F687-4f45-9708-019B960494DF}">
-                  <a14:hiddenLine xmlns:a14="http://schemas.microsoft.com/office/drawing/2010/main" xmlns="" w="9525">
+                  <a14:hiddenLine xmlns="" xmlns:a14="http://schemas.microsoft.com/office/drawing/2010/main" w="9525">
                     <a:solidFill>
                       <a:srgbClr val="000000"/>
                     </a:solidFill>
@@ -9959,7 +9959,7 @@
               </a:ln>
               <a:extLst>
                 <a:ext uri="{91240B29-F687-4f45-9708-019B960494DF}">
-                  <a14:hiddenLine xmlns:a14="http://schemas.microsoft.com/office/drawing/2010/main" xmlns="" w="9525">
+                  <a14:hiddenLine xmlns="" xmlns:a14="http://schemas.microsoft.com/office/drawing/2010/main" w="9525">
                     <a:solidFill>
                       <a:srgbClr val="000000"/>
                     </a:solidFill>
@@ -10049,7 +10049,7 @@
               </a:ln>
               <a:extLst>
                 <a:ext uri="{91240B29-F687-4f45-9708-019B960494DF}">
-                  <a14:hiddenLine xmlns:a14="http://schemas.microsoft.com/office/drawing/2010/main" xmlns="" w="9525">
+                  <a14:hiddenLine xmlns="" xmlns:a14="http://schemas.microsoft.com/office/drawing/2010/main" w="9525">
                     <a:solidFill>
                       <a:srgbClr val="000000"/>
                     </a:solidFill>
@@ -10111,7 +10111,7 @@
               </a:ln>
               <a:extLst>
                 <a:ext uri="{91240B29-F687-4f45-9708-019B960494DF}">
-                  <a14:hiddenLine xmlns:a14="http://schemas.microsoft.com/office/drawing/2010/main" xmlns="" w="9525">
+                  <a14:hiddenLine xmlns="" xmlns:a14="http://schemas.microsoft.com/office/drawing/2010/main" w="9525">
                     <a:solidFill>
                       <a:srgbClr val="000000"/>
                     </a:solidFill>
@@ -10173,7 +10173,7 @@
               </a:ln>
               <a:extLst>
                 <a:ext uri="{91240B29-F687-4f45-9708-019B960494DF}">
-                  <a14:hiddenLine xmlns:a14="http://schemas.microsoft.com/office/drawing/2010/main" xmlns="" w="9525">
+                  <a14:hiddenLine xmlns="" xmlns:a14="http://schemas.microsoft.com/office/drawing/2010/main" w="9525">
                     <a:solidFill>
                       <a:srgbClr val="000000"/>
                     </a:solidFill>
@@ -10263,7 +10263,7 @@
               </a:ln>
               <a:extLst>
                 <a:ext uri="{91240B29-F687-4f45-9708-019B960494DF}">
-                  <a14:hiddenLine xmlns:a14="http://schemas.microsoft.com/office/drawing/2010/main" xmlns="" w="9525">
+                  <a14:hiddenLine xmlns="" xmlns:a14="http://schemas.microsoft.com/office/drawing/2010/main" w="9525">
                     <a:solidFill>
                       <a:srgbClr val="000000"/>
                     </a:solidFill>
@@ -10353,7 +10353,7 @@
               </a:ln>
               <a:extLst>
                 <a:ext uri="{91240B29-F687-4f45-9708-019B960494DF}">
-                  <a14:hiddenLine xmlns:a14="http://schemas.microsoft.com/office/drawing/2010/main" xmlns="" w="9525">
+                  <a14:hiddenLine xmlns="" xmlns:a14="http://schemas.microsoft.com/office/drawing/2010/main" w="9525">
                     <a:solidFill>
                       <a:srgbClr val="000000"/>
                     </a:solidFill>
@@ -10415,7 +10415,7 @@
               </a:ln>
               <a:extLst>
                 <a:ext uri="{91240B29-F687-4f45-9708-019B960494DF}">
-                  <a14:hiddenLine xmlns:a14="http://schemas.microsoft.com/office/drawing/2010/main" xmlns="" w="9525">
+                  <a14:hiddenLine xmlns="" xmlns:a14="http://schemas.microsoft.com/office/drawing/2010/main" w="9525">
                     <a:solidFill>
                       <a:srgbClr val="000000"/>
                     </a:solidFill>
@@ -10525,7 +10525,7 @@
               </a:ln>
               <a:extLst>
                 <a:ext uri="{91240B29-F687-4f45-9708-019B960494DF}">
-                  <a14:hiddenLine xmlns:a14="http://schemas.microsoft.com/office/drawing/2010/main" xmlns="" w="9525">
+                  <a14:hiddenLine xmlns="" xmlns:a14="http://schemas.microsoft.com/office/drawing/2010/main" w="9525">
                     <a:solidFill>
                       <a:srgbClr val="000000"/>
                     </a:solidFill>
@@ -10609,7 +10609,7 @@
               </a:ln>
               <a:extLst>
                 <a:ext uri="{91240B29-F687-4f45-9708-019B960494DF}">
-                  <a14:hiddenLine xmlns:a14="http://schemas.microsoft.com/office/drawing/2010/main" xmlns="" w="9525">
+                  <a14:hiddenLine xmlns="" xmlns:a14="http://schemas.microsoft.com/office/drawing/2010/main" w="9525">
                     <a:solidFill>
                       <a:srgbClr val="000000"/>
                     </a:solidFill>
@@ -10671,7 +10671,7 @@
               </a:ln>
               <a:extLst>
                 <a:ext uri="{91240B29-F687-4f45-9708-019B960494DF}">
-                  <a14:hiddenLine xmlns:a14="http://schemas.microsoft.com/office/drawing/2010/main" xmlns="" w="9525">
+                  <a14:hiddenLine xmlns="" xmlns:a14="http://schemas.microsoft.com/office/drawing/2010/main" w="9525">
                     <a:solidFill>
                       <a:srgbClr val="000000"/>
                     </a:solidFill>
@@ -10733,7 +10733,7 @@
               </a:ln>
               <a:extLst>
                 <a:ext uri="{91240B29-F687-4f45-9708-019B960494DF}">
-                  <a14:hiddenLine xmlns:a14="http://schemas.microsoft.com/office/drawing/2010/main" xmlns="" w="9525">
+                  <a14:hiddenLine xmlns="" xmlns:a14="http://schemas.microsoft.com/office/drawing/2010/main" w="9525">
                     <a:solidFill>
                       <a:srgbClr val="000000"/>
                     </a:solidFill>
@@ -10823,7 +10823,7 @@
               </a:ln>
               <a:extLst>
                 <a:ext uri="{91240B29-F687-4f45-9708-019B960494DF}">
-                  <a14:hiddenLine xmlns:a14="http://schemas.microsoft.com/office/drawing/2010/main" xmlns="" w="9525">
+                  <a14:hiddenLine xmlns="" xmlns:a14="http://schemas.microsoft.com/office/drawing/2010/main" w="9525">
                     <a:solidFill>
                       <a:srgbClr val="000000"/>
                     </a:solidFill>
@@ -10857,7 +10857,7 @@
               </a:ln>
               <a:extLst>
                 <a:ext uri="{91240B29-F687-4f45-9708-019B960494DF}">
-                  <a14:hiddenLine xmlns:a14="http://schemas.microsoft.com/office/drawing/2010/main" xmlns="" w="9525">
+                  <a14:hiddenLine xmlns="" xmlns:a14="http://schemas.microsoft.com/office/drawing/2010/main" w="9525">
                     <a:solidFill>
                       <a:srgbClr val="000000"/>
                     </a:solidFill>
@@ -10922,7 +10922,7 @@
               </a:ln>
               <a:extLst>
                 <a:ext uri="{91240B29-F687-4f45-9708-019B960494DF}">
-                  <a14:hiddenLine xmlns:a14="http://schemas.microsoft.com/office/drawing/2010/main" xmlns="" w="9525">
+                  <a14:hiddenLine xmlns="" xmlns:a14="http://schemas.microsoft.com/office/drawing/2010/main" w="9525">
                     <a:solidFill>
                       <a:srgbClr val="000000"/>
                     </a:solidFill>
@@ -11012,7 +11012,7 @@
               </a:ln>
               <a:extLst>
                 <a:ext uri="{91240B29-F687-4f45-9708-019B960494DF}">
-                  <a14:hiddenLine xmlns:a14="http://schemas.microsoft.com/office/drawing/2010/main" xmlns="" w="9525">
+                  <a14:hiddenLine xmlns="" xmlns:a14="http://schemas.microsoft.com/office/drawing/2010/main" w="9525">
                     <a:solidFill>
                       <a:srgbClr val="000000"/>
                     </a:solidFill>
@@ -11074,7 +11074,7 @@
               </a:ln>
               <a:extLst>
                 <a:ext uri="{91240B29-F687-4f45-9708-019B960494DF}">
-                  <a14:hiddenLine xmlns:a14="http://schemas.microsoft.com/office/drawing/2010/main" xmlns="" w="9525">
+                  <a14:hiddenLine xmlns="" xmlns:a14="http://schemas.microsoft.com/office/drawing/2010/main" w="9525">
                     <a:solidFill>
                       <a:srgbClr val="000000"/>
                     </a:solidFill>
@@ -11164,7 +11164,7 @@
               </a:ln>
               <a:extLst>
                 <a:ext uri="{91240B29-F687-4f45-9708-019B960494DF}">
-                  <a14:hiddenLine xmlns:a14="http://schemas.microsoft.com/office/drawing/2010/main" xmlns="" w="9525">
+                  <a14:hiddenLine xmlns="" xmlns:a14="http://schemas.microsoft.com/office/drawing/2010/main" w="9525">
                     <a:solidFill>
                       <a:srgbClr val="000000"/>
                     </a:solidFill>
@@ -11229,7 +11229,7 @@
               </a:ln>
               <a:extLst>
                 <a:ext uri="{91240B29-F687-4f45-9708-019B960494DF}">
-                  <a14:hiddenLine xmlns:a14="http://schemas.microsoft.com/office/drawing/2010/main" xmlns="" w="9525">
+                  <a14:hiddenLine xmlns="" xmlns:a14="http://schemas.microsoft.com/office/drawing/2010/main" w="9525">
                     <a:solidFill>
                       <a:srgbClr val="000000"/>
                     </a:solidFill>
@@ -11291,7 +11291,7 @@
               </a:ln>
               <a:extLst>
                 <a:ext uri="{91240B29-F687-4f45-9708-019B960494DF}">
-                  <a14:hiddenLine xmlns:a14="http://schemas.microsoft.com/office/drawing/2010/main" xmlns="" w="9525">
+                  <a14:hiddenLine xmlns="" xmlns:a14="http://schemas.microsoft.com/office/drawing/2010/main" w="9525">
                     <a:solidFill>
                       <a:srgbClr val="000000"/>
                     </a:solidFill>
@@ -11381,7 +11381,7 @@
               </a:ln>
               <a:extLst>
                 <a:ext uri="{91240B29-F687-4f45-9708-019B960494DF}">
-                  <a14:hiddenLine xmlns:a14="http://schemas.microsoft.com/office/drawing/2010/main" xmlns="" w="9525">
+                  <a14:hiddenLine xmlns="" xmlns:a14="http://schemas.microsoft.com/office/drawing/2010/main" w="9525">
                     <a:solidFill>
                       <a:srgbClr val="000000"/>
                     </a:solidFill>
@@ -11471,7 +11471,7 @@
               </a:ln>
               <a:extLst>
                 <a:ext uri="{91240B29-F687-4f45-9708-019B960494DF}">
-                  <a14:hiddenLine xmlns:a14="http://schemas.microsoft.com/office/drawing/2010/main" xmlns="" w="9525">
+                  <a14:hiddenLine xmlns="" xmlns:a14="http://schemas.microsoft.com/office/drawing/2010/main" w="9525">
                     <a:solidFill>
                       <a:srgbClr val="000000"/>
                     </a:solidFill>
@@ -11536,7 +11536,7 @@
               </a:ln>
               <a:extLst>
                 <a:ext uri="{91240B29-F687-4f45-9708-019B960494DF}">
-                  <a14:hiddenLine xmlns:a14="http://schemas.microsoft.com/office/drawing/2010/main" xmlns="" w="9525">
+                  <a14:hiddenLine xmlns="" xmlns:a14="http://schemas.microsoft.com/office/drawing/2010/main" w="9525">
                     <a:solidFill>
                       <a:srgbClr val="000000"/>
                     </a:solidFill>
@@ -11656,7 +11656,7 @@
               </a:ln>
               <a:extLst>
                 <a:ext uri="{91240B29-F687-4f45-9708-019B960494DF}">
-                  <a14:hiddenLine xmlns:a14="http://schemas.microsoft.com/office/drawing/2010/main" xmlns="" w="9525">
+                  <a14:hiddenLine xmlns="" xmlns:a14="http://schemas.microsoft.com/office/drawing/2010/main" w="9525">
                     <a:solidFill>
                       <a:srgbClr val="000000"/>
                     </a:solidFill>
@@ -11737,7 +11737,7 @@
               </a:ln>
               <a:extLst>
                 <a:ext uri="{91240B29-F687-4f45-9708-019B960494DF}">
-                  <a14:hiddenLine xmlns:a14="http://schemas.microsoft.com/office/drawing/2010/main" xmlns="" w="9525">
+                  <a14:hiddenLine xmlns="" xmlns:a14="http://schemas.microsoft.com/office/drawing/2010/main" w="9525">
                     <a:solidFill>
                       <a:srgbClr val="000000"/>
                     </a:solidFill>
@@ -11852,7 +11852,7 @@
               </a:ln>
               <a:extLst>
                 <a:ext uri="{91240B29-F687-4f45-9708-019B960494DF}">
-                  <a14:hiddenLine xmlns:a14="http://schemas.microsoft.com/office/drawing/2010/main" xmlns="" w="9525">
+                  <a14:hiddenLine xmlns="" xmlns:a14="http://schemas.microsoft.com/office/drawing/2010/main" w="9525">
                     <a:solidFill>
                       <a:srgbClr val="000000"/>
                     </a:solidFill>
@@ -11942,7 +11942,7 @@
               </a:ln>
               <a:extLst>
                 <a:ext uri="{91240B29-F687-4f45-9708-019B960494DF}">
-                  <a14:hiddenLine xmlns:a14="http://schemas.microsoft.com/office/drawing/2010/main" xmlns="" w="9525">
+                  <a14:hiddenLine xmlns="" xmlns:a14="http://schemas.microsoft.com/office/drawing/2010/main" w="9525">
                     <a:solidFill>
                       <a:srgbClr val="000000"/>
                     </a:solidFill>
@@ -12007,7 +12007,7 @@
               </a:ln>
               <a:extLst>
                 <a:ext uri="{91240B29-F687-4f45-9708-019B960494DF}">
-                  <a14:hiddenLine xmlns:a14="http://schemas.microsoft.com/office/drawing/2010/main" xmlns="" w="9525">
+                  <a14:hiddenLine xmlns="" xmlns:a14="http://schemas.microsoft.com/office/drawing/2010/main" w="9525">
                     <a:solidFill>
                       <a:srgbClr val="000000"/>
                     </a:solidFill>
@@ -12097,7 +12097,7 @@
               </a:ln>
               <a:extLst>
                 <a:ext uri="{91240B29-F687-4f45-9708-019B960494DF}">
-                  <a14:hiddenLine xmlns:a14="http://schemas.microsoft.com/office/drawing/2010/main" xmlns="" w="9525">
+                  <a14:hiddenLine xmlns="" xmlns:a14="http://schemas.microsoft.com/office/drawing/2010/main" w="9525">
                     <a:solidFill>
                       <a:srgbClr val="000000"/>
                     </a:solidFill>
@@ -12165,7 +12165,7 @@
               </a:ln>
               <a:extLst>
                 <a:ext uri="{91240B29-F687-4f45-9708-019B960494DF}">
-                  <a14:hiddenLine xmlns:a14="http://schemas.microsoft.com/office/drawing/2010/main" xmlns="" w="9525">
+                  <a14:hiddenLine xmlns="" xmlns:a14="http://schemas.microsoft.com/office/drawing/2010/main" w="9525">
                     <a:solidFill>
                       <a:srgbClr val="000000"/>
                     </a:solidFill>
@@ -12255,7 +12255,7 @@
               </a:ln>
               <a:extLst>
                 <a:ext uri="{91240B29-F687-4f45-9708-019B960494DF}">
-                  <a14:hiddenLine xmlns:a14="http://schemas.microsoft.com/office/drawing/2010/main" xmlns="" w="9525">
+                  <a14:hiddenLine xmlns="" xmlns:a14="http://schemas.microsoft.com/office/drawing/2010/main" w="9525">
                     <a:solidFill>
                       <a:srgbClr val="000000"/>
                     </a:solidFill>
@@ -12323,7 +12323,7 @@
               </a:ln>
               <a:extLst>
                 <a:ext uri="{91240B29-F687-4f45-9708-019B960494DF}">
-                  <a14:hiddenLine xmlns:a14="http://schemas.microsoft.com/office/drawing/2010/main" xmlns="" w="9525">
+                  <a14:hiddenLine xmlns="" xmlns:a14="http://schemas.microsoft.com/office/drawing/2010/main" w="9525">
                     <a:solidFill>
                       <a:srgbClr val="000000"/>
                     </a:solidFill>
@@ -12413,7 +12413,7 @@
               </a:ln>
               <a:extLst>
                 <a:ext uri="{91240B29-F687-4f45-9708-019B960494DF}">
-                  <a14:hiddenLine xmlns:a14="http://schemas.microsoft.com/office/drawing/2010/main" xmlns="" w="9525">
+                  <a14:hiddenLine xmlns="" xmlns:a14="http://schemas.microsoft.com/office/drawing/2010/main" w="9525">
                     <a:solidFill>
                       <a:srgbClr val="000000"/>
                     </a:solidFill>
@@ -12447,7 +12447,7 @@
               </a:ln>
               <a:extLst>
                 <a:ext uri="{91240B29-F687-4f45-9708-019B960494DF}">
-                  <a14:hiddenLine xmlns:a14="http://schemas.microsoft.com/office/drawing/2010/main" xmlns="" w="9525">
+                  <a14:hiddenLine xmlns="" xmlns:a14="http://schemas.microsoft.com/office/drawing/2010/main" w="9525">
                     <a:solidFill>
                       <a:srgbClr val="000000"/>
                     </a:solidFill>
@@ -12587,7 +12587,7 @@
           <a:p>
             <a:fld id="{EC4347D3-4C9A-C240-8F14-750059DFEEB0}" type="datetimeFigureOut">
               <a:rPr lang="en-US" smtClean="0"/>
-              <a:t>1/16/24</a:t>
+              <a:t>1/18/24</a:t>
             </a:fld>
             <a:endParaRPr lang="en-US"/>
           </a:p>
@@ -15095,7 +15095,7 @@
           <a:p>
             <a:r>
               <a:rPr lang="en-US" dirty="0"/>
-              <a:t>You can attempt all four retakes if you want, but the exams are designed for their to be enough time to do two (maybe three) retakes.</a:t>
+              <a:t>You can attempt all four retakes if you want, but the exams are designed for there to be enough time to do two (maybe three) retakes.</a:t>
             </a:r>
           </a:p>
         </p:txBody>
@@ -15601,7 +15601,7 @@
             <a:pPr lvl="1"/>
             <a:r>
               <a:rPr lang="en-US" dirty="0"/>
-              <a:t>Anyone can fill out an online form to request a three week extension. Extensions will be granted for any reason as long as you articulate why you need extra time and when you plan to finish the homework by.</a:t>
+              <a:t>Anyone can fill out an online form to request a 10 day week extension. Extensions will be granted for any reason as long as you articulate why you need extra time and when you plan to finish the homework by.</a:t>
             </a:r>
           </a:p>
           <a:p>

</xml_diff>

<commit_message>
bug in course intro
</commit_message>
<xml_diff>
--- a/slides/00-CourseIntroduction.pptx
+++ b/slides/00-CourseIntroduction.pptx
@@ -226,7 +226,7 @@
           <a:p>
             <a:fld id="{C5B45307-6ED4-B142-BD64-10F739779302}" type="datetimeFigureOut">
               <a:rPr lang="en-US" smtClean="0"/>
-              <a:t>1/18/24</a:t>
+              <a:t>3/18/24</a:t>
             </a:fld>
             <a:endParaRPr lang="en-US"/>
           </a:p>
@@ -729,7 +729,7 @@
           <a:noFill/>
           <a:extLst>
             <a:ext uri="{909E8E84-426E-40dd-AFC4-6F175D3DCCD1}">
-              <a14:hiddenFill xmlns="" xmlns:a14="http://schemas.microsoft.com/office/drawing/2010/main">
+              <a14:hiddenFill xmlns:a14="http://schemas.microsoft.com/office/drawing/2010/main" xmlns="">
                 <a:solidFill>
                   <a:srgbClr val="FFFFFF"/>
                 </a:solidFill>
@@ -788,7 +788,7 @@
             </a:ln>
             <a:extLst>
               <a:ext uri="{91240B29-F687-4f45-9708-019B960494DF}">
-                <a14:hiddenLine xmlns="" xmlns:a14="http://schemas.microsoft.com/office/drawing/2010/main" w="9525">
+                <a14:hiddenLine xmlns:a14="http://schemas.microsoft.com/office/drawing/2010/main" xmlns="" w="9525">
                   <a:solidFill>
                     <a:srgbClr val="000000"/>
                   </a:solidFill>
@@ -878,7 +878,7 @@
             </a:ln>
             <a:extLst>
               <a:ext uri="{91240B29-F687-4f45-9708-019B960494DF}">
-                <a14:hiddenLine xmlns="" xmlns:a14="http://schemas.microsoft.com/office/drawing/2010/main" w="9525">
+                <a14:hiddenLine xmlns:a14="http://schemas.microsoft.com/office/drawing/2010/main" xmlns="" w="9525">
                   <a:solidFill>
                     <a:srgbClr val="000000"/>
                   </a:solidFill>
@@ -968,7 +968,7 @@
             </a:ln>
             <a:extLst>
               <a:ext uri="{91240B29-F687-4f45-9708-019B960494DF}">
-                <a14:hiddenLine xmlns="" xmlns:a14="http://schemas.microsoft.com/office/drawing/2010/main" w="9525">
+                <a14:hiddenLine xmlns:a14="http://schemas.microsoft.com/office/drawing/2010/main" xmlns="" w="9525">
                   <a:solidFill>
                     <a:srgbClr val="000000"/>
                   </a:solidFill>
@@ -1002,7 +1002,7 @@
             </a:ln>
             <a:extLst>
               <a:ext uri="{91240B29-F687-4f45-9708-019B960494DF}">
-                <a14:hiddenLine xmlns="" xmlns:a14="http://schemas.microsoft.com/office/drawing/2010/main" w="9525">
+                <a14:hiddenLine xmlns:a14="http://schemas.microsoft.com/office/drawing/2010/main" xmlns="" w="9525">
                   <a:solidFill>
                     <a:srgbClr val="000000"/>
                   </a:solidFill>
@@ -1092,7 +1092,7 @@
             </a:ln>
             <a:extLst>
               <a:ext uri="{91240B29-F687-4f45-9708-019B960494DF}">
-                <a14:hiddenLine xmlns="" xmlns:a14="http://schemas.microsoft.com/office/drawing/2010/main" w="9525">
+                <a14:hiddenLine xmlns:a14="http://schemas.microsoft.com/office/drawing/2010/main" xmlns="" w="9525">
                   <a:solidFill>
                     <a:srgbClr val="000000"/>
                   </a:solidFill>
@@ -1154,7 +1154,7 @@
             </a:ln>
             <a:extLst>
               <a:ext uri="{91240B29-F687-4f45-9708-019B960494DF}">
-                <a14:hiddenLine xmlns="" xmlns:a14="http://schemas.microsoft.com/office/drawing/2010/main" w="9525">
+                <a14:hiddenLine xmlns:a14="http://schemas.microsoft.com/office/drawing/2010/main" xmlns="" w="9525">
                   <a:solidFill>
                     <a:srgbClr val="000000"/>
                   </a:solidFill>
@@ -1216,7 +1216,7 @@
             </a:ln>
             <a:extLst>
               <a:ext uri="{91240B29-F687-4f45-9708-019B960494DF}">
-                <a14:hiddenLine xmlns="" xmlns:a14="http://schemas.microsoft.com/office/drawing/2010/main" w="9525">
+                <a14:hiddenLine xmlns:a14="http://schemas.microsoft.com/office/drawing/2010/main" xmlns="" w="9525">
                   <a:solidFill>
                     <a:srgbClr val="000000"/>
                   </a:solidFill>
@@ -1306,7 +1306,7 @@
             </a:ln>
             <a:extLst>
               <a:ext uri="{91240B29-F687-4f45-9708-019B960494DF}">
-                <a14:hiddenLine xmlns="" xmlns:a14="http://schemas.microsoft.com/office/drawing/2010/main" w="9525">
+                <a14:hiddenLine xmlns:a14="http://schemas.microsoft.com/office/drawing/2010/main" xmlns="" w="9525">
                   <a:solidFill>
                     <a:srgbClr val="000000"/>
                   </a:solidFill>
@@ -1368,7 +1368,7 @@
             </a:ln>
             <a:extLst>
               <a:ext uri="{91240B29-F687-4f45-9708-019B960494DF}">
-                <a14:hiddenLine xmlns="" xmlns:a14="http://schemas.microsoft.com/office/drawing/2010/main" w="9525">
+                <a14:hiddenLine xmlns:a14="http://schemas.microsoft.com/office/drawing/2010/main" xmlns="" w="9525">
                   <a:solidFill>
                     <a:srgbClr val="000000"/>
                   </a:solidFill>
@@ -1430,7 +1430,7 @@
             </a:ln>
             <a:extLst>
               <a:ext uri="{91240B29-F687-4f45-9708-019B960494DF}">
-                <a14:hiddenLine xmlns="" xmlns:a14="http://schemas.microsoft.com/office/drawing/2010/main" w="9525">
+                <a14:hiddenLine xmlns:a14="http://schemas.microsoft.com/office/drawing/2010/main" xmlns="" w="9525">
                   <a:solidFill>
                     <a:srgbClr val="000000"/>
                   </a:solidFill>
@@ -1520,7 +1520,7 @@
             </a:ln>
             <a:extLst>
               <a:ext uri="{91240B29-F687-4f45-9708-019B960494DF}">
-                <a14:hiddenLine xmlns="" xmlns:a14="http://schemas.microsoft.com/office/drawing/2010/main" w="9525">
+                <a14:hiddenLine xmlns:a14="http://schemas.microsoft.com/office/drawing/2010/main" xmlns="" w="9525">
                   <a:solidFill>
                     <a:srgbClr val="000000"/>
                   </a:solidFill>
@@ -1610,7 +1610,7 @@
             </a:ln>
             <a:extLst>
               <a:ext uri="{91240B29-F687-4f45-9708-019B960494DF}">
-                <a14:hiddenLine xmlns="" xmlns:a14="http://schemas.microsoft.com/office/drawing/2010/main" w="9525">
+                <a14:hiddenLine xmlns:a14="http://schemas.microsoft.com/office/drawing/2010/main" xmlns="" w="9525">
                   <a:solidFill>
                     <a:srgbClr val="000000"/>
                   </a:solidFill>
@@ -1672,7 +1672,7 @@
             </a:ln>
             <a:extLst>
               <a:ext uri="{91240B29-F687-4f45-9708-019B960494DF}">
-                <a14:hiddenLine xmlns="" xmlns:a14="http://schemas.microsoft.com/office/drawing/2010/main" w="9525">
+                <a14:hiddenLine xmlns:a14="http://schemas.microsoft.com/office/drawing/2010/main" xmlns="" w="9525">
                   <a:solidFill>
                     <a:srgbClr val="000000"/>
                   </a:solidFill>
@@ -1782,7 +1782,7 @@
             </a:ln>
             <a:extLst>
               <a:ext uri="{91240B29-F687-4f45-9708-019B960494DF}">
-                <a14:hiddenLine xmlns="" xmlns:a14="http://schemas.microsoft.com/office/drawing/2010/main" w="9525">
+                <a14:hiddenLine xmlns:a14="http://schemas.microsoft.com/office/drawing/2010/main" xmlns="" w="9525">
                   <a:solidFill>
                     <a:srgbClr val="000000"/>
                   </a:solidFill>
@@ -1844,7 +1844,7 @@
             </a:ln>
             <a:extLst>
               <a:ext uri="{91240B29-F687-4f45-9708-019B960494DF}">
-                <a14:hiddenLine xmlns="" xmlns:a14="http://schemas.microsoft.com/office/drawing/2010/main" w="9525">
+                <a14:hiddenLine xmlns:a14="http://schemas.microsoft.com/office/drawing/2010/main" xmlns="" w="9525">
                   <a:solidFill>
                     <a:srgbClr val="000000"/>
                   </a:solidFill>
@@ -1934,7 +1934,7 @@
             </a:ln>
             <a:extLst>
               <a:ext uri="{91240B29-F687-4f45-9708-019B960494DF}">
-                <a14:hiddenLine xmlns="" xmlns:a14="http://schemas.microsoft.com/office/drawing/2010/main" w="9525">
+                <a14:hiddenLine xmlns:a14="http://schemas.microsoft.com/office/drawing/2010/main" xmlns="" w="9525">
                   <a:solidFill>
                     <a:srgbClr val="000000"/>
                   </a:solidFill>
@@ -2024,7 +2024,7 @@
             </a:ln>
             <a:extLst>
               <a:ext uri="{91240B29-F687-4f45-9708-019B960494DF}">
-                <a14:hiddenLine xmlns="" xmlns:a14="http://schemas.microsoft.com/office/drawing/2010/main" w="9525">
+                <a14:hiddenLine xmlns:a14="http://schemas.microsoft.com/office/drawing/2010/main" xmlns="" w="9525">
                   <a:solidFill>
                     <a:srgbClr val="000000"/>
                   </a:solidFill>
@@ -2086,7 +2086,7 @@
             </a:ln>
             <a:extLst>
               <a:ext uri="{91240B29-F687-4f45-9708-019B960494DF}">
-                <a14:hiddenLine xmlns="" xmlns:a14="http://schemas.microsoft.com/office/drawing/2010/main" w="9525">
+                <a14:hiddenLine xmlns:a14="http://schemas.microsoft.com/office/drawing/2010/main" xmlns="" w="9525">
                   <a:solidFill>
                     <a:srgbClr val="000000"/>
                   </a:solidFill>
@@ -2176,7 +2176,7 @@
             </a:ln>
             <a:extLst>
               <a:ext uri="{91240B29-F687-4f45-9708-019B960494DF}">
-                <a14:hiddenLine xmlns="" xmlns:a14="http://schemas.microsoft.com/office/drawing/2010/main" w="9525">
+                <a14:hiddenLine xmlns:a14="http://schemas.microsoft.com/office/drawing/2010/main" xmlns="" w="9525">
                   <a:solidFill>
                     <a:srgbClr val="000000"/>
                   </a:solidFill>
@@ -2266,7 +2266,7 @@
             </a:ln>
             <a:extLst>
               <a:ext uri="{91240B29-F687-4f45-9708-019B960494DF}">
-                <a14:hiddenLine xmlns="" xmlns:a14="http://schemas.microsoft.com/office/drawing/2010/main" w="9525">
+                <a14:hiddenLine xmlns:a14="http://schemas.microsoft.com/office/drawing/2010/main" xmlns="" w="9525">
                   <a:solidFill>
                     <a:srgbClr val="000000"/>
                   </a:solidFill>
@@ -2322,7 +2322,7 @@
             </a:ln>
             <a:extLst>
               <a:ext uri="{91240B29-F687-4f45-9708-019B960494DF}">
-                <a14:hiddenLine xmlns="" xmlns:a14="http://schemas.microsoft.com/office/drawing/2010/main" w="9525">
+                <a14:hiddenLine xmlns:a14="http://schemas.microsoft.com/office/drawing/2010/main" xmlns="" w="9525">
                   <a:solidFill>
                     <a:srgbClr val="000000"/>
                   </a:solidFill>
@@ -2412,7 +2412,7 @@
             </a:ln>
             <a:extLst>
               <a:ext uri="{91240B29-F687-4f45-9708-019B960494DF}">
-                <a14:hiddenLine xmlns="" xmlns:a14="http://schemas.microsoft.com/office/drawing/2010/main" w="9525">
+                <a14:hiddenLine xmlns:a14="http://schemas.microsoft.com/office/drawing/2010/main" xmlns="" w="9525">
                   <a:solidFill>
                     <a:srgbClr val="000000"/>
                   </a:solidFill>
@@ -2468,7 +2468,7 @@
             </a:ln>
             <a:extLst>
               <a:ext uri="{91240B29-F687-4f45-9708-019B960494DF}">
-                <a14:hiddenLine xmlns="" xmlns:a14="http://schemas.microsoft.com/office/drawing/2010/main" w="9525">
+                <a14:hiddenLine xmlns:a14="http://schemas.microsoft.com/office/drawing/2010/main" xmlns="" w="9525">
                   <a:solidFill>
                     <a:srgbClr val="000000"/>
                   </a:solidFill>
@@ -2558,7 +2558,7 @@
             </a:ln>
             <a:extLst>
               <a:ext uri="{91240B29-F687-4f45-9708-019B960494DF}">
-                <a14:hiddenLine xmlns="" xmlns:a14="http://schemas.microsoft.com/office/drawing/2010/main" w="9525">
+                <a14:hiddenLine xmlns:a14="http://schemas.microsoft.com/office/drawing/2010/main" xmlns="" w="9525">
                   <a:solidFill>
                     <a:srgbClr val="000000"/>
                   </a:solidFill>
@@ -2626,7 +2626,7 @@
             </a:ln>
             <a:extLst>
               <a:ext uri="{91240B29-F687-4f45-9708-019B960494DF}">
-                <a14:hiddenLine xmlns="" xmlns:a14="http://schemas.microsoft.com/office/drawing/2010/main" w="9525">
+                <a14:hiddenLine xmlns:a14="http://schemas.microsoft.com/office/drawing/2010/main" xmlns="" w="9525">
                   <a:solidFill>
                     <a:srgbClr val="000000"/>
                   </a:solidFill>
@@ -2716,7 +2716,7 @@
             </a:ln>
             <a:extLst>
               <a:ext uri="{91240B29-F687-4f45-9708-019B960494DF}">
-                <a14:hiddenLine xmlns="" xmlns:a14="http://schemas.microsoft.com/office/drawing/2010/main" w="9525">
+                <a14:hiddenLine xmlns:a14="http://schemas.microsoft.com/office/drawing/2010/main" xmlns="" w="9525">
                   <a:solidFill>
                     <a:srgbClr val="000000"/>
                   </a:solidFill>
@@ -2784,7 +2784,7 @@
             </a:ln>
             <a:extLst>
               <a:ext uri="{91240B29-F687-4f45-9708-019B960494DF}">
-                <a14:hiddenLine xmlns="" xmlns:a14="http://schemas.microsoft.com/office/drawing/2010/main" w="9525">
+                <a14:hiddenLine xmlns:a14="http://schemas.microsoft.com/office/drawing/2010/main" xmlns="" w="9525">
                   <a:solidFill>
                     <a:srgbClr val="000000"/>
                   </a:solidFill>
@@ -2874,7 +2874,7 @@
             </a:ln>
             <a:extLst>
               <a:ext uri="{91240B29-F687-4f45-9708-019B960494DF}">
-                <a14:hiddenLine xmlns="" xmlns:a14="http://schemas.microsoft.com/office/drawing/2010/main" w="9525">
+                <a14:hiddenLine xmlns:a14="http://schemas.microsoft.com/office/drawing/2010/main" xmlns="" w="9525">
                   <a:solidFill>
                     <a:srgbClr val="000000"/>
                   </a:solidFill>
@@ -2908,7 +2908,7 @@
             </a:ln>
             <a:extLst>
               <a:ext uri="{91240B29-F687-4f45-9708-019B960494DF}">
-                <a14:hiddenLine xmlns="" xmlns:a14="http://schemas.microsoft.com/office/drawing/2010/main" w="9525">
+                <a14:hiddenLine xmlns:a14="http://schemas.microsoft.com/office/drawing/2010/main" xmlns="" w="9525">
                   <a:solidFill>
                     <a:srgbClr val="000000"/>
                   </a:solidFill>
@@ -2998,7 +2998,7 @@
             </a:ln>
             <a:extLst>
               <a:ext uri="{91240B29-F687-4f45-9708-019B960494DF}">
-                <a14:hiddenLine xmlns="" xmlns:a14="http://schemas.microsoft.com/office/drawing/2010/main" w="9525">
+                <a14:hiddenLine xmlns:a14="http://schemas.microsoft.com/office/drawing/2010/main" xmlns="" w="9525">
                   <a:solidFill>
                     <a:srgbClr val="000000"/>
                   </a:solidFill>
@@ -3060,7 +3060,7 @@
             </a:ln>
             <a:extLst>
               <a:ext uri="{91240B29-F687-4f45-9708-019B960494DF}">
-                <a14:hiddenLine xmlns="" xmlns:a14="http://schemas.microsoft.com/office/drawing/2010/main" w="9525">
+                <a14:hiddenLine xmlns:a14="http://schemas.microsoft.com/office/drawing/2010/main" xmlns="" w="9525">
                   <a:solidFill>
                     <a:srgbClr val="000000"/>
                   </a:solidFill>
@@ -3122,7 +3122,7 @@
             </a:ln>
             <a:extLst>
               <a:ext uri="{91240B29-F687-4f45-9708-019B960494DF}">
-                <a14:hiddenLine xmlns="" xmlns:a14="http://schemas.microsoft.com/office/drawing/2010/main" w="9525">
+                <a14:hiddenLine xmlns:a14="http://schemas.microsoft.com/office/drawing/2010/main" xmlns="" w="9525">
                   <a:solidFill>
                     <a:srgbClr val="000000"/>
                   </a:solidFill>
@@ -3212,7 +3212,7 @@
             </a:ln>
             <a:extLst>
               <a:ext uri="{91240B29-F687-4f45-9708-019B960494DF}">
-                <a14:hiddenLine xmlns="" xmlns:a14="http://schemas.microsoft.com/office/drawing/2010/main" w="9525">
+                <a14:hiddenLine xmlns:a14="http://schemas.microsoft.com/office/drawing/2010/main" xmlns="" w="9525">
                   <a:solidFill>
                     <a:srgbClr val="000000"/>
                   </a:solidFill>
@@ -3280,7 +3280,7 @@
             </a:ln>
             <a:extLst>
               <a:ext uri="{91240B29-F687-4f45-9708-019B960494DF}">
-                <a14:hiddenLine xmlns="" xmlns:a14="http://schemas.microsoft.com/office/drawing/2010/main" w="9525">
+                <a14:hiddenLine xmlns:a14="http://schemas.microsoft.com/office/drawing/2010/main" xmlns="" w="9525">
                   <a:solidFill>
                     <a:srgbClr val="000000"/>
                   </a:solidFill>
@@ -3342,7 +3342,7 @@
             </a:ln>
             <a:extLst>
               <a:ext uri="{91240B29-F687-4f45-9708-019B960494DF}">
-                <a14:hiddenLine xmlns="" xmlns:a14="http://schemas.microsoft.com/office/drawing/2010/main" w="9525">
+                <a14:hiddenLine xmlns:a14="http://schemas.microsoft.com/office/drawing/2010/main" xmlns="" w="9525">
                   <a:solidFill>
                     <a:srgbClr val="000000"/>
                   </a:solidFill>
@@ -3432,7 +3432,7 @@
             </a:ln>
             <a:extLst>
               <a:ext uri="{91240B29-F687-4f45-9708-019B960494DF}">
-                <a14:hiddenLine xmlns="" xmlns:a14="http://schemas.microsoft.com/office/drawing/2010/main" w="9525">
+                <a14:hiddenLine xmlns:a14="http://schemas.microsoft.com/office/drawing/2010/main" xmlns="" w="9525">
                   <a:solidFill>
                     <a:srgbClr val="000000"/>
                   </a:solidFill>
@@ -3494,7 +3494,7 @@
             </a:ln>
             <a:extLst>
               <a:ext uri="{91240B29-F687-4f45-9708-019B960494DF}">
-                <a14:hiddenLine xmlns="" xmlns:a14="http://schemas.microsoft.com/office/drawing/2010/main" w="9525">
+                <a14:hiddenLine xmlns:a14="http://schemas.microsoft.com/office/drawing/2010/main" xmlns="" w="9525">
                   <a:solidFill>
                     <a:srgbClr val="000000"/>
                   </a:solidFill>
@@ -3584,7 +3584,7 @@
             </a:ln>
             <a:extLst>
               <a:ext uri="{91240B29-F687-4f45-9708-019B960494DF}">
-                <a14:hiddenLine xmlns="" xmlns:a14="http://schemas.microsoft.com/office/drawing/2010/main" w="9525">
+                <a14:hiddenLine xmlns:a14="http://schemas.microsoft.com/office/drawing/2010/main" xmlns="" w="9525">
                   <a:solidFill>
                     <a:srgbClr val="000000"/>
                   </a:solidFill>
@@ -3646,7 +3646,7 @@
             </a:ln>
             <a:extLst>
               <a:ext uri="{91240B29-F687-4f45-9708-019B960494DF}">
-                <a14:hiddenLine xmlns="" xmlns:a14="http://schemas.microsoft.com/office/drawing/2010/main" w="9525">
+                <a14:hiddenLine xmlns:a14="http://schemas.microsoft.com/office/drawing/2010/main" xmlns="" w="9525">
                   <a:solidFill>
                     <a:srgbClr val="000000"/>
                   </a:solidFill>
@@ -3736,7 +3736,7 @@
             </a:ln>
             <a:extLst>
               <a:ext uri="{91240B29-F687-4f45-9708-019B960494DF}">
-                <a14:hiddenLine xmlns="" xmlns:a14="http://schemas.microsoft.com/office/drawing/2010/main" w="9525">
+                <a14:hiddenLine xmlns:a14="http://schemas.microsoft.com/office/drawing/2010/main" xmlns="" w="9525">
                   <a:solidFill>
                     <a:srgbClr val="000000"/>
                   </a:solidFill>
@@ -3770,7 +3770,7 @@
             </a:ln>
             <a:extLst>
               <a:ext uri="{91240B29-F687-4f45-9708-019B960494DF}">
-                <a14:hiddenLine xmlns="" xmlns:a14="http://schemas.microsoft.com/office/drawing/2010/main" w="9525">
+                <a14:hiddenLine xmlns:a14="http://schemas.microsoft.com/office/drawing/2010/main" xmlns="" w="9525">
                   <a:solidFill>
                     <a:srgbClr val="000000"/>
                   </a:solidFill>
@@ -3835,7 +3835,7 @@
             </a:ln>
             <a:extLst>
               <a:ext uri="{91240B29-F687-4f45-9708-019B960494DF}">
-                <a14:hiddenLine xmlns="" xmlns:a14="http://schemas.microsoft.com/office/drawing/2010/main" w="9525">
+                <a14:hiddenLine xmlns:a14="http://schemas.microsoft.com/office/drawing/2010/main" xmlns="" w="9525">
                   <a:solidFill>
                     <a:srgbClr val="000000"/>
                   </a:solidFill>
@@ -3925,7 +3925,7 @@
             </a:ln>
             <a:extLst>
               <a:ext uri="{91240B29-F687-4f45-9708-019B960494DF}">
-                <a14:hiddenLine xmlns="" xmlns:a14="http://schemas.microsoft.com/office/drawing/2010/main" w="9525">
+                <a14:hiddenLine xmlns:a14="http://schemas.microsoft.com/office/drawing/2010/main" xmlns="" w="9525">
                   <a:solidFill>
                     <a:srgbClr val="000000"/>
                   </a:solidFill>
@@ -3987,7 +3987,7 @@
             </a:ln>
             <a:extLst>
               <a:ext uri="{91240B29-F687-4f45-9708-019B960494DF}">
-                <a14:hiddenLine xmlns="" xmlns:a14="http://schemas.microsoft.com/office/drawing/2010/main" w="9525">
+                <a14:hiddenLine xmlns:a14="http://schemas.microsoft.com/office/drawing/2010/main" xmlns="" w="9525">
                   <a:solidFill>
                     <a:srgbClr val="000000"/>
                   </a:solidFill>
@@ -4077,7 +4077,7 @@
             </a:ln>
             <a:extLst>
               <a:ext uri="{91240B29-F687-4f45-9708-019B960494DF}">
-                <a14:hiddenLine xmlns="" xmlns:a14="http://schemas.microsoft.com/office/drawing/2010/main" w="9525">
+                <a14:hiddenLine xmlns:a14="http://schemas.microsoft.com/office/drawing/2010/main" xmlns="" w="9525">
                   <a:solidFill>
                     <a:srgbClr val="000000"/>
                   </a:solidFill>
@@ -4167,7 +4167,7 @@
             </a:ln>
             <a:extLst>
               <a:ext uri="{91240B29-F687-4f45-9708-019B960494DF}">
-                <a14:hiddenLine xmlns="" xmlns:a14="http://schemas.microsoft.com/office/drawing/2010/main" w="9525">
+                <a14:hiddenLine xmlns:a14="http://schemas.microsoft.com/office/drawing/2010/main" xmlns="" w="9525">
                   <a:solidFill>
                     <a:srgbClr val="000000"/>
                   </a:solidFill>
@@ -4232,7 +4232,7 @@
             </a:ln>
             <a:extLst>
               <a:ext uri="{91240B29-F687-4f45-9708-019B960494DF}">
-                <a14:hiddenLine xmlns="" xmlns:a14="http://schemas.microsoft.com/office/drawing/2010/main" w="9525">
+                <a14:hiddenLine xmlns:a14="http://schemas.microsoft.com/office/drawing/2010/main" xmlns="" w="9525">
                   <a:solidFill>
                     <a:srgbClr val="000000"/>
                   </a:solidFill>
@@ -4294,7 +4294,7 @@
             </a:ln>
             <a:extLst>
               <a:ext uri="{91240B29-F687-4f45-9708-019B960494DF}">
-                <a14:hiddenLine xmlns="" xmlns:a14="http://schemas.microsoft.com/office/drawing/2010/main" w="9525">
+                <a14:hiddenLine xmlns:a14="http://schemas.microsoft.com/office/drawing/2010/main" xmlns="" w="9525">
                   <a:solidFill>
                     <a:srgbClr val="000000"/>
                   </a:solidFill>
@@ -4384,7 +4384,7 @@
             </a:ln>
             <a:extLst>
               <a:ext uri="{91240B29-F687-4f45-9708-019B960494DF}">
-                <a14:hiddenLine xmlns="" xmlns:a14="http://schemas.microsoft.com/office/drawing/2010/main" w="9525">
+                <a14:hiddenLine xmlns:a14="http://schemas.microsoft.com/office/drawing/2010/main" xmlns="" w="9525">
                   <a:solidFill>
                     <a:srgbClr val="000000"/>
                   </a:solidFill>
@@ -4474,7 +4474,7 @@
             </a:ln>
             <a:extLst>
               <a:ext uri="{91240B29-F687-4f45-9708-019B960494DF}">
-                <a14:hiddenLine xmlns="" xmlns:a14="http://schemas.microsoft.com/office/drawing/2010/main" w="9525">
+                <a14:hiddenLine xmlns:a14="http://schemas.microsoft.com/office/drawing/2010/main" xmlns="" w="9525">
                   <a:solidFill>
                     <a:srgbClr val="000000"/>
                   </a:solidFill>
@@ -4536,7 +4536,7 @@
             </a:ln>
             <a:extLst>
               <a:ext uri="{91240B29-F687-4f45-9708-019B960494DF}">
-                <a14:hiddenLine xmlns="" xmlns:a14="http://schemas.microsoft.com/office/drawing/2010/main" w="9525">
+                <a14:hiddenLine xmlns:a14="http://schemas.microsoft.com/office/drawing/2010/main" xmlns="" w="9525">
                   <a:solidFill>
                     <a:srgbClr val="000000"/>
                   </a:solidFill>
@@ -4656,7 +4656,7 @@
             </a:ln>
             <a:extLst>
               <a:ext uri="{91240B29-F687-4f45-9708-019B960494DF}">
-                <a14:hiddenLine xmlns="" xmlns:a14="http://schemas.microsoft.com/office/drawing/2010/main" w="9525">
+                <a14:hiddenLine xmlns:a14="http://schemas.microsoft.com/office/drawing/2010/main" xmlns="" w="9525">
                   <a:solidFill>
                     <a:srgbClr val="000000"/>
                   </a:solidFill>
@@ -4724,7 +4724,7 @@
             </a:ln>
             <a:extLst>
               <a:ext uri="{91240B29-F687-4f45-9708-019B960494DF}">
-                <a14:hiddenLine xmlns="" xmlns:a14="http://schemas.microsoft.com/office/drawing/2010/main" w="9525">
+                <a14:hiddenLine xmlns:a14="http://schemas.microsoft.com/office/drawing/2010/main" xmlns="" w="9525">
                   <a:solidFill>
                     <a:srgbClr val="000000"/>
                   </a:solidFill>
@@ -4814,7 +4814,7 @@
             </a:ln>
             <a:extLst>
               <a:ext uri="{91240B29-F687-4f45-9708-019B960494DF}">
-                <a14:hiddenLine xmlns="" xmlns:a14="http://schemas.microsoft.com/office/drawing/2010/main" w="9525">
+                <a14:hiddenLine xmlns:a14="http://schemas.microsoft.com/office/drawing/2010/main" xmlns="" w="9525">
                   <a:solidFill>
                     <a:srgbClr val="000000"/>
                   </a:solidFill>
@@ -4954,7 +4954,7 @@
           <a:p>
             <a:fld id="{EC4347D3-4C9A-C240-8F14-750059DFEEB0}" type="datetimeFigureOut">
               <a:rPr lang="en-US" smtClean="0"/>
-              <a:t>1/18/24</a:t>
+              <a:t>3/18/24</a:t>
             </a:fld>
             <a:endParaRPr lang="en-US"/>
           </a:p>
@@ -5221,7 +5221,7 @@
           <a:p>
             <a:fld id="{EC4347D3-4C9A-C240-8F14-750059DFEEB0}" type="datetimeFigureOut">
               <a:rPr lang="en-US" smtClean="0"/>
-              <a:t>1/18/24</a:t>
+              <a:t>3/18/24</a:t>
             </a:fld>
             <a:endParaRPr lang="en-US"/>
           </a:p>
@@ -5417,7 +5417,7 @@
           <a:p>
             <a:fld id="{EC4347D3-4C9A-C240-8F14-750059DFEEB0}" type="datetimeFigureOut">
               <a:rPr lang="en-US" smtClean="0"/>
-              <a:t>1/18/24</a:t>
+              <a:t>3/18/24</a:t>
             </a:fld>
             <a:endParaRPr lang="en-US"/>
           </a:p>
@@ -5680,7 +5680,7 @@
           <a:p>
             <a:fld id="{EC4347D3-4C9A-C240-8F14-750059DFEEB0}" type="datetimeFigureOut">
               <a:rPr lang="en-US" smtClean="0"/>
-              <a:t>1/18/24</a:t>
+              <a:t>3/18/24</a:t>
             </a:fld>
             <a:endParaRPr lang="en-US"/>
           </a:p>
@@ -6114,7 +6114,7 @@
           <a:p>
             <a:fld id="{EC4347D3-4C9A-C240-8F14-750059DFEEB0}" type="datetimeFigureOut">
               <a:rPr lang="en-US" smtClean="0"/>
-              <a:t>1/18/24</a:t>
+              <a:t>3/18/24</a:t>
             </a:fld>
             <a:endParaRPr lang="en-US"/>
           </a:p>
@@ -6660,7 +6660,7 @@
           <a:p>
             <a:fld id="{EC4347D3-4C9A-C240-8F14-750059DFEEB0}" type="datetimeFigureOut">
               <a:rPr lang="en-US" smtClean="0"/>
-              <a:t>1/18/24</a:t>
+              <a:t>3/18/24</a:t>
             </a:fld>
             <a:endParaRPr lang="en-US"/>
           </a:p>
@@ -7380,7 +7380,7 @@
           <a:p>
             <a:fld id="{EC4347D3-4C9A-C240-8F14-750059DFEEB0}" type="datetimeFigureOut">
               <a:rPr lang="en-US" smtClean="0"/>
-              <a:t>1/18/24</a:t>
+              <a:t>3/18/24</a:t>
             </a:fld>
             <a:endParaRPr lang="en-US"/>
           </a:p>
@@ -7550,7 +7550,7 @@
           <a:p>
             <a:fld id="{EC4347D3-4C9A-C240-8F14-750059DFEEB0}" type="datetimeFigureOut">
               <a:rPr lang="en-US" smtClean="0"/>
-              <a:t>1/18/24</a:t>
+              <a:t>3/18/24</a:t>
             </a:fld>
             <a:endParaRPr lang="en-US"/>
           </a:p>
@@ -7730,7 +7730,7 @@
           <a:p>
             <a:fld id="{EC4347D3-4C9A-C240-8F14-750059DFEEB0}" type="datetimeFigureOut">
               <a:rPr lang="en-US" smtClean="0"/>
-              <a:t>1/18/24</a:t>
+              <a:t>3/18/24</a:t>
             </a:fld>
             <a:endParaRPr lang="en-US"/>
           </a:p>
@@ -7900,7 +7900,7 @@
           <a:p>
             <a:fld id="{EC4347D3-4C9A-C240-8F14-750059DFEEB0}" type="datetimeFigureOut">
               <a:rPr lang="en-US" smtClean="0"/>
-              <a:t>1/18/24</a:t>
+              <a:t>3/18/24</a:t>
             </a:fld>
             <a:endParaRPr lang="en-US"/>
           </a:p>
@@ -8150,7 +8150,7 @@
           <a:p>
             <a:fld id="{EC4347D3-4C9A-C240-8F14-750059DFEEB0}" type="datetimeFigureOut">
               <a:rPr lang="en-US" smtClean="0"/>
-              <a:t>1/18/24</a:t>
+              <a:t>3/18/24</a:t>
             </a:fld>
             <a:endParaRPr lang="en-US"/>
           </a:p>
@@ -8382,7 +8382,7 @@
           <a:p>
             <a:fld id="{EC4347D3-4C9A-C240-8F14-750059DFEEB0}" type="datetimeFigureOut">
               <a:rPr lang="en-US" smtClean="0"/>
-              <a:t>1/18/24</a:t>
+              <a:t>3/18/24</a:t>
             </a:fld>
             <a:endParaRPr lang="en-US"/>
           </a:p>
@@ -8768,7 +8768,7 @@
           <a:p>
             <a:fld id="{EC4347D3-4C9A-C240-8F14-750059DFEEB0}" type="datetimeFigureOut">
               <a:rPr lang="en-US" smtClean="0"/>
-              <a:t>1/18/24</a:t>
+              <a:t>3/18/24</a:t>
             </a:fld>
             <a:endParaRPr lang="en-US"/>
           </a:p>
@@ -8891,7 +8891,7 @@
           <a:p>
             <a:fld id="{EC4347D3-4C9A-C240-8F14-750059DFEEB0}" type="datetimeFigureOut">
               <a:rPr lang="en-US" smtClean="0"/>
-              <a:t>1/18/24</a:t>
+              <a:t>3/18/24</a:t>
             </a:fld>
             <a:endParaRPr lang="en-US"/>
           </a:p>
@@ -8986,7 +8986,7 @@
           <a:p>
             <a:fld id="{EC4347D3-4C9A-C240-8F14-750059DFEEB0}" type="datetimeFigureOut">
               <a:rPr lang="en-US" smtClean="0"/>
-              <a:t>1/18/24</a:t>
+              <a:t>3/18/24</a:t>
             </a:fld>
             <a:endParaRPr lang="en-US"/>
           </a:p>
@@ -9235,7 +9235,7 @@
           <a:p>
             <a:fld id="{EC4347D3-4C9A-C240-8F14-750059DFEEB0}" type="datetimeFigureOut">
               <a:rPr lang="en-US" smtClean="0"/>
-              <a:t>1/18/24</a:t>
+              <a:t>3/18/24</a:t>
             </a:fld>
             <a:endParaRPr lang="en-US"/>
           </a:p>
@@ -9520,7 +9520,7 @@
           <a:p>
             <a:fld id="{EC4347D3-4C9A-C240-8F14-750059DFEEB0}" type="datetimeFigureOut">
               <a:rPr lang="en-US" smtClean="0"/>
-              <a:t>1/18/24</a:t>
+              <a:t>3/18/24</a:t>
             </a:fld>
             <a:endParaRPr lang="en-US"/>
           </a:p>
@@ -9643,7 +9643,7 @@
           <a:noFill/>
           <a:extLst>
             <a:ext uri="{909E8E84-426E-40dd-AFC4-6F175D3DCCD1}">
-              <a14:hiddenFill xmlns="" xmlns:a14="http://schemas.microsoft.com/office/drawing/2010/main">
+              <a14:hiddenFill xmlns:a14="http://schemas.microsoft.com/office/drawing/2010/main" xmlns="">
                 <a:solidFill>
                   <a:srgbClr val="FFFFFF"/>
                 </a:solidFill>
@@ -9717,7 +9717,7 @@
               </a:ln>
               <a:extLst>
                 <a:ext uri="{91240B29-F687-4f45-9708-019B960494DF}">
-                  <a14:hiddenLine xmlns="" xmlns:a14="http://schemas.microsoft.com/office/drawing/2010/main" w="9525">
+                  <a14:hiddenLine xmlns:a14="http://schemas.microsoft.com/office/drawing/2010/main" xmlns="" w="9525">
                     <a:solidFill>
                       <a:srgbClr val="000000"/>
                     </a:solidFill>
@@ -9807,7 +9807,7 @@
               </a:ln>
               <a:extLst>
                 <a:ext uri="{91240B29-F687-4f45-9708-019B960494DF}">
-                  <a14:hiddenLine xmlns="" xmlns:a14="http://schemas.microsoft.com/office/drawing/2010/main" w="9525">
+                  <a14:hiddenLine xmlns:a14="http://schemas.microsoft.com/office/drawing/2010/main" xmlns="" w="9525">
                     <a:solidFill>
                       <a:srgbClr val="000000"/>
                     </a:solidFill>
@@ -9897,7 +9897,7 @@
               </a:ln>
               <a:extLst>
                 <a:ext uri="{91240B29-F687-4f45-9708-019B960494DF}">
-                  <a14:hiddenLine xmlns="" xmlns:a14="http://schemas.microsoft.com/office/drawing/2010/main" w="9525">
+                  <a14:hiddenLine xmlns:a14="http://schemas.microsoft.com/office/drawing/2010/main" xmlns="" w="9525">
                     <a:solidFill>
                       <a:srgbClr val="000000"/>
                     </a:solidFill>
@@ -9959,7 +9959,7 @@
               </a:ln>
               <a:extLst>
                 <a:ext uri="{91240B29-F687-4f45-9708-019B960494DF}">
-                  <a14:hiddenLine xmlns="" xmlns:a14="http://schemas.microsoft.com/office/drawing/2010/main" w="9525">
+                  <a14:hiddenLine xmlns:a14="http://schemas.microsoft.com/office/drawing/2010/main" xmlns="" w="9525">
                     <a:solidFill>
                       <a:srgbClr val="000000"/>
                     </a:solidFill>
@@ -10049,7 +10049,7 @@
               </a:ln>
               <a:extLst>
                 <a:ext uri="{91240B29-F687-4f45-9708-019B960494DF}">
-                  <a14:hiddenLine xmlns="" xmlns:a14="http://schemas.microsoft.com/office/drawing/2010/main" w="9525">
+                  <a14:hiddenLine xmlns:a14="http://schemas.microsoft.com/office/drawing/2010/main" xmlns="" w="9525">
                     <a:solidFill>
                       <a:srgbClr val="000000"/>
                     </a:solidFill>
@@ -10111,7 +10111,7 @@
               </a:ln>
               <a:extLst>
                 <a:ext uri="{91240B29-F687-4f45-9708-019B960494DF}">
-                  <a14:hiddenLine xmlns="" xmlns:a14="http://schemas.microsoft.com/office/drawing/2010/main" w="9525">
+                  <a14:hiddenLine xmlns:a14="http://schemas.microsoft.com/office/drawing/2010/main" xmlns="" w="9525">
                     <a:solidFill>
                       <a:srgbClr val="000000"/>
                     </a:solidFill>
@@ -10173,7 +10173,7 @@
               </a:ln>
               <a:extLst>
                 <a:ext uri="{91240B29-F687-4f45-9708-019B960494DF}">
-                  <a14:hiddenLine xmlns="" xmlns:a14="http://schemas.microsoft.com/office/drawing/2010/main" w="9525">
+                  <a14:hiddenLine xmlns:a14="http://schemas.microsoft.com/office/drawing/2010/main" xmlns="" w="9525">
                     <a:solidFill>
                       <a:srgbClr val="000000"/>
                     </a:solidFill>
@@ -10263,7 +10263,7 @@
               </a:ln>
               <a:extLst>
                 <a:ext uri="{91240B29-F687-4f45-9708-019B960494DF}">
-                  <a14:hiddenLine xmlns="" xmlns:a14="http://schemas.microsoft.com/office/drawing/2010/main" w="9525">
+                  <a14:hiddenLine xmlns:a14="http://schemas.microsoft.com/office/drawing/2010/main" xmlns="" w="9525">
                     <a:solidFill>
                       <a:srgbClr val="000000"/>
                     </a:solidFill>
@@ -10353,7 +10353,7 @@
               </a:ln>
               <a:extLst>
                 <a:ext uri="{91240B29-F687-4f45-9708-019B960494DF}">
-                  <a14:hiddenLine xmlns="" xmlns:a14="http://schemas.microsoft.com/office/drawing/2010/main" w="9525">
+                  <a14:hiddenLine xmlns:a14="http://schemas.microsoft.com/office/drawing/2010/main" xmlns="" w="9525">
                     <a:solidFill>
                       <a:srgbClr val="000000"/>
                     </a:solidFill>
@@ -10415,7 +10415,7 @@
               </a:ln>
               <a:extLst>
                 <a:ext uri="{91240B29-F687-4f45-9708-019B960494DF}">
-                  <a14:hiddenLine xmlns="" xmlns:a14="http://schemas.microsoft.com/office/drawing/2010/main" w="9525">
+                  <a14:hiddenLine xmlns:a14="http://schemas.microsoft.com/office/drawing/2010/main" xmlns="" w="9525">
                     <a:solidFill>
                       <a:srgbClr val="000000"/>
                     </a:solidFill>
@@ -10525,7 +10525,7 @@
               </a:ln>
               <a:extLst>
                 <a:ext uri="{91240B29-F687-4f45-9708-019B960494DF}">
-                  <a14:hiddenLine xmlns="" xmlns:a14="http://schemas.microsoft.com/office/drawing/2010/main" w="9525">
+                  <a14:hiddenLine xmlns:a14="http://schemas.microsoft.com/office/drawing/2010/main" xmlns="" w="9525">
                     <a:solidFill>
                       <a:srgbClr val="000000"/>
                     </a:solidFill>
@@ -10609,7 +10609,7 @@
               </a:ln>
               <a:extLst>
                 <a:ext uri="{91240B29-F687-4f45-9708-019B960494DF}">
-                  <a14:hiddenLine xmlns="" xmlns:a14="http://schemas.microsoft.com/office/drawing/2010/main" w="9525">
+                  <a14:hiddenLine xmlns:a14="http://schemas.microsoft.com/office/drawing/2010/main" xmlns="" w="9525">
                     <a:solidFill>
                       <a:srgbClr val="000000"/>
                     </a:solidFill>
@@ -10671,7 +10671,7 @@
               </a:ln>
               <a:extLst>
                 <a:ext uri="{91240B29-F687-4f45-9708-019B960494DF}">
-                  <a14:hiddenLine xmlns="" xmlns:a14="http://schemas.microsoft.com/office/drawing/2010/main" w="9525">
+                  <a14:hiddenLine xmlns:a14="http://schemas.microsoft.com/office/drawing/2010/main" xmlns="" w="9525">
                     <a:solidFill>
                       <a:srgbClr val="000000"/>
                     </a:solidFill>
@@ -10733,7 +10733,7 @@
               </a:ln>
               <a:extLst>
                 <a:ext uri="{91240B29-F687-4f45-9708-019B960494DF}">
-                  <a14:hiddenLine xmlns="" xmlns:a14="http://schemas.microsoft.com/office/drawing/2010/main" w="9525">
+                  <a14:hiddenLine xmlns:a14="http://schemas.microsoft.com/office/drawing/2010/main" xmlns="" w="9525">
                     <a:solidFill>
                       <a:srgbClr val="000000"/>
                     </a:solidFill>
@@ -10823,7 +10823,7 @@
               </a:ln>
               <a:extLst>
                 <a:ext uri="{91240B29-F687-4f45-9708-019B960494DF}">
-                  <a14:hiddenLine xmlns="" xmlns:a14="http://schemas.microsoft.com/office/drawing/2010/main" w="9525">
+                  <a14:hiddenLine xmlns:a14="http://schemas.microsoft.com/office/drawing/2010/main" xmlns="" w="9525">
                     <a:solidFill>
                       <a:srgbClr val="000000"/>
                     </a:solidFill>
@@ -10857,7 +10857,7 @@
               </a:ln>
               <a:extLst>
                 <a:ext uri="{91240B29-F687-4f45-9708-019B960494DF}">
-                  <a14:hiddenLine xmlns="" xmlns:a14="http://schemas.microsoft.com/office/drawing/2010/main" w="9525">
+                  <a14:hiddenLine xmlns:a14="http://schemas.microsoft.com/office/drawing/2010/main" xmlns="" w="9525">
                     <a:solidFill>
                       <a:srgbClr val="000000"/>
                     </a:solidFill>
@@ -10922,7 +10922,7 @@
               </a:ln>
               <a:extLst>
                 <a:ext uri="{91240B29-F687-4f45-9708-019B960494DF}">
-                  <a14:hiddenLine xmlns="" xmlns:a14="http://schemas.microsoft.com/office/drawing/2010/main" w="9525">
+                  <a14:hiddenLine xmlns:a14="http://schemas.microsoft.com/office/drawing/2010/main" xmlns="" w="9525">
                     <a:solidFill>
                       <a:srgbClr val="000000"/>
                     </a:solidFill>
@@ -11012,7 +11012,7 @@
               </a:ln>
               <a:extLst>
                 <a:ext uri="{91240B29-F687-4f45-9708-019B960494DF}">
-                  <a14:hiddenLine xmlns="" xmlns:a14="http://schemas.microsoft.com/office/drawing/2010/main" w="9525">
+                  <a14:hiddenLine xmlns:a14="http://schemas.microsoft.com/office/drawing/2010/main" xmlns="" w="9525">
                     <a:solidFill>
                       <a:srgbClr val="000000"/>
                     </a:solidFill>
@@ -11074,7 +11074,7 @@
               </a:ln>
               <a:extLst>
                 <a:ext uri="{91240B29-F687-4f45-9708-019B960494DF}">
-                  <a14:hiddenLine xmlns="" xmlns:a14="http://schemas.microsoft.com/office/drawing/2010/main" w="9525">
+                  <a14:hiddenLine xmlns:a14="http://schemas.microsoft.com/office/drawing/2010/main" xmlns="" w="9525">
                     <a:solidFill>
                       <a:srgbClr val="000000"/>
                     </a:solidFill>
@@ -11164,7 +11164,7 @@
               </a:ln>
               <a:extLst>
                 <a:ext uri="{91240B29-F687-4f45-9708-019B960494DF}">
-                  <a14:hiddenLine xmlns="" xmlns:a14="http://schemas.microsoft.com/office/drawing/2010/main" w="9525">
+                  <a14:hiddenLine xmlns:a14="http://schemas.microsoft.com/office/drawing/2010/main" xmlns="" w="9525">
                     <a:solidFill>
                       <a:srgbClr val="000000"/>
                     </a:solidFill>
@@ -11229,7 +11229,7 @@
               </a:ln>
               <a:extLst>
                 <a:ext uri="{91240B29-F687-4f45-9708-019B960494DF}">
-                  <a14:hiddenLine xmlns="" xmlns:a14="http://schemas.microsoft.com/office/drawing/2010/main" w="9525">
+                  <a14:hiddenLine xmlns:a14="http://schemas.microsoft.com/office/drawing/2010/main" xmlns="" w="9525">
                     <a:solidFill>
                       <a:srgbClr val="000000"/>
                     </a:solidFill>
@@ -11291,7 +11291,7 @@
               </a:ln>
               <a:extLst>
                 <a:ext uri="{91240B29-F687-4f45-9708-019B960494DF}">
-                  <a14:hiddenLine xmlns="" xmlns:a14="http://schemas.microsoft.com/office/drawing/2010/main" w="9525">
+                  <a14:hiddenLine xmlns:a14="http://schemas.microsoft.com/office/drawing/2010/main" xmlns="" w="9525">
                     <a:solidFill>
                       <a:srgbClr val="000000"/>
                     </a:solidFill>
@@ -11381,7 +11381,7 @@
               </a:ln>
               <a:extLst>
                 <a:ext uri="{91240B29-F687-4f45-9708-019B960494DF}">
-                  <a14:hiddenLine xmlns="" xmlns:a14="http://schemas.microsoft.com/office/drawing/2010/main" w="9525">
+                  <a14:hiddenLine xmlns:a14="http://schemas.microsoft.com/office/drawing/2010/main" xmlns="" w="9525">
                     <a:solidFill>
                       <a:srgbClr val="000000"/>
                     </a:solidFill>
@@ -11471,7 +11471,7 @@
               </a:ln>
               <a:extLst>
                 <a:ext uri="{91240B29-F687-4f45-9708-019B960494DF}">
-                  <a14:hiddenLine xmlns="" xmlns:a14="http://schemas.microsoft.com/office/drawing/2010/main" w="9525">
+                  <a14:hiddenLine xmlns:a14="http://schemas.microsoft.com/office/drawing/2010/main" xmlns="" w="9525">
                     <a:solidFill>
                       <a:srgbClr val="000000"/>
                     </a:solidFill>
@@ -11536,7 +11536,7 @@
               </a:ln>
               <a:extLst>
                 <a:ext uri="{91240B29-F687-4f45-9708-019B960494DF}">
-                  <a14:hiddenLine xmlns="" xmlns:a14="http://schemas.microsoft.com/office/drawing/2010/main" w="9525">
+                  <a14:hiddenLine xmlns:a14="http://schemas.microsoft.com/office/drawing/2010/main" xmlns="" w="9525">
                     <a:solidFill>
                       <a:srgbClr val="000000"/>
                     </a:solidFill>
@@ -11656,7 +11656,7 @@
               </a:ln>
               <a:extLst>
                 <a:ext uri="{91240B29-F687-4f45-9708-019B960494DF}">
-                  <a14:hiddenLine xmlns="" xmlns:a14="http://schemas.microsoft.com/office/drawing/2010/main" w="9525">
+                  <a14:hiddenLine xmlns:a14="http://schemas.microsoft.com/office/drawing/2010/main" xmlns="" w="9525">
                     <a:solidFill>
                       <a:srgbClr val="000000"/>
                     </a:solidFill>
@@ -11737,7 +11737,7 @@
               </a:ln>
               <a:extLst>
                 <a:ext uri="{91240B29-F687-4f45-9708-019B960494DF}">
-                  <a14:hiddenLine xmlns="" xmlns:a14="http://schemas.microsoft.com/office/drawing/2010/main" w="9525">
+                  <a14:hiddenLine xmlns:a14="http://schemas.microsoft.com/office/drawing/2010/main" xmlns="" w="9525">
                     <a:solidFill>
                       <a:srgbClr val="000000"/>
                     </a:solidFill>
@@ -11852,7 +11852,7 @@
               </a:ln>
               <a:extLst>
                 <a:ext uri="{91240B29-F687-4f45-9708-019B960494DF}">
-                  <a14:hiddenLine xmlns="" xmlns:a14="http://schemas.microsoft.com/office/drawing/2010/main" w="9525">
+                  <a14:hiddenLine xmlns:a14="http://schemas.microsoft.com/office/drawing/2010/main" xmlns="" w="9525">
                     <a:solidFill>
                       <a:srgbClr val="000000"/>
                     </a:solidFill>
@@ -11942,7 +11942,7 @@
               </a:ln>
               <a:extLst>
                 <a:ext uri="{91240B29-F687-4f45-9708-019B960494DF}">
-                  <a14:hiddenLine xmlns="" xmlns:a14="http://schemas.microsoft.com/office/drawing/2010/main" w="9525">
+                  <a14:hiddenLine xmlns:a14="http://schemas.microsoft.com/office/drawing/2010/main" xmlns="" w="9525">
                     <a:solidFill>
                       <a:srgbClr val="000000"/>
                     </a:solidFill>
@@ -12007,7 +12007,7 @@
               </a:ln>
               <a:extLst>
                 <a:ext uri="{91240B29-F687-4f45-9708-019B960494DF}">
-                  <a14:hiddenLine xmlns="" xmlns:a14="http://schemas.microsoft.com/office/drawing/2010/main" w="9525">
+                  <a14:hiddenLine xmlns:a14="http://schemas.microsoft.com/office/drawing/2010/main" xmlns="" w="9525">
                     <a:solidFill>
                       <a:srgbClr val="000000"/>
                     </a:solidFill>
@@ -12097,7 +12097,7 @@
               </a:ln>
               <a:extLst>
                 <a:ext uri="{91240B29-F687-4f45-9708-019B960494DF}">
-                  <a14:hiddenLine xmlns="" xmlns:a14="http://schemas.microsoft.com/office/drawing/2010/main" w="9525">
+                  <a14:hiddenLine xmlns:a14="http://schemas.microsoft.com/office/drawing/2010/main" xmlns="" w="9525">
                     <a:solidFill>
                       <a:srgbClr val="000000"/>
                     </a:solidFill>
@@ -12165,7 +12165,7 @@
               </a:ln>
               <a:extLst>
                 <a:ext uri="{91240B29-F687-4f45-9708-019B960494DF}">
-                  <a14:hiddenLine xmlns="" xmlns:a14="http://schemas.microsoft.com/office/drawing/2010/main" w="9525">
+                  <a14:hiddenLine xmlns:a14="http://schemas.microsoft.com/office/drawing/2010/main" xmlns="" w="9525">
                     <a:solidFill>
                       <a:srgbClr val="000000"/>
                     </a:solidFill>
@@ -12255,7 +12255,7 @@
               </a:ln>
               <a:extLst>
                 <a:ext uri="{91240B29-F687-4f45-9708-019B960494DF}">
-                  <a14:hiddenLine xmlns="" xmlns:a14="http://schemas.microsoft.com/office/drawing/2010/main" w="9525">
+                  <a14:hiddenLine xmlns:a14="http://schemas.microsoft.com/office/drawing/2010/main" xmlns="" w="9525">
                     <a:solidFill>
                       <a:srgbClr val="000000"/>
                     </a:solidFill>
@@ -12323,7 +12323,7 @@
               </a:ln>
               <a:extLst>
                 <a:ext uri="{91240B29-F687-4f45-9708-019B960494DF}">
-                  <a14:hiddenLine xmlns="" xmlns:a14="http://schemas.microsoft.com/office/drawing/2010/main" w="9525">
+                  <a14:hiddenLine xmlns:a14="http://schemas.microsoft.com/office/drawing/2010/main" xmlns="" w="9525">
                     <a:solidFill>
                       <a:srgbClr val="000000"/>
                     </a:solidFill>
@@ -12413,7 +12413,7 @@
               </a:ln>
               <a:extLst>
                 <a:ext uri="{91240B29-F687-4f45-9708-019B960494DF}">
-                  <a14:hiddenLine xmlns="" xmlns:a14="http://schemas.microsoft.com/office/drawing/2010/main" w="9525">
+                  <a14:hiddenLine xmlns:a14="http://schemas.microsoft.com/office/drawing/2010/main" xmlns="" w="9525">
                     <a:solidFill>
                       <a:srgbClr val="000000"/>
                     </a:solidFill>
@@ -12447,7 +12447,7 @@
               </a:ln>
               <a:extLst>
                 <a:ext uri="{91240B29-F687-4f45-9708-019B960494DF}">
-                  <a14:hiddenLine xmlns="" xmlns:a14="http://schemas.microsoft.com/office/drawing/2010/main" w="9525">
+                  <a14:hiddenLine xmlns:a14="http://schemas.microsoft.com/office/drawing/2010/main" xmlns="" w="9525">
                     <a:solidFill>
                       <a:srgbClr val="000000"/>
                     </a:solidFill>
@@ -12587,7 +12587,7 @@
           <a:p>
             <a:fld id="{EC4347D3-4C9A-C240-8F14-750059DFEEB0}" type="datetimeFigureOut">
               <a:rPr lang="en-US" smtClean="0"/>
-              <a:t>1/18/24</a:t>
+              <a:t>3/18/24</a:t>
             </a:fld>
             <a:endParaRPr lang="en-US"/>
           </a:p>
@@ -15601,14 +15601,14 @@
             <a:pPr lvl="1"/>
             <a:r>
               <a:rPr lang="en-US" dirty="0"/>
-              <a:t>Anyone can fill out an online form to request a 10 day week extension. Extensions will be granted for any reason as long as you articulate why you need extra time and when you plan to finish the homework by.</a:t>
+              <a:t>Anyone can fill out an online form to request a 10 day extension. Extensions will be granted for any reason as long as you articulate why you need extra time and when you plan to finish the homework by.</a:t>
             </a:r>
           </a:p>
           <a:p>
             <a:pPr lvl="1"/>
             <a:r>
               <a:rPr lang="en-US" dirty="0"/>
-              <a:t>NO submissions beyond this already generous three week window for any reason. That window IS your flexibility should anything arise.</a:t>
+              <a:t>NO submissions beyond this already generous 10 day window for any reason. That window IS your flexibility should anything arise.</a:t>
             </a:r>
           </a:p>
           <a:p>

</xml_diff>

<commit_message>
updates for first day
</commit_message>
<xml_diff>
--- a/slides/00-CourseIntroduction.pptx
+++ b/slides/00-CourseIntroduction.pptx
@@ -226,7 +226,7 @@
           <a:p>
             <a:fld id="{C5B45307-6ED4-B142-BD64-10F739779302}" type="datetimeFigureOut">
               <a:rPr lang="en-US" smtClean="0"/>
-              <a:t>8/22/24</a:t>
+              <a:t>8/27/24</a:t>
             </a:fld>
             <a:endParaRPr lang="en-US"/>
           </a:p>
@@ -729,7 +729,7 @@
           <a:noFill/>
           <a:extLst>
             <a:ext uri="{909E8E84-426E-40dd-AFC4-6F175D3DCCD1}">
-              <a14:hiddenFill xmlns="" xmlns:a14="http://schemas.microsoft.com/office/drawing/2010/main">
+              <a14:hiddenFill xmlns:a14="http://schemas.microsoft.com/office/drawing/2010/main" xmlns="">
                 <a:solidFill>
                   <a:srgbClr val="FFFFFF"/>
                 </a:solidFill>
@@ -788,7 +788,7 @@
             </a:ln>
             <a:extLst>
               <a:ext uri="{91240B29-F687-4f45-9708-019B960494DF}">
-                <a14:hiddenLine xmlns="" xmlns:a14="http://schemas.microsoft.com/office/drawing/2010/main" w="9525">
+                <a14:hiddenLine xmlns:a14="http://schemas.microsoft.com/office/drawing/2010/main" xmlns="" w="9525">
                   <a:solidFill>
                     <a:srgbClr val="000000"/>
                   </a:solidFill>
@@ -878,7 +878,7 @@
             </a:ln>
             <a:extLst>
               <a:ext uri="{91240B29-F687-4f45-9708-019B960494DF}">
-                <a14:hiddenLine xmlns="" xmlns:a14="http://schemas.microsoft.com/office/drawing/2010/main" w="9525">
+                <a14:hiddenLine xmlns:a14="http://schemas.microsoft.com/office/drawing/2010/main" xmlns="" w="9525">
                   <a:solidFill>
                     <a:srgbClr val="000000"/>
                   </a:solidFill>
@@ -968,7 +968,7 @@
             </a:ln>
             <a:extLst>
               <a:ext uri="{91240B29-F687-4f45-9708-019B960494DF}">
-                <a14:hiddenLine xmlns="" xmlns:a14="http://schemas.microsoft.com/office/drawing/2010/main" w="9525">
+                <a14:hiddenLine xmlns:a14="http://schemas.microsoft.com/office/drawing/2010/main" xmlns="" w="9525">
                   <a:solidFill>
                     <a:srgbClr val="000000"/>
                   </a:solidFill>
@@ -1002,7 +1002,7 @@
             </a:ln>
             <a:extLst>
               <a:ext uri="{91240B29-F687-4f45-9708-019B960494DF}">
-                <a14:hiddenLine xmlns="" xmlns:a14="http://schemas.microsoft.com/office/drawing/2010/main" w="9525">
+                <a14:hiddenLine xmlns:a14="http://schemas.microsoft.com/office/drawing/2010/main" xmlns="" w="9525">
                   <a:solidFill>
                     <a:srgbClr val="000000"/>
                   </a:solidFill>
@@ -1092,7 +1092,7 @@
             </a:ln>
             <a:extLst>
               <a:ext uri="{91240B29-F687-4f45-9708-019B960494DF}">
-                <a14:hiddenLine xmlns="" xmlns:a14="http://schemas.microsoft.com/office/drawing/2010/main" w="9525">
+                <a14:hiddenLine xmlns:a14="http://schemas.microsoft.com/office/drawing/2010/main" xmlns="" w="9525">
                   <a:solidFill>
                     <a:srgbClr val="000000"/>
                   </a:solidFill>
@@ -1154,7 +1154,7 @@
             </a:ln>
             <a:extLst>
               <a:ext uri="{91240B29-F687-4f45-9708-019B960494DF}">
-                <a14:hiddenLine xmlns="" xmlns:a14="http://schemas.microsoft.com/office/drawing/2010/main" w="9525">
+                <a14:hiddenLine xmlns:a14="http://schemas.microsoft.com/office/drawing/2010/main" xmlns="" w="9525">
                   <a:solidFill>
                     <a:srgbClr val="000000"/>
                   </a:solidFill>
@@ -1216,7 +1216,7 @@
             </a:ln>
             <a:extLst>
               <a:ext uri="{91240B29-F687-4f45-9708-019B960494DF}">
-                <a14:hiddenLine xmlns="" xmlns:a14="http://schemas.microsoft.com/office/drawing/2010/main" w="9525">
+                <a14:hiddenLine xmlns:a14="http://schemas.microsoft.com/office/drawing/2010/main" xmlns="" w="9525">
                   <a:solidFill>
                     <a:srgbClr val="000000"/>
                   </a:solidFill>
@@ -1306,7 +1306,7 @@
             </a:ln>
             <a:extLst>
               <a:ext uri="{91240B29-F687-4f45-9708-019B960494DF}">
-                <a14:hiddenLine xmlns="" xmlns:a14="http://schemas.microsoft.com/office/drawing/2010/main" w="9525">
+                <a14:hiddenLine xmlns:a14="http://schemas.microsoft.com/office/drawing/2010/main" xmlns="" w="9525">
                   <a:solidFill>
                     <a:srgbClr val="000000"/>
                   </a:solidFill>
@@ -1368,7 +1368,7 @@
             </a:ln>
             <a:extLst>
               <a:ext uri="{91240B29-F687-4f45-9708-019B960494DF}">
-                <a14:hiddenLine xmlns="" xmlns:a14="http://schemas.microsoft.com/office/drawing/2010/main" w="9525">
+                <a14:hiddenLine xmlns:a14="http://schemas.microsoft.com/office/drawing/2010/main" xmlns="" w="9525">
                   <a:solidFill>
                     <a:srgbClr val="000000"/>
                   </a:solidFill>
@@ -1430,7 +1430,7 @@
             </a:ln>
             <a:extLst>
               <a:ext uri="{91240B29-F687-4f45-9708-019B960494DF}">
-                <a14:hiddenLine xmlns="" xmlns:a14="http://schemas.microsoft.com/office/drawing/2010/main" w="9525">
+                <a14:hiddenLine xmlns:a14="http://schemas.microsoft.com/office/drawing/2010/main" xmlns="" w="9525">
                   <a:solidFill>
                     <a:srgbClr val="000000"/>
                   </a:solidFill>
@@ -1520,7 +1520,7 @@
             </a:ln>
             <a:extLst>
               <a:ext uri="{91240B29-F687-4f45-9708-019B960494DF}">
-                <a14:hiddenLine xmlns="" xmlns:a14="http://schemas.microsoft.com/office/drawing/2010/main" w="9525">
+                <a14:hiddenLine xmlns:a14="http://schemas.microsoft.com/office/drawing/2010/main" xmlns="" w="9525">
                   <a:solidFill>
                     <a:srgbClr val="000000"/>
                   </a:solidFill>
@@ -1610,7 +1610,7 @@
             </a:ln>
             <a:extLst>
               <a:ext uri="{91240B29-F687-4f45-9708-019B960494DF}">
-                <a14:hiddenLine xmlns="" xmlns:a14="http://schemas.microsoft.com/office/drawing/2010/main" w="9525">
+                <a14:hiddenLine xmlns:a14="http://schemas.microsoft.com/office/drawing/2010/main" xmlns="" w="9525">
                   <a:solidFill>
                     <a:srgbClr val="000000"/>
                   </a:solidFill>
@@ -1672,7 +1672,7 @@
             </a:ln>
             <a:extLst>
               <a:ext uri="{91240B29-F687-4f45-9708-019B960494DF}">
-                <a14:hiddenLine xmlns="" xmlns:a14="http://schemas.microsoft.com/office/drawing/2010/main" w="9525">
+                <a14:hiddenLine xmlns:a14="http://schemas.microsoft.com/office/drawing/2010/main" xmlns="" w="9525">
                   <a:solidFill>
                     <a:srgbClr val="000000"/>
                   </a:solidFill>
@@ -1782,7 +1782,7 @@
             </a:ln>
             <a:extLst>
               <a:ext uri="{91240B29-F687-4f45-9708-019B960494DF}">
-                <a14:hiddenLine xmlns="" xmlns:a14="http://schemas.microsoft.com/office/drawing/2010/main" w="9525">
+                <a14:hiddenLine xmlns:a14="http://schemas.microsoft.com/office/drawing/2010/main" xmlns="" w="9525">
                   <a:solidFill>
                     <a:srgbClr val="000000"/>
                   </a:solidFill>
@@ -1844,7 +1844,7 @@
             </a:ln>
             <a:extLst>
               <a:ext uri="{91240B29-F687-4f45-9708-019B960494DF}">
-                <a14:hiddenLine xmlns="" xmlns:a14="http://schemas.microsoft.com/office/drawing/2010/main" w="9525">
+                <a14:hiddenLine xmlns:a14="http://schemas.microsoft.com/office/drawing/2010/main" xmlns="" w="9525">
                   <a:solidFill>
                     <a:srgbClr val="000000"/>
                   </a:solidFill>
@@ -1934,7 +1934,7 @@
             </a:ln>
             <a:extLst>
               <a:ext uri="{91240B29-F687-4f45-9708-019B960494DF}">
-                <a14:hiddenLine xmlns="" xmlns:a14="http://schemas.microsoft.com/office/drawing/2010/main" w="9525">
+                <a14:hiddenLine xmlns:a14="http://schemas.microsoft.com/office/drawing/2010/main" xmlns="" w="9525">
                   <a:solidFill>
                     <a:srgbClr val="000000"/>
                   </a:solidFill>
@@ -2024,7 +2024,7 @@
             </a:ln>
             <a:extLst>
               <a:ext uri="{91240B29-F687-4f45-9708-019B960494DF}">
-                <a14:hiddenLine xmlns="" xmlns:a14="http://schemas.microsoft.com/office/drawing/2010/main" w="9525">
+                <a14:hiddenLine xmlns:a14="http://schemas.microsoft.com/office/drawing/2010/main" xmlns="" w="9525">
                   <a:solidFill>
                     <a:srgbClr val="000000"/>
                   </a:solidFill>
@@ -2086,7 +2086,7 @@
             </a:ln>
             <a:extLst>
               <a:ext uri="{91240B29-F687-4f45-9708-019B960494DF}">
-                <a14:hiddenLine xmlns="" xmlns:a14="http://schemas.microsoft.com/office/drawing/2010/main" w="9525">
+                <a14:hiddenLine xmlns:a14="http://schemas.microsoft.com/office/drawing/2010/main" xmlns="" w="9525">
                   <a:solidFill>
                     <a:srgbClr val="000000"/>
                   </a:solidFill>
@@ -2176,7 +2176,7 @@
             </a:ln>
             <a:extLst>
               <a:ext uri="{91240B29-F687-4f45-9708-019B960494DF}">
-                <a14:hiddenLine xmlns="" xmlns:a14="http://schemas.microsoft.com/office/drawing/2010/main" w="9525">
+                <a14:hiddenLine xmlns:a14="http://schemas.microsoft.com/office/drawing/2010/main" xmlns="" w="9525">
                   <a:solidFill>
                     <a:srgbClr val="000000"/>
                   </a:solidFill>
@@ -2266,7 +2266,7 @@
             </a:ln>
             <a:extLst>
               <a:ext uri="{91240B29-F687-4f45-9708-019B960494DF}">
-                <a14:hiddenLine xmlns="" xmlns:a14="http://schemas.microsoft.com/office/drawing/2010/main" w="9525">
+                <a14:hiddenLine xmlns:a14="http://schemas.microsoft.com/office/drawing/2010/main" xmlns="" w="9525">
                   <a:solidFill>
                     <a:srgbClr val="000000"/>
                   </a:solidFill>
@@ -2322,7 +2322,7 @@
             </a:ln>
             <a:extLst>
               <a:ext uri="{91240B29-F687-4f45-9708-019B960494DF}">
-                <a14:hiddenLine xmlns="" xmlns:a14="http://schemas.microsoft.com/office/drawing/2010/main" w="9525">
+                <a14:hiddenLine xmlns:a14="http://schemas.microsoft.com/office/drawing/2010/main" xmlns="" w="9525">
                   <a:solidFill>
                     <a:srgbClr val="000000"/>
                   </a:solidFill>
@@ -2412,7 +2412,7 @@
             </a:ln>
             <a:extLst>
               <a:ext uri="{91240B29-F687-4f45-9708-019B960494DF}">
-                <a14:hiddenLine xmlns="" xmlns:a14="http://schemas.microsoft.com/office/drawing/2010/main" w="9525">
+                <a14:hiddenLine xmlns:a14="http://schemas.microsoft.com/office/drawing/2010/main" xmlns="" w="9525">
                   <a:solidFill>
                     <a:srgbClr val="000000"/>
                   </a:solidFill>
@@ -2468,7 +2468,7 @@
             </a:ln>
             <a:extLst>
               <a:ext uri="{91240B29-F687-4f45-9708-019B960494DF}">
-                <a14:hiddenLine xmlns="" xmlns:a14="http://schemas.microsoft.com/office/drawing/2010/main" w="9525">
+                <a14:hiddenLine xmlns:a14="http://schemas.microsoft.com/office/drawing/2010/main" xmlns="" w="9525">
                   <a:solidFill>
                     <a:srgbClr val="000000"/>
                   </a:solidFill>
@@ -2558,7 +2558,7 @@
             </a:ln>
             <a:extLst>
               <a:ext uri="{91240B29-F687-4f45-9708-019B960494DF}">
-                <a14:hiddenLine xmlns="" xmlns:a14="http://schemas.microsoft.com/office/drawing/2010/main" w="9525">
+                <a14:hiddenLine xmlns:a14="http://schemas.microsoft.com/office/drawing/2010/main" xmlns="" w="9525">
                   <a:solidFill>
                     <a:srgbClr val="000000"/>
                   </a:solidFill>
@@ -2626,7 +2626,7 @@
             </a:ln>
             <a:extLst>
               <a:ext uri="{91240B29-F687-4f45-9708-019B960494DF}">
-                <a14:hiddenLine xmlns="" xmlns:a14="http://schemas.microsoft.com/office/drawing/2010/main" w="9525">
+                <a14:hiddenLine xmlns:a14="http://schemas.microsoft.com/office/drawing/2010/main" xmlns="" w="9525">
                   <a:solidFill>
                     <a:srgbClr val="000000"/>
                   </a:solidFill>
@@ -2716,7 +2716,7 @@
             </a:ln>
             <a:extLst>
               <a:ext uri="{91240B29-F687-4f45-9708-019B960494DF}">
-                <a14:hiddenLine xmlns="" xmlns:a14="http://schemas.microsoft.com/office/drawing/2010/main" w="9525">
+                <a14:hiddenLine xmlns:a14="http://schemas.microsoft.com/office/drawing/2010/main" xmlns="" w="9525">
                   <a:solidFill>
                     <a:srgbClr val="000000"/>
                   </a:solidFill>
@@ -2784,7 +2784,7 @@
             </a:ln>
             <a:extLst>
               <a:ext uri="{91240B29-F687-4f45-9708-019B960494DF}">
-                <a14:hiddenLine xmlns="" xmlns:a14="http://schemas.microsoft.com/office/drawing/2010/main" w="9525">
+                <a14:hiddenLine xmlns:a14="http://schemas.microsoft.com/office/drawing/2010/main" xmlns="" w="9525">
                   <a:solidFill>
                     <a:srgbClr val="000000"/>
                   </a:solidFill>
@@ -2874,7 +2874,7 @@
             </a:ln>
             <a:extLst>
               <a:ext uri="{91240B29-F687-4f45-9708-019B960494DF}">
-                <a14:hiddenLine xmlns="" xmlns:a14="http://schemas.microsoft.com/office/drawing/2010/main" w="9525">
+                <a14:hiddenLine xmlns:a14="http://schemas.microsoft.com/office/drawing/2010/main" xmlns="" w="9525">
                   <a:solidFill>
                     <a:srgbClr val="000000"/>
                   </a:solidFill>
@@ -2908,7 +2908,7 @@
             </a:ln>
             <a:extLst>
               <a:ext uri="{91240B29-F687-4f45-9708-019B960494DF}">
-                <a14:hiddenLine xmlns="" xmlns:a14="http://schemas.microsoft.com/office/drawing/2010/main" w="9525">
+                <a14:hiddenLine xmlns:a14="http://schemas.microsoft.com/office/drawing/2010/main" xmlns="" w="9525">
                   <a:solidFill>
                     <a:srgbClr val="000000"/>
                   </a:solidFill>
@@ -2998,7 +2998,7 @@
             </a:ln>
             <a:extLst>
               <a:ext uri="{91240B29-F687-4f45-9708-019B960494DF}">
-                <a14:hiddenLine xmlns="" xmlns:a14="http://schemas.microsoft.com/office/drawing/2010/main" w="9525">
+                <a14:hiddenLine xmlns:a14="http://schemas.microsoft.com/office/drawing/2010/main" xmlns="" w="9525">
                   <a:solidFill>
                     <a:srgbClr val="000000"/>
                   </a:solidFill>
@@ -3060,7 +3060,7 @@
             </a:ln>
             <a:extLst>
               <a:ext uri="{91240B29-F687-4f45-9708-019B960494DF}">
-                <a14:hiddenLine xmlns="" xmlns:a14="http://schemas.microsoft.com/office/drawing/2010/main" w="9525">
+                <a14:hiddenLine xmlns:a14="http://schemas.microsoft.com/office/drawing/2010/main" xmlns="" w="9525">
                   <a:solidFill>
                     <a:srgbClr val="000000"/>
                   </a:solidFill>
@@ -3122,7 +3122,7 @@
             </a:ln>
             <a:extLst>
               <a:ext uri="{91240B29-F687-4f45-9708-019B960494DF}">
-                <a14:hiddenLine xmlns="" xmlns:a14="http://schemas.microsoft.com/office/drawing/2010/main" w="9525">
+                <a14:hiddenLine xmlns:a14="http://schemas.microsoft.com/office/drawing/2010/main" xmlns="" w="9525">
                   <a:solidFill>
                     <a:srgbClr val="000000"/>
                   </a:solidFill>
@@ -3212,7 +3212,7 @@
             </a:ln>
             <a:extLst>
               <a:ext uri="{91240B29-F687-4f45-9708-019B960494DF}">
-                <a14:hiddenLine xmlns="" xmlns:a14="http://schemas.microsoft.com/office/drawing/2010/main" w="9525">
+                <a14:hiddenLine xmlns:a14="http://schemas.microsoft.com/office/drawing/2010/main" xmlns="" w="9525">
                   <a:solidFill>
                     <a:srgbClr val="000000"/>
                   </a:solidFill>
@@ -3280,7 +3280,7 @@
             </a:ln>
             <a:extLst>
               <a:ext uri="{91240B29-F687-4f45-9708-019B960494DF}">
-                <a14:hiddenLine xmlns="" xmlns:a14="http://schemas.microsoft.com/office/drawing/2010/main" w="9525">
+                <a14:hiddenLine xmlns:a14="http://schemas.microsoft.com/office/drawing/2010/main" xmlns="" w="9525">
                   <a:solidFill>
                     <a:srgbClr val="000000"/>
                   </a:solidFill>
@@ -3342,7 +3342,7 @@
             </a:ln>
             <a:extLst>
               <a:ext uri="{91240B29-F687-4f45-9708-019B960494DF}">
-                <a14:hiddenLine xmlns="" xmlns:a14="http://schemas.microsoft.com/office/drawing/2010/main" w="9525">
+                <a14:hiddenLine xmlns:a14="http://schemas.microsoft.com/office/drawing/2010/main" xmlns="" w="9525">
                   <a:solidFill>
                     <a:srgbClr val="000000"/>
                   </a:solidFill>
@@ -3432,7 +3432,7 @@
             </a:ln>
             <a:extLst>
               <a:ext uri="{91240B29-F687-4f45-9708-019B960494DF}">
-                <a14:hiddenLine xmlns="" xmlns:a14="http://schemas.microsoft.com/office/drawing/2010/main" w="9525">
+                <a14:hiddenLine xmlns:a14="http://schemas.microsoft.com/office/drawing/2010/main" xmlns="" w="9525">
                   <a:solidFill>
                     <a:srgbClr val="000000"/>
                   </a:solidFill>
@@ -3494,7 +3494,7 @@
             </a:ln>
             <a:extLst>
               <a:ext uri="{91240B29-F687-4f45-9708-019B960494DF}">
-                <a14:hiddenLine xmlns="" xmlns:a14="http://schemas.microsoft.com/office/drawing/2010/main" w="9525">
+                <a14:hiddenLine xmlns:a14="http://schemas.microsoft.com/office/drawing/2010/main" xmlns="" w="9525">
                   <a:solidFill>
                     <a:srgbClr val="000000"/>
                   </a:solidFill>
@@ -3584,7 +3584,7 @@
             </a:ln>
             <a:extLst>
               <a:ext uri="{91240B29-F687-4f45-9708-019B960494DF}">
-                <a14:hiddenLine xmlns="" xmlns:a14="http://schemas.microsoft.com/office/drawing/2010/main" w="9525">
+                <a14:hiddenLine xmlns:a14="http://schemas.microsoft.com/office/drawing/2010/main" xmlns="" w="9525">
                   <a:solidFill>
                     <a:srgbClr val="000000"/>
                   </a:solidFill>
@@ -3646,7 +3646,7 @@
             </a:ln>
             <a:extLst>
               <a:ext uri="{91240B29-F687-4f45-9708-019B960494DF}">
-                <a14:hiddenLine xmlns="" xmlns:a14="http://schemas.microsoft.com/office/drawing/2010/main" w="9525">
+                <a14:hiddenLine xmlns:a14="http://schemas.microsoft.com/office/drawing/2010/main" xmlns="" w="9525">
                   <a:solidFill>
                     <a:srgbClr val="000000"/>
                   </a:solidFill>
@@ -3736,7 +3736,7 @@
             </a:ln>
             <a:extLst>
               <a:ext uri="{91240B29-F687-4f45-9708-019B960494DF}">
-                <a14:hiddenLine xmlns="" xmlns:a14="http://schemas.microsoft.com/office/drawing/2010/main" w="9525">
+                <a14:hiddenLine xmlns:a14="http://schemas.microsoft.com/office/drawing/2010/main" xmlns="" w="9525">
                   <a:solidFill>
                     <a:srgbClr val="000000"/>
                   </a:solidFill>
@@ -3770,7 +3770,7 @@
             </a:ln>
             <a:extLst>
               <a:ext uri="{91240B29-F687-4f45-9708-019B960494DF}">
-                <a14:hiddenLine xmlns="" xmlns:a14="http://schemas.microsoft.com/office/drawing/2010/main" w="9525">
+                <a14:hiddenLine xmlns:a14="http://schemas.microsoft.com/office/drawing/2010/main" xmlns="" w="9525">
                   <a:solidFill>
                     <a:srgbClr val="000000"/>
                   </a:solidFill>
@@ -3835,7 +3835,7 @@
             </a:ln>
             <a:extLst>
               <a:ext uri="{91240B29-F687-4f45-9708-019B960494DF}">
-                <a14:hiddenLine xmlns="" xmlns:a14="http://schemas.microsoft.com/office/drawing/2010/main" w="9525">
+                <a14:hiddenLine xmlns:a14="http://schemas.microsoft.com/office/drawing/2010/main" xmlns="" w="9525">
                   <a:solidFill>
                     <a:srgbClr val="000000"/>
                   </a:solidFill>
@@ -3925,7 +3925,7 @@
             </a:ln>
             <a:extLst>
               <a:ext uri="{91240B29-F687-4f45-9708-019B960494DF}">
-                <a14:hiddenLine xmlns="" xmlns:a14="http://schemas.microsoft.com/office/drawing/2010/main" w="9525">
+                <a14:hiddenLine xmlns:a14="http://schemas.microsoft.com/office/drawing/2010/main" xmlns="" w="9525">
                   <a:solidFill>
                     <a:srgbClr val="000000"/>
                   </a:solidFill>
@@ -3987,7 +3987,7 @@
             </a:ln>
             <a:extLst>
               <a:ext uri="{91240B29-F687-4f45-9708-019B960494DF}">
-                <a14:hiddenLine xmlns="" xmlns:a14="http://schemas.microsoft.com/office/drawing/2010/main" w="9525">
+                <a14:hiddenLine xmlns:a14="http://schemas.microsoft.com/office/drawing/2010/main" xmlns="" w="9525">
                   <a:solidFill>
                     <a:srgbClr val="000000"/>
                   </a:solidFill>
@@ -4077,7 +4077,7 @@
             </a:ln>
             <a:extLst>
               <a:ext uri="{91240B29-F687-4f45-9708-019B960494DF}">
-                <a14:hiddenLine xmlns="" xmlns:a14="http://schemas.microsoft.com/office/drawing/2010/main" w="9525">
+                <a14:hiddenLine xmlns:a14="http://schemas.microsoft.com/office/drawing/2010/main" xmlns="" w="9525">
                   <a:solidFill>
                     <a:srgbClr val="000000"/>
                   </a:solidFill>
@@ -4167,7 +4167,7 @@
             </a:ln>
             <a:extLst>
               <a:ext uri="{91240B29-F687-4f45-9708-019B960494DF}">
-                <a14:hiddenLine xmlns="" xmlns:a14="http://schemas.microsoft.com/office/drawing/2010/main" w="9525">
+                <a14:hiddenLine xmlns:a14="http://schemas.microsoft.com/office/drawing/2010/main" xmlns="" w="9525">
                   <a:solidFill>
                     <a:srgbClr val="000000"/>
                   </a:solidFill>
@@ -4232,7 +4232,7 @@
             </a:ln>
             <a:extLst>
               <a:ext uri="{91240B29-F687-4f45-9708-019B960494DF}">
-                <a14:hiddenLine xmlns="" xmlns:a14="http://schemas.microsoft.com/office/drawing/2010/main" w="9525">
+                <a14:hiddenLine xmlns:a14="http://schemas.microsoft.com/office/drawing/2010/main" xmlns="" w="9525">
                   <a:solidFill>
                     <a:srgbClr val="000000"/>
                   </a:solidFill>
@@ -4294,7 +4294,7 @@
             </a:ln>
             <a:extLst>
               <a:ext uri="{91240B29-F687-4f45-9708-019B960494DF}">
-                <a14:hiddenLine xmlns="" xmlns:a14="http://schemas.microsoft.com/office/drawing/2010/main" w="9525">
+                <a14:hiddenLine xmlns:a14="http://schemas.microsoft.com/office/drawing/2010/main" xmlns="" w="9525">
                   <a:solidFill>
                     <a:srgbClr val="000000"/>
                   </a:solidFill>
@@ -4384,7 +4384,7 @@
             </a:ln>
             <a:extLst>
               <a:ext uri="{91240B29-F687-4f45-9708-019B960494DF}">
-                <a14:hiddenLine xmlns="" xmlns:a14="http://schemas.microsoft.com/office/drawing/2010/main" w="9525">
+                <a14:hiddenLine xmlns:a14="http://schemas.microsoft.com/office/drawing/2010/main" xmlns="" w="9525">
                   <a:solidFill>
                     <a:srgbClr val="000000"/>
                   </a:solidFill>
@@ -4474,7 +4474,7 @@
             </a:ln>
             <a:extLst>
               <a:ext uri="{91240B29-F687-4f45-9708-019B960494DF}">
-                <a14:hiddenLine xmlns="" xmlns:a14="http://schemas.microsoft.com/office/drawing/2010/main" w="9525">
+                <a14:hiddenLine xmlns:a14="http://schemas.microsoft.com/office/drawing/2010/main" xmlns="" w="9525">
                   <a:solidFill>
                     <a:srgbClr val="000000"/>
                   </a:solidFill>
@@ -4536,7 +4536,7 @@
             </a:ln>
             <a:extLst>
               <a:ext uri="{91240B29-F687-4f45-9708-019B960494DF}">
-                <a14:hiddenLine xmlns="" xmlns:a14="http://schemas.microsoft.com/office/drawing/2010/main" w="9525">
+                <a14:hiddenLine xmlns:a14="http://schemas.microsoft.com/office/drawing/2010/main" xmlns="" w="9525">
                   <a:solidFill>
                     <a:srgbClr val="000000"/>
                   </a:solidFill>
@@ -4656,7 +4656,7 @@
             </a:ln>
             <a:extLst>
               <a:ext uri="{91240B29-F687-4f45-9708-019B960494DF}">
-                <a14:hiddenLine xmlns="" xmlns:a14="http://schemas.microsoft.com/office/drawing/2010/main" w="9525">
+                <a14:hiddenLine xmlns:a14="http://schemas.microsoft.com/office/drawing/2010/main" xmlns="" w="9525">
                   <a:solidFill>
                     <a:srgbClr val="000000"/>
                   </a:solidFill>
@@ -4724,7 +4724,7 @@
             </a:ln>
             <a:extLst>
               <a:ext uri="{91240B29-F687-4f45-9708-019B960494DF}">
-                <a14:hiddenLine xmlns="" xmlns:a14="http://schemas.microsoft.com/office/drawing/2010/main" w="9525">
+                <a14:hiddenLine xmlns:a14="http://schemas.microsoft.com/office/drawing/2010/main" xmlns="" w="9525">
                   <a:solidFill>
                     <a:srgbClr val="000000"/>
                   </a:solidFill>
@@ -4814,7 +4814,7 @@
             </a:ln>
             <a:extLst>
               <a:ext uri="{91240B29-F687-4f45-9708-019B960494DF}">
-                <a14:hiddenLine xmlns="" xmlns:a14="http://schemas.microsoft.com/office/drawing/2010/main" w="9525">
+                <a14:hiddenLine xmlns:a14="http://schemas.microsoft.com/office/drawing/2010/main" xmlns="" w="9525">
                   <a:solidFill>
                     <a:srgbClr val="000000"/>
                   </a:solidFill>
@@ -4954,7 +4954,7 @@
           <a:p>
             <a:fld id="{EC4347D3-4C9A-C240-8F14-750059DFEEB0}" type="datetimeFigureOut">
               <a:rPr lang="en-US" smtClean="0"/>
-              <a:t>8/22/24</a:t>
+              <a:t>8/27/24</a:t>
             </a:fld>
             <a:endParaRPr lang="en-US"/>
           </a:p>
@@ -5221,7 +5221,7 @@
           <a:p>
             <a:fld id="{EC4347D3-4C9A-C240-8F14-750059DFEEB0}" type="datetimeFigureOut">
               <a:rPr lang="en-US" smtClean="0"/>
-              <a:t>8/22/24</a:t>
+              <a:t>8/27/24</a:t>
             </a:fld>
             <a:endParaRPr lang="en-US"/>
           </a:p>
@@ -5417,7 +5417,7 @@
           <a:p>
             <a:fld id="{EC4347D3-4C9A-C240-8F14-750059DFEEB0}" type="datetimeFigureOut">
               <a:rPr lang="en-US" smtClean="0"/>
-              <a:t>8/22/24</a:t>
+              <a:t>8/27/24</a:t>
             </a:fld>
             <a:endParaRPr lang="en-US"/>
           </a:p>
@@ -5680,7 +5680,7 @@
           <a:p>
             <a:fld id="{EC4347D3-4C9A-C240-8F14-750059DFEEB0}" type="datetimeFigureOut">
               <a:rPr lang="en-US" smtClean="0"/>
-              <a:t>8/22/24</a:t>
+              <a:t>8/27/24</a:t>
             </a:fld>
             <a:endParaRPr lang="en-US"/>
           </a:p>
@@ -6114,7 +6114,7 @@
           <a:p>
             <a:fld id="{EC4347D3-4C9A-C240-8F14-750059DFEEB0}" type="datetimeFigureOut">
               <a:rPr lang="en-US" smtClean="0"/>
-              <a:t>8/22/24</a:t>
+              <a:t>8/27/24</a:t>
             </a:fld>
             <a:endParaRPr lang="en-US"/>
           </a:p>
@@ -6660,7 +6660,7 @@
           <a:p>
             <a:fld id="{EC4347D3-4C9A-C240-8F14-750059DFEEB0}" type="datetimeFigureOut">
               <a:rPr lang="en-US" smtClean="0"/>
-              <a:t>8/22/24</a:t>
+              <a:t>8/27/24</a:t>
             </a:fld>
             <a:endParaRPr lang="en-US"/>
           </a:p>
@@ -7380,7 +7380,7 @@
           <a:p>
             <a:fld id="{EC4347D3-4C9A-C240-8F14-750059DFEEB0}" type="datetimeFigureOut">
               <a:rPr lang="en-US" smtClean="0"/>
-              <a:t>8/22/24</a:t>
+              <a:t>8/27/24</a:t>
             </a:fld>
             <a:endParaRPr lang="en-US"/>
           </a:p>
@@ -7550,7 +7550,7 @@
           <a:p>
             <a:fld id="{EC4347D3-4C9A-C240-8F14-750059DFEEB0}" type="datetimeFigureOut">
               <a:rPr lang="en-US" smtClean="0"/>
-              <a:t>8/22/24</a:t>
+              <a:t>8/27/24</a:t>
             </a:fld>
             <a:endParaRPr lang="en-US"/>
           </a:p>
@@ -7730,7 +7730,7 @@
           <a:p>
             <a:fld id="{EC4347D3-4C9A-C240-8F14-750059DFEEB0}" type="datetimeFigureOut">
               <a:rPr lang="en-US" smtClean="0"/>
-              <a:t>8/22/24</a:t>
+              <a:t>8/27/24</a:t>
             </a:fld>
             <a:endParaRPr lang="en-US"/>
           </a:p>
@@ -7900,7 +7900,7 @@
           <a:p>
             <a:fld id="{EC4347D3-4C9A-C240-8F14-750059DFEEB0}" type="datetimeFigureOut">
               <a:rPr lang="en-US" smtClean="0"/>
-              <a:t>8/22/24</a:t>
+              <a:t>8/27/24</a:t>
             </a:fld>
             <a:endParaRPr lang="en-US"/>
           </a:p>
@@ -8150,7 +8150,7 @@
           <a:p>
             <a:fld id="{EC4347D3-4C9A-C240-8F14-750059DFEEB0}" type="datetimeFigureOut">
               <a:rPr lang="en-US" smtClean="0"/>
-              <a:t>8/22/24</a:t>
+              <a:t>8/27/24</a:t>
             </a:fld>
             <a:endParaRPr lang="en-US"/>
           </a:p>
@@ -8382,7 +8382,7 @@
           <a:p>
             <a:fld id="{EC4347D3-4C9A-C240-8F14-750059DFEEB0}" type="datetimeFigureOut">
               <a:rPr lang="en-US" smtClean="0"/>
-              <a:t>8/22/24</a:t>
+              <a:t>8/27/24</a:t>
             </a:fld>
             <a:endParaRPr lang="en-US"/>
           </a:p>
@@ -8768,7 +8768,7 @@
           <a:p>
             <a:fld id="{EC4347D3-4C9A-C240-8F14-750059DFEEB0}" type="datetimeFigureOut">
               <a:rPr lang="en-US" smtClean="0"/>
-              <a:t>8/22/24</a:t>
+              <a:t>8/27/24</a:t>
             </a:fld>
             <a:endParaRPr lang="en-US"/>
           </a:p>
@@ -8891,7 +8891,7 @@
           <a:p>
             <a:fld id="{EC4347D3-4C9A-C240-8F14-750059DFEEB0}" type="datetimeFigureOut">
               <a:rPr lang="en-US" smtClean="0"/>
-              <a:t>8/22/24</a:t>
+              <a:t>8/27/24</a:t>
             </a:fld>
             <a:endParaRPr lang="en-US"/>
           </a:p>
@@ -8986,7 +8986,7 @@
           <a:p>
             <a:fld id="{EC4347D3-4C9A-C240-8F14-750059DFEEB0}" type="datetimeFigureOut">
               <a:rPr lang="en-US" smtClean="0"/>
-              <a:t>8/22/24</a:t>
+              <a:t>8/27/24</a:t>
             </a:fld>
             <a:endParaRPr lang="en-US"/>
           </a:p>
@@ -9235,7 +9235,7 @@
           <a:p>
             <a:fld id="{EC4347D3-4C9A-C240-8F14-750059DFEEB0}" type="datetimeFigureOut">
               <a:rPr lang="en-US" smtClean="0"/>
-              <a:t>8/22/24</a:t>
+              <a:t>8/27/24</a:t>
             </a:fld>
             <a:endParaRPr lang="en-US"/>
           </a:p>
@@ -9520,7 +9520,7 @@
           <a:p>
             <a:fld id="{EC4347D3-4C9A-C240-8F14-750059DFEEB0}" type="datetimeFigureOut">
               <a:rPr lang="en-US" smtClean="0"/>
-              <a:t>8/22/24</a:t>
+              <a:t>8/27/24</a:t>
             </a:fld>
             <a:endParaRPr lang="en-US"/>
           </a:p>
@@ -9643,7 +9643,7 @@
           <a:noFill/>
           <a:extLst>
             <a:ext uri="{909E8E84-426E-40dd-AFC4-6F175D3DCCD1}">
-              <a14:hiddenFill xmlns="" xmlns:a14="http://schemas.microsoft.com/office/drawing/2010/main">
+              <a14:hiddenFill xmlns:a14="http://schemas.microsoft.com/office/drawing/2010/main" xmlns="">
                 <a:solidFill>
                   <a:srgbClr val="FFFFFF"/>
                 </a:solidFill>
@@ -9717,7 +9717,7 @@
               </a:ln>
               <a:extLst>
                 <a:ext uri="{91240B29-F687-4f45-9708-019B960494DF}">
-                  <a14:hiddenLine xmlns="" xmlns:a14="http://schemas.microsoft.com/office/drawing/2010/main" w="9525">
+                  <a14:hiddenLine xmlns:a14="http://schemas.microsoft.com/office/drawing/2010/main" xmlns="" w="9525">
                     <a:solidFill>
                       <a:srgbClr val="000000"/>
                     </a:solidFill>
@@ -9807,7 +9807,7 @@
               </a:ln>
               <a:extLst>
                 <a:ext uri="{91240B29-F687-4f45-9708-019B960494DF}">
-                  <a14:hiddenLine xmlns="" xmlns:a14="http://schemas.microsoft.com/office/drawing/2010/main" w="9525">
+                  <a14:hiddenLine xmlns:a14="http://schemas.microsoft.com/office/drawing/2010/main" xmlns="" w="9525">
                     <a:solidFill>
                       <a:srgbClr val="000000"/>
                     </a:solidFill>
@@ -9897,7 +9897,7 @@
               </a:ln>
               <a:extLst>
                 <a:ext uri="{91240B29-F687-4f45-9708-019B960494DF}">
-                  <a14:hiddenLine xmlns="" xmlns:a14="http://schemas.microsoft.com/office/drawing/2010/main" w="9525">
+                  <a14:hiddenLine xmlns:a14="http://schemas.microsoft.com/office/drawing/2010/main" xmlns="" w="9525">
                     <a:solidFill>
                       <a:srgbClr val="000000"/>
                     </a:solidFill>
@@ -9959,7 +9959,7 @@
               </a:ln>
               <a:extLst>
                 <a:ext uri="{91240B29-F687-4f45-9708-019B960494DF}">
-                  <a14:hiddenLine xmlns="" xmlns:a14="http://schemas.microsoft.com/office/drawing/2010/main" w="9525">
+                  <a14:hiddenLine xmlns:a14="http://schemas.microsoft.com/office/drawing/2010/main" xmlns="" w="9525">
                     <a:solidFill>
                       <a:srgbClr val="000000"/>
                     </a:solidFill>
@@ -10049,7 +10049,7 @@
               </a:ln>
               <a:extLst>
                 <a:ext uri="{91240B29-F687-4f45-9708-019B960494DF}">
-                  <a14:hiddenLine xmlns="" xmlns:a14="http://schemas.microsoft.com/office/drawing/2010/main" w="9525">
+                  <a14:hiddenLine xmlns:a14="http://schemas.microsoft.com/office/drawing/2010/main" xmlns="" w="9525">
                     <a:solidFill>
                       <a:srgbClr val="000000"/>
                     </a:solidFill>
@@ -10111,7 +10111,7 @@
               </a:ln>
               <a:extLst>
                 <a:ext uri="{91240B29-F687-4f45-9708-019B960494DF}">
-                  <a14:hiddenLine xmlns="" xmlns:a14="http://schemas.microsoft.com/office/drawing/2010/main" w="9525">
+                  <a14:hiddenLine xmlns:a14="http://schemas.microsoft.com/office/drawing/2010/main" xmlns="" w="9525">
                     <a:solidFill>
                       <a:srgbClr val="000000"/>
                     </a:solidFill>
@@ -10173,7 +10173,7 @@
               </a:ln>
               <a:extLst>
                 <a:ext uri="{91240B29-F687-4f45-9708-019B960494DF}">
-                  <a14:hiddenLine xmlns="" xmlns:a14="http://schemas.microsoft.com/office/drawing/2010/main" w="9525">
+                  <a14:hiddenLine xmlns:a14="http://schemas.microsoft.com/office/drawing/2010/main" xmlns="" w="9525">
                     <a:solidFill>
                       <a:srgbClr val="000000"/>
                     </a:solidFill>
@@ -10263,7 +10263,7 @@
               </a:ln>
               <a:extLst>
                 <a:ext uri="{91240B29-F687-4f45-9708-019B960494DF}">
-                  <a14:hiddenLine xmlns="" xmlns:a14="http://schemas.microsoft.com/office/drawing/2010/main" w="9525">
+                  <a14:hiddenLine xmlns:a14="http://schemas.microsoft.com/office/drawing/2010/main" xmlns="" w="9525">
                     <a:solidFill>
                       <a:srgbClr val="000000"/>
                     </a:solidFill>
@@ -10353,7 +10353,7 @@
               </a:ln>
               <a:extLst>
                 <a:ext uri="{91240B29-F687-4f45-9708-019B960494DF}">
-                  <a14:hiddenLine xmlns="" xmlns:a14="http://schemas.microsoft.com/office/drawing/2010/main" w="9525">
+                  <a14:hiddenLine xmlns:a14="http://schemas.microsoft.com/office/drawing/2010/main" xmlns="" w="9525">
                     <a:solidFill>
                       <a:srgbClr val="000000"/>
                     </a:solidFill>
@@ -10415,7 +10415,7 @@
               </a:ln>
               <a:extLst>
                 <a:ext uri="{91240B29-F687-4f45-9708-019B960494DF}">
-                  <a14:hiddenLine xmlns="" xmlns:a14="http://schemas.microsoft.com/office/drawing/2010/main" w="9525">
+                  <a14:hiddenLine xmlns:a14="http://schemas.microsoft.com/office/drawing/2010/main" xmlns="" w="9525">
                     <a:solidFill>
                       <a:srgbClr val="000000"/>
                     </a:solidFill>
@@ -10525,7 +10525,7 @@
               </a:ln>
               <a:extLst>
                 <a:ext uri="{91240B29-F687-4f45-9708-019B960494DF}">
-                  <a14:hiddenLine xmlns="" xmlns:a14="http://schemas.microsoft.com/office/drawing/2010/main" w="9525">
+                  <a14:hiddenLine xmlns:a14="http://schemas.microsoft.com/office/drawing/2010/main" xmlns="" w="9525">
                     <a:solidFill>
                       <a:srgbClr val="000000"/>
                     </a:solidFill>
@@ -10609,7 +10609,7 @@
               </a:ln>
               <a:extLst>
                 <a:ext uri="{91240B29-F687-4f45-9708-019B960494DF}">
-                  <a14:hiddenLine xmlns="" xmlns:a14="http://schemas.microsoft.com/office/drawing/2010/main" w="9525">
+                  <a14:hiddenLine xmlns:a14="http://schemas.microsoft.com/office/drawing/2010/main" xmlns="" w="9525">
                     <a:solidFill>
                       <a:srgbClr val="000000"/>
                     </a:solidFill>
@@ -10671,7 +10671,7 @@
               </a:ln>
               <a:extLst>
                 <a:ext uri="{91240B29-F687-4f45-9708-019B960494DF}">
-                  <a14:hiddenLine xmlns="" xmlns:a14="http://schemas.microsoft.com/office/drawing/2010/main" w="9525">
+                  <a14:hiddenLine xmlns:a14="http://schemas.microsoft.com/office/drawing/2010/main" xmlns="" w="9525">
                     <a:solidFill>
                       <a:srgbClr val="000000"/>
                     </a:solidFill>
@@ -10733,7 +10733,7 @@
               </a:ln>
               <a:extLst>
                 <a:ext uri="{91240B29-F687-4f45-9708-019B960494DF}">
-                  <a14:hiddenLine xmlns="" xmlns:a14="http://schemas.microsoft.com/office/drawing/2010/main" w="9525">
+                  <a14:hiddenLine xmlns:a14="http://schemas.microsoft.com/office/drawing/2010/main" xmlns="" w="9525">
                     <a:solidFill>
                       <a:srgbClr val="000000"/>
                     </a:solidFill>
@@ -10823,7 +10823,7 @@
               </a:ln>
               <a:extLst>
                 <a:ext uri="{91240B29-F687-4f45-9708-019B960494DF}">
-                  <a14:hiddenLine xmlns="" xmlns:a14="http://schemas.microsoft.com/office/drawing/2010/main" w="9525">
+                  <a14:hiddenLine xmlns:a14="http://schemas.microsoft.com/office/drawing/2010/main" xmlns="" w="9525">
                     <a:solidFill>
                       <a:srgbClr val="000000"/>
                     </a:solidFill>
@@ -10857,7 +10857,7 @@
               </a:ln>
               <a:extLst>
                 <a:ext uri="{91240B29-F687-4f45-9708-019B960494DF}">
-                  <a14:hiddenLine xmlns="" xmlns:a14="http://schemas.microsoft.com/office/drawing/2010/main" w="9525">
+                  <a14:hiddenLine xmlns:a14="http://schemas.microsoft.com/office/drawing/2010/main" xmlns="" w="9525">
                     <a:solidFill>
                       <a:srgbClr val="000000"/>
                     </a:solidFill>
@@ -10922,7 +10922,7 @@
               </a:ln>
               <a:extLst>
                 <a:ext uri="{91240B29-F687-4f45-9708-019B960494DF}">
-                  <a14:hiddenLine xmlns="" xmlns:a14="http://schemas.microsoft.com/office/drawing/2010/main" w="9525">
+                  <a14:hiddenLine xmlns:a14="http://schemas.microsoft.com/office/drawing/2010/main" xmlns="" w="9525">
                     <a:solidFill>
                       <a:srgbClr val="000000"/>
                     </a:solidFill>
@@ -11012,7 +11012,7 @@
               </a:ln>
               <a:extLst>
                 <a:ext uri="{91240B29-F687-4f45-9708-019B960494DF}">
-                  <a14:hiddenLine xmlns="" xmlns:a14="http://schemas.microsoft.com/office/drawing/2010/main" w="9525">
+                  <a14:hiddenLine xmlns:a14="http://schemas.microsoft.com/office/drawing/2010/main" xmlns="" w="9525">
                     <a:solidFill>
                       <a:srgbClr val="000000"/>
                     </a:solidFill>
@@ -11074,7 +11074,7 @@
               </a:ln>
               <a:extLst>
                 <a:ext uri="{91240B29-F687-4f45-9708-019B960494DF}">
-                  <a14:hiddenLine xmlns="" xmlns:a14="http://schemas.microsoft.com/office/drawing/2010/main" w="9525">
+                  <a14:hiddenLine xmlns:a14="http://schemas.microsoft.com/office/drawing/2010/main" xmlns="" w="9525">
                     <a:solidFill>
                       <a:srgbClr val="000000"/>
                     </a:solidFill>
@@ -11164,7 +11164,7 @@
               </a:ln>
               <a:extLst>
                 <a:ext uri="{91240B29-F687-4f45-9708-019B960494DF}">
-                  <a14:hiddenLine xmlns="" xmlns:a14="http://schemas.microsoft.com/office/drawing/2010/main" w="9525">
+                  <a14:hiddenLine xmlns:a14="http://schemas.microsoft.com/office/drawing/2010/main" xmlns="" w="9525">
                     <a:solidFill>
                       <a:srgbClr val="000000"/>
                     </a:solidFill>
@@ -11229,7 +11229,7 @@
               </a:ln>
               <a:extLst>
                 <a:ext uri="{91240B29-F687-4f45-9708-019B960494DF}">
-                  <a14:hiddenLine xmlns="" xmlns:a14="http://schemas.microsoft.com/office/drawing/2010/main" w="9525">
+                  <a14:hiddenLine xmlns:a14="http://schemas.microsoft.com/office/drawing/2010/main" xmlns="" w="9525">
                     <a:solidFill>
                       <a:srgbClr val="000000"/>
                     </a:solidFill>
@@ -11291,7 +11291,7 @@
               </a:ln>
               <a:extLst>
                 <a:ext uri="{91240B29-F687-4f45-9708-019B960494DF}">
-                  <a14:hiddenLine xmlns="" xmlns:a14="http://schemas.microsoft.com/office/drawing/2010/main" w="9525">
+                  <a14:hiddenLine xmlns:a14="http://schemas.microsoft.com/office/drawing/2010/main" xmlns="" w="9525">
                     <a:solidFill>
                       <a:srgbClr val="000000"/>
                     </a:solidFill>
@@ -11381,7 +11381,7 @@
               </a:ln>
               <a:extLst>
                 <a:ext uri="{91240B29-F687-4f45-9708-019B960494DF}">
-                  <a14:hiddenLine xmlns="" xmlns:a14="http://schemas.microsoft.com/office/drawing/2010/main" w="9525">
+                  <a14:hiddenLine xmlns:a14="http://schemas.microsoft.com/office/drawing/2010/main" xmlns="" w="9525">
                     <a:solidFill>
                       <a:srgbClr val="000000"/>
                     </a:solidFill>
@@ -11471,7 +11471,7 @@
               </a:ln>
               <a:extLst>
                 <a:ext uri="{91240B29-F687-4f45-9708-019B960494DF}">
-                  <a14:hiddenLine xmlns="" xmlns:a14="http://schemas.microsoft.com/office/drawing/2010/main" w="9525">
+                  <a14:hiddenLine xmlns:a14="http://schemas.microsoft.com/office/drawing/2010/main" xmlns="" w="9525">
                     <a:solidFill>
                       <a:srgbClr val="000000"/>
                     </a:solidFill>
@@ -11536,7 +11536,7 @@
               </a:ln>
               <a:extLst>
                 <a:ext uri="{91240B29-F687-4f45-9708-019B960494DF}">
-                  <a14:hiddenLine xmlns="" xmlns:a14="http://schemas.microsoft.com/office/drawing/2010/main" w="9525">
+                  <a14:hiddenLine xmlns:a14="http://schemas.microsoft.com/office/drawing/2010/main" xmlns="" w="9525">
                     <a:solidFill>
                       <a:srgbClr val="000000"/>
                     </a:solidFill>
@@ -11656,7 +11656,7 @@
               </a:ln>
               <a:extLst>
                 <a:ext uri="{91240B29-F687-4f45-9708-019B960494DF}">
-                  <a14:hiddenLine xmlns="" xmlns:a14="http://schemas.microsoft.com/office/drawing/2010/main" w="9525">
+                  <a14:hiddenLine xmlns:a14="http://schemas.microsoft.com/office/drawing/2010/main" xmlns="" w="9525">
                     <a:solidFill>
                       <a:srgbClr val="000000"/>
                     </a:solidFill>
@@ -11737,7 +11737,7 @@
               </a:ln>
               <a:extLst>
                 <a:ext uri="{91240B29-F687-4f45-9708-019B960494DF}">
-                  <a14:hiddenLine xmlns="" xmlns:a14="http://schemas.microsoft.com/office/drawing/2010/main" w="9525">
+                  <a14:hiddenLine xmlns:a14="http://schemas.microsoft.com/office/drawing/2010/main" xmlns="" w="9525">
                     <a:solidFill>
                       <a:srgbClr val="000000"/>
                     </a:solidFill>
@@ -11852,7 +11852,7 @@
               </a:ln>
               <a:extLst>
                 <a:ext uri="{91240B29-F687-4f45-9708-019B960494DF}">
-                  <a14:hiddenLine xmlns="" xmlns:a14="http://schemas.microsoft.com/office/drawing/2010/main" w="9525">
+                  <a14:hiddenLine xmlns:a14="http://schemas.microsoft.com/office/drawing/2010/main" xmlns="" w="9525">
                     <a:solidFill>
                       <a:srgbClr val="000000"/>
                     </a:solidFill>
@@ -11942,7 +11942,7 @@
               </a:ln>
               <a:extLst>
                 <a:ext uri="{91240B29-F687-4f45-9708-019B960494DF}">
-                  <a14:hiddenLine xmlns="" xmlns:a14="http://schemas.microsoft.com/office/drawing/2010/main" w="9525">
+                  <a14:hiddenLine xmlns:a14="http://schemas.microsoft.com/office/drawing/2010/main" xmlns="" w="9525">
                     <a:solidFill>
                       <a:srgbClr val="000000"/>
                     </a:solidFill>
@@ -12007,7 +12007,7 @@
               </a:ln>
               <a:extLst>
                 <a:ext uri="{91240B29-F687-4f45-9708-019B960494DF}">
-                  <a14:hiddenLine xmlns="" xmlns:a14="http://schemas.microsoft.com/office/drawing/2010/main" w="9525">
+                  <a14:hiddenLine xmlns:a14="http://schemas.microsoft.com/office/drawing/2010/main" xmlns="" w="9525">
                     <a:solidFill>
                       <a:srgbClr val="000000"/>
                     </a:solidFill>
@@ -12097,7 +12097,7 @@
               </a:ln>
               <a:extLst>
                 <a:ext uri="{91240B29-F687-4f45-9708-019B960494DF}">
-                  <a14:hiddenLine xmlns="" xmlns:a14="http://schemas.microsoft.com/office/drawing/2010/main" w="9525">
+                  <a14:hiddenLine xmlns:a14="http://schemas.microsoft.com/office/drawing/2010/main" xmlns="" w="9525">
                     <a:solidFill>
                       <a:srgbClr val="000000"/>
                     </a:solidFill>
@@ -12165,7 +12165,7 @@
               </a:ln>
               <a:extLst>
                 <a:ext uri="{91240B29-F687-4f45-9708-019B960494DF}">
-                  <a14:hiddenLine xmlns="" xmlns:a14="http://schemas.microsoft.com/office/drawing/2010/main" w="9525">
+                  <a14:hiddenLine xmlns:a14="http://schemas.microsoft.com/office/drawing/2010/main" xmlns="" w="9525">
                     <a:solidFill>
                       <a:srgbClr val="000000"/>
                     </a:solidFill>
@@ -12255,7 +12255,7 @@
               </a:ln>
               <a:extLst>
                 <a:ext uri="{91240B29-F687-4f45-9708-019B960494DF}">
-                  <a14:hiddenLine xmlns="" xmlns:a14="http://schemas.microsoft.com/office/drawing/2010/main" w="9525">
+                  <a14:hiddenLine xmlns:a14="http://schemas.microsoft.com/office/drawing/2010/main" xmlns="" w="9525">
                     <a:solidFill>
                       <a:srgbClr val="000000"/>
                     </a:solidFill>
@@ -12323,7 +12323,7 @@
               </a:ln>
               <a:extLst>
                 <a:ext uri="{91240B29-F687-4f45-9708-019B960494DF}">
-                  <a14:hiddenLine xmlns="" xmlns:a14="http://schemas.microsoft.com/office/drawing/2010/main" w="9525">
+                  <a14:hiddenLine xmlns:a14="http://schemas.microsoft.com/office/drawing/2010/main" xmlns="" w="9525">
                     <a:solidFill>
                       <a:srgbClr val="000000"/>
                     </a:solidFill>
@@ -12413,7 +12413,7 @@
               </a:ln>
               <a:extLst>
                 <a:ext uri="{91240B29-F687-4f45-9708-019B960494DF}">
-                  <a14:hiddenLine xmlns="" xmlns:a14="http://schemas.microsoft.com/office/drawing/2010/main" w="9525">
+                  <a14:hiddenLine xmlns:a14="http://schemas.microsoft.com/office/drawing/2010/main" xmlns="" w="9525">
                     <a:solidFill>
                       <a:srgbClr val="000000"/>
                     </a:solidFill>
@@ -12447,7 +12447,7 @@
               </a:ln>
               <a:extLst>
                 <a:ext uri="{91240B29-F687-4f45-9708-019B960494DF}">
-                  <a14:hiddenLine xmlns="" xmlns:a14="http://schemas.microsoft.com/office/drawing/2010/main" w="9525">
+                  <a14:hiddenLine xmlns:a14="http://schemas.microsoft.com/office/drawing/2010/main" xmlns="" w="9525">
                     <a:solidFill>
                       <a:srgbClr val="000000"/>
                     </a:solidFill>
@@ -12587,7 +12587,7 @@
           <a:p>
             <a:fld id="{EC4347D3-4C9A-C240-8F14-750059DFEEB0}" type="datetimeFigureOut">
               <a:rPr lang="en-US" smtClean="0"/>
-              <a:t>8/22/24</a:t>
+              <a:t>8/27/24</a:t>
             </a:fld>
             <a:endParaRPr lang="en-US"/>
           </a:p>
@@ -13228,6 +13228,17 @@
             </a:pPr>
             <a:r>
               <a:rPr lang="en-US" dirty="0"/>
+              <a:t>Please do not use a laptop in class</a:t>
+            </a:r>
+          </a:p>
+          <a:p>
+            <a:pPr lvl="1">
+              <a:lnSpc>
+                <a:spcPct val="90000"/>
+              </a:lnSpc>
+            </a:pPr>
+            <a:r>
+              <a:rPr lang="en-US" dirty="0"/>
               <a:t>Plan ahead.</a:t>
             </a:r>
           </a:p>
@@ -13377,7 +13388,7 @@
                                         <p:tgtEl>
                                           <p:spTgt spid="307203">
                                             <p:txEl>
-                                              <p:pRg st="7" end="7"/>
+                                              <p:pRg st="8" end="8"/>
                                             </p:txEl>
                                           </p:spTgt>
                                         </p:tgtEl>
@@ -13408,7 +13419,7 @@
                                         <p:tgtEl>
                                           <p:spTgt spid="307203">
                                             <p:txEl>
-                                              <p:pRg st="8" end="8"/>
+                                              <p:pRg st="9" end="9"/>
                                             </p:txEl>
                                           </p:spTgt>
                                         </p:tgtEl>
@@ -13439,7 +13450,7 @@
                                         <p:tgtEl>
                                           <p:spTgt spid="307203">
                                             <p:txEl>
-                                              <p:pRg st="9" end="9"/>
+                                              <p:pRg st="10" end="10"/>
                                             </p:txEl>
                                           </p:spTgt>
                                         </p:tgtEl>
@@ -13470,7 +13481,7 @@
                                         <p:tgtEl>
                                           <p:spTgt spid="307203">
                                             <p:txEl>
-                                              <p:pRg st="10" end="10"/>
+                                              <p:pRg st="11" end="11"/>
                                             </p:txEl>
                                           </p:spTgt>
                                         </p:tgtEl>
@@ -13501,7 +13512,7 @@
                                         <p:tgtEl>
                                           <p:spTgt spid="307203">
                                             <p:txEl>
-                                              <p:pRg st="11" end="11"/>
+                                              <p:pRg st="12" end="12"/>
                                             </p:txEl>
                                           </p:spTgt>
                                         </p:tgtEl>
@@ -14780,15 +14791,7 @@
             <a:pPr lvl="1"/>
             <a:r>
               <a:rPr lang="en-US" sz="2000" dirty="0"/>
-              <a:t>Dec. </a:t>
-            </a:r>
-            <a:r>
-              <a:rPr lang="en-US" dirty="0"/>
-              <a:t>7</a:t>
-            </a:r>
-            <a:r>
-              <a:rPr lang="en-US" sz="2000" dirty="0"/>
-              <a:t> (Maybe</a:t>
+              <a:t>Dec. 9 (Maybe</a:t>
             </a:r>
             <a:r>
               <a:rPr lang="en-US" dirty="0"/>
@@ -17974,7 +17977,7 @@
             <a:pPr lvl="1"/>
             <a:r>
               <a:rPr lang="en-US" dirty="0"/>
-              <a:t>Also, we’ll use Piazza for questions and Discord for office hours</a:t>
+              <a:t>Also, we’ll use Piazza for questions.</a:t>
             </a:r>
           </a:p>
           <a:p>

</xml_diff>

<commit_message>
updating some course policies
</commit_message>
<xml_diff>
--- a/slides/00-CourseIntroduction.pptx
+++ b/slides/00-CourseIntroduction.pptx
@@ -5,7 +5,7 @@
     <p:sldMasterId id="2147484006" r:id="rId1"/>
   </p:sldMasterIdLst>
   <p:notesMasterIdLst>
-    <p:notesMasterId r:id="rId32"/>
+    <p:notesMasterId r:id="rId31"/>
   </p:notesMasterIdLst>
   <p:sldIdLst>
     <p:sldId id="256" r:id="rId2"/>
@@ -32,12 +32,11 @@
     <p:sldId id="506" r:id="rId23"/>
     <p:sldId id="491" r:id="rId24"/>
     <p:sldId id="496" r:id="rId25"/>
-    <p:sldId id="471" r:id="rId26"/>
-    <p:sldId id="485" r:id="rId27"/>
-    <p:sldId id="463" r:id="rId28"/>
-    <p:sldId id="502" r:id="rId29"/>
-    <p:sldId id="464" r:id="rId30"/>
-    <p:sldId id="514" r:id="rId31"/>
+    <p:sldId id="463" r:id="rId26"/>
+    <p:sldId id="502" r:id="rId27"/>
+    <p:sldId id="464" r:id="rId28"/>
+    <p:sldId id="515" r:id="rId29"/>
+    <p:sldId id="514" r:id="rId30"/>
   </p:sldIdLst>
   <p:sldSz cx="12192000" cy="6858000"/>
   <p:notesSz cx="6858000" cy="9144000"/>
@@ -226,7 +225,7 @@
           <a:p>
             <a:fld id="{C5B45307-6ED4-B142-BD64-10F739779302}" type="datetimeFigureOut">
               <a:rPr lang="en-US" smtClean="0"/>
-              <a:t>1/8/25</a:t>
+              <a:t>1/13/25</a:t>
             </a:fld>
             <a:endParaRPr lang="en-US"/>
           </a:p>
@@ -729,7 +728,7 @@
           <a:noFill/>
           <a:extLst>
             <a:ext uri="{909E8E84-426E-40dd-AFC4-6F175D3DCCD1}">
-              <a14:hiddenFill xmlns="" xmlns:a14="http://schemas.microsoft.com/office/drawing/2010/main">
+              <a14:hiddenFill xmlns:a14="http://schemas.microsoft.com/office/drawing/2010/main" xmlns="">
                 <a:solidFill>
                   <a:srgbClr val="FFFFFF"/>
                 </a:solidFill>
@@ -788,7 +787,7 @@
             </a:ln>
             <a:extLst>
               <a:ext uri="{91240B29-F687-4f45-9708-019B960494DF}">
-                <a14:hiddenLine xmlns="" xmlns:a14="http://schemas.microsoft.com/office/drawing/2010/main" w="9525">
+                <a14:hiddenLine xmlns:a14="http://schemas.microsoft.com/office/drawing/2010/main" xmlns="" w="9525">
                   <a:solidFill>
                     <a:srgbClr val="000000"/>
                   </a:solidFill>
@@ -878,7 +877,7 @@
             </a:ln>
             <a:extLst>
               <a:ext uri="{91240B29-F687-4f45-9708-019B960494DF}">
-                <a14:hiddenLine xmlns="" xmlns:a14="http://schemas.microsoft.com/office/drawing/2010/main" w="9525">
+                <a14:hiddenLine xmlns:a14="http://schemas.microsoft.com/office/drawing/2010/main" xmlns="" w="9525">
                   <a:solidFill>
                     <a:srgbClr val="000000"/>
                   </a:solidFill>
@@ -968,7 +967,7 @@
             </a:ln>
             <a:extLst>
               <a:ext uri="{91240B29-F687-4f45-9708-019B960494DF}">
-                <a14:hiddenLine xmlns="" xmlns:a14="http://schemas.microsoft.com/office/drawing/2010/main" w="9525">
+                <a14:hiddenLine xmlns:a14="http://schemas.microsoft.com/office/drawing/2010/main" xmlns="" w="9525">
                   <a:solidFill>
                     <a:srgbClr val="000000"/>
                   </a:solidFill>
@@ -1002,7 +1001,7 @@
             </a:ln>
             <a:extLst>
               <a:ext uri="{91240B29-F687-4f45-9708-019B960494DF}">
-                <a14:hiddenLine xmlns="" xmlns:a14="http://schemas.microsoft.com/office/drawing/2010/main" w="9525">
+                <a14:hiddenLine xmlns:a14="http://schemas.microsoft.com/office/drawing/2010/main" xmlns="" w="9525">
                   <a:solidFill>
                     <a:srgbClr val="000000"/>
                   </a:solidFill>
@@ -1092,7 +1091,7 @@
             </a:ln>
             <a:extLst>
               <a:ext uri="{91240B29-F687-4f45-9708-019B960494DF}">
-                <a14:hiddenLine xmlns="" xmlns:a14="http://schemas.microsoft.com/office/drawing/2010/main" w="9525">
+                <a14:hiddenLine xmlns:a14="http://schemas.microsoft.com/office/drawing/2010/main" xmlns="" w="9525">
                   <a:solidFill>
                     <a:srgbClr val="000000"/>
                   </a:solidFill>
@@ -1154,7 +1153,7 @@
             </a:ln>
             <a:extLst>
               <a:ext uri="{91240B29-F687-4f45-9708-019B960494DF}">
-                <a14:hiddenLine xmlns="" xmlns:a14="http://schemas.microsoft.com/office/drawing/2010/main" w="9525">
+                <a14:hiddenLine xmlns:a14="http://schemas.microsoft.com/office/drawing/2010/main" xmlns="" w="9525">
                   <a:solidFill>
                     <a:srgbClr val="000000"/>
                   </a:solidFill>
@@ -1216,7 +1215,7 @@
             </a:ln>
             <a:extLst>
               <a:ext uri="{91240B29-F687-4f45-9708-019B960494DF}">
-                <a14:hiddenLine xmlns="" xmlns:a14="http://schemas.microsoft.com/office/drawing/2010/main" w="9525">
+                <a14:hiddenLine xmlns:a14="http://schemas.microsoft.com/office/drawing/2010/main" xmlns="" w="9525">
                   <a:solidFill>
                     <a:srgbClr val="000000"/>
                   </a:solidFill>
@@ -1306,7 +1305,7 @@
             </a:ln>
             <a:extLst>
               <a:ext uri="{91240B29-F687-4f45-9708-019B960494DF}">
-                <a14:hiddenLine xmlns="" xmlns:a14="http://schemas.microsoft.com/office/drawing/2010/main" w="9525">
+                <a14:hiddenLine xmlns:a14="http://schemas.microsoft.com/office/drawing/2010/main" xmlns="" w="9525">
                   <a:solidFill>
                     <a:srgbClr val="000000"/>
                   </a:solidFill>
@@ -1368,7 +1367,7 @@
             </a:ln>
             <a:extLst>
               <a:ext uri="{91240B29-F687-4f45-9708-019B960494DF}">
-                <a14:hiddenLine xmlns="" xmlns:a14="http://schemas.microsoft.com/office/drawing/2010/main" w="9525">
+                <a14:hiddenLine xmlns:a14="http://schemas.microsoft.com/office/drawing/2010/main" xmlns="" w="9525">
                   <a:solidFill>
                     <a:srgbClr val="000000"/>
                   </a:solidFill>
@@ -1430,7 +1429,7 @@
             </a:ln>
             <a:extLst>
               <a:ext uri="{91240B29-F687-4f45-9708-019B960494DF}">
-                <a14:hiddenLine xmlns="" xmlns:a14="http://schemas.microsoft.com/office/drawing/2010/main" w="9525">
+                <a14:hiddenLine xmlns:a14="http://schemas.microsoft.com/office/drawing/2010/main" xmlns="" w="9525">
                   <a:solidFill>
                     <a:srgbClr val="000000"/>
                   </a:solidFill>
@@ -1520,7 +1519,7 @@
             </a:ln>
             <a:extLst>
               <a:ext uri="{91240B29-F687-4f45-9708-019B960494DF}">
-                <a14:hiddenLine xmlns="" xmlns:a14="http://schemas.microsoft.com/office/drawing/2010/main" w="9525">
+                <a14:hiddenLine xmlns:a14="http://schemas.microsoft.com/office/drawing/2010/main" xmlns="" w="9525">
                   <a:solidFill>
                     <a:srgbClr val="000000"/>
                   </a:solidFill>
@@ -1610,7 +1609,7 @@
             </a:ln>
             <a:extLst>
               <a:ext uri="{91240B29-F687-4f45-9708-019B960494DF}">
-                <a14:hiddenLine xmlns="" xmlns:a14="http://schemas.microsoft.com/office/drawing/2010/main" w="9525">
+                <a14:hiddenLine xmlns:a14="http://schemas.microsoft.com/office/drawing/2010/main" xmlns="" w="9525">
                   <a:solidFill>
                     <a:srgbClr val="000000"/>
                   </a:solidFill>
@@ -1672,7 +1671,7 @@
             </a:ln>
             <a:extLst>
               <a:ext uri="{91240B29-F687-4f45-9708-019B960494DF}">
-                <a14:hiddenLine xmlns="" xmlns:a14="http://schemas.microsoft.com/office/drawing/2010/main" w="9525">
+                <a14:hiddenLine xmlns:a14="http://schemas.microsoft.com/office/drawing/2010/main" xmlns="" w="9525">
                   <a:solidFill>
                     <a:srgbClr val="000000"/>
                   </a:solidFill>
@@ -1782,7 +1781,7 @@
             </a:ln>
             <a:extLst>
               <a:ext uri="{91240B29-F687-4f45-9708-019B960494DF}">
-                <a14:hiddenLine xmlns="" xmlns:a14="http://schemas.microsoft.com/office/drawing/2010/main" w="9525">
+                <a14:hiddenLine xmlns:a14="http://schemas.microsoft.com/office/drawing/2010/main" xmlns="" w="9525">
                   <a:solidFill>
                     <a:srgbClr val="000000"/>
                   </a:solidFill>
@@ -1844,7 +1843,7 @@
             </a:ln>
             <a:extLst>
               <a:ext uri="{91240B29-F687-4f45-9708-019B960494DF}">
-                <a14:hiddenLine xmlns="" xmlns:a14="http://schemas.microsoft.com/office/drawing/2010/main" w="9525">
+                <a14:hiddenLine xmlns:a14="http://schemas.microsoft.com/office/drawing/2010/main" xmlns="" w="9525">
                   <a:solidFill>
                     <a:srgbClr val="000000"/>
                   </a:solidFill>
@@ -1934,7 +1933,7 @@
             </a:ln>
             <a:extLst>
               <a:ext uri="{91240B29-F687-4f45-9708-019B960494DF}">
-                <a14:hiddenLine xmlns="" xmlns:a14="http://schemas.microsoft.com/office/drawing/2010/main" w="9525">
+                <a14:hiddenLine xmlns:a14="http://schemas.microsoft.com/office/drawing/2010/main" xmlns="" w="9525">
                   <a:solidFill>
                     <a:srgbClr val="000000"/>
                   </a:solidFill>
@@ -2024,7 +2023,7 @@
             </a:ln>
             <a:extLst>
               <a:ext uri="{91240B29-F687-4f45-9708-019B960494DF}">
-                <a14:hiddenLine xmlns="" xmlns:a14="http://schemas.microsoft.com/office/drawing/2010/main" w="9525">
+                <a14:hiddenLine xmlns:a14="http://schemas.microsoft.com/office/drawing/2010/main" xmlns="" w="9525">
                   <a:solidFill>
                     <a:srgbClr val="000000"/>
                   </a:solidFill>
@@ -2086,7 +2085,7 @@
             </a:ln>
             <a:extLst>
               <a:ext uri="{91240B29-F687-4f45-9708-019B960494DF}">
-                <a14:hiddenLine xmlns="" xmlns:a14="http://schemas.microsoft.com/office/drawing/2010/main" w="9525">
+                <a14:hiddenLine xmlns:a14="http://schemas.microsoft.com/office/drawing/2010/main" xmlns="" w="9525">
                   <a:solidFill>
                     <a:srgbClr val="000000"/>
                   </a:solidFill>
@@ -2176,7 +2175,7 @@
             </a:ln>
             <a:extLst>
               <a:ext uri="{91240B29-F687-4f45-9708-019B960494DF}">
-                <a14:hiddenLine xmlns="" xmlns:a14="http://schemas.microsoft.com/office/drawing/2010/main" w="9525">
+                <a14:hiddenLine xmlns:a14="http://schemas.microsoft.com/office/drawing/2010/main" xmlns="" w="9525">
                   <a:solidFill>
                     <a:srgbClr val="000000"/>
                   </a:solidFill>
@@ -2266,7 +2265,7 @@
             </a:ln>
             <a:extLst>
               <a:ext uri="{91240B29-F687-4f45-9708-019B960494DF}">
-                <a14:hiddenLine xmlns="" xmlns:a14="http://schemas.microsoft.com/office/drawing/2010/main" w="9525">
+                <a14:hiddenLine xmlns:a14="http://schemas.microsoft.com/office/drawing/2010/main" xmlns="" w="9525">
                   <a:solidFill>
                     <a:srgbClr val="000000"/>
                   </a:solidFill>
@@ -2322,7 +2321,7 @@
             </a:ln>
             <a:extLst>
               <a:ext uri="{91240B29-F687-4f45-9708-019B960494DF}">
-                <a14:hiddenLine xmlns="" xmlns:a14="http://schemas.microsoft.com/office/drawing/2010/main" w="9525">
+                <a14:hiddenLine xmlns:a14="http://schemas.microsoft.com/office/drawing/2010/main" xmlns="" w="9525">
                   <a:solidFill>
                     <a:srgbClr val="000000"/>
                   </a:solidFill>
@@ -2412,7 +2411,7 @@
             </a:ln>
             <a:extLst>
               <a:ext uri="{91240B29-F687-4f45-9708-019B960494DF}">
-                <a14:hiddenLine xmlns="" xmlns:a14="http://schemas.microsoft.com/office/drawing/2010/main" w="9525">
+                <a14:hiddenLine xmlns:a14="http://schemas.microsoft.com/office/drawing/2010/main" xmlns="" w="9525">
                   <a:solidFill>
                     <a:srgbClr val="000000"/>
                   </a:solidFill>
@@ -2468,7 +2467,7 @@
             </a:ln>
             <a:extLst>
               <a:ext uri="{91240B29-F687-4f45-9708-019B960494DF}">
-                <a14:hiddenLine xmlns="" xmlns:a14="http://schemas.microsoft.com/office/drawing/2010/main" w="9525">
+                <a14:hiddenLine xmlns:a14="http://schemas.microsoft.com/office/drawing/2010/main" xmlns="" w="9525">
                   <a:solidFill>
                     <a:srgbClr val="000000"/>
                   </a:solidFill>
@@ -2558,7 +2557,7 @@
             </a:ln>
             <a:extLst>
               <a:ext uri="{91240B29-F687-4f45-9708-019B960494DF}">
-                <a14:hiddenLine xmlns="" xmlns:a14="http://schemas.microsoft.com/office/drawing/2010/main" w="9525">
+                <a14:hiddenLine xmlns:a14="http://schemas.microsoft.com/office/drawing/2010/main" xmlns="" w="9525">
                   <a:solidFill>
                     <a:srgbClr val="000000"/>
                   </a:solidFill>
@@ -2626,7 +2625,7 @@
             </a:ln>
             <a:extLst>
               <a:ext uri="{91240B29-F687-4f45-9708-019B960494DF}">
-                <a14:hiddenLine xmlns="" xmlns:a14="http://schemas.microsoft.com/office/drawing/2010/main" w="9525">
+                <a14:hiddenLine xmlns:a14="http://schemas.microsoft.com/office/drawing/2010/main" xmlns="" w="9525">
                   <a:solidFill>
                     <a:srgbClr val="000000"/>
                   </a:solidFill>
@@ -2716,7 +2715,7 @@
             </a:ln>
             <a:extLst>
               <a:ext uri="{91240B29-F687-4f45-9708-019B960494DF}">
-                <a14:hiddenLine xmlns="" xmlns:a14="http://schemas.microsoft.com/office/drawing/2010/main" w="9525">
+                <a14:hiddenLine xmlns:a14="http://schemas.microsoft.com/office/drawing/2010/main" xmlns="" w="9525">
                   <a:solidFill>
                     <a:srgbClr val="000000"/>
                   </a:solidFill>
@@ -2784,7 +2783,7 @@
             </a:ln>
             <a:extLst>
               <a:ext uri="{91240B29-F687-4f45-9708-019B960494DF}">
-                <a14:hiddenLine xmlns="" xmlns:a14="http://schemas.microsoft.com/office/drawing/2010/main" w="9525">
+                <a14:hiddenLine xmlns:a14="http://schemas.microsoft.com/office/drawing/2010/main" xmlns="" w="9525">
                   <a:solidFill>
                     <a:srgbClr val="000000"/>
                   </a:solidFill>
@@ -2874,7 +2873,7 @@
             </a:ln>
             <a:extLst>
               <a:ext uri="{91240B29-F687-4f45-9708-019B960494DF}">
-                <a14:hiddenLine xmlns="" xmlns:a14="http://schemas.microsoft.com/office/drawing/2010/main" w="9525">
+                <a14:hiddenLine xmlns:a14="http://schemas.microsoft.com/office/drawing/2010/main" xmlns="" w="9525">
                   <a:solidFill>
                     <a:srgbClr val="000000"/>
                   </a:solidFill>
@@ -2908,7 +2907,7 @@
             </a:ln>
             <a:extLst>
               <a:ext uri="{91240B29-F687-4f45-9708-019B960494DF}">
-                <a14:hiddenLine xmlns="" xmlns:a14="http://schemas.microsoft.com/office/drawing/2010/main" w="9525">
+                <a14:hiddenLine xmlns:a14="http://schemas.microsoft.com/office/drawing/2010/main" xmlns="" w="9525">
                   <a:solidFill>
                     <a:srgbClr val="000000"/>
                   </a:solidFill>
@@ -2998,7 +2997,7 @@
             </a:ln>
             <a:extLst>
               <a:ext uri="{91240B29-F687-4f45-9708-019B960494DF}">
-                <a14:hiddenLine xmlns="" xmlns:a14="http://schemas.microsoft.com/office/drawing/2010/main" w="9525">
+                <a14:hiddenLine xmlns:a14="http://schemas.microsoft.com/office/drawing/2010/main" xmlns="" w="9525">
                   <a:solidFill>
                     <a:srgbClr val="000000"/>
                   </a:solidFill>
@@ -3060,7 +3059,7 @@
             </a:ln>
             <a:extLst>
               <a:ext uri="{91240B29-F687-4f45-9708-019B960494DF}">
-                <a14:hiddenLine xmlns="" xmlns:a14="http://schemas.microsoft.com/office/drawing/2010/main" w="9525">
+                <a14:hiddenLine xmlns:a14="http://schemas.microsoft.com/office/drawing/2010/main" xmlns="" w="9525">
                   <a:solidFill>
                     <a:srgbClr val="000000"/>
                   </a:solidFill>
@@ -3122,7 +3121,7 @@
             </a:ln>
             <a:extLst>
               <a:ext uri="{91240B29-F687-4f45-9708-019B960494DF}">
-                <a14:hiddenLine xmlns="" xmlns:a14="http://schemas.microsoft.com/office/drawing/2010/main" w="9525">
+                <a14:hiddenLine xmlns:a14="http://schemas.microsoft.com/office/drawing/2010/main" xmlns="" w="9525">
                   <a:solidFill>
                     <a:srgbClr val="000000"/>
                   </a:solidFill>
@@ -3212,7 +3211,7 @@
             </a:ln>
             <a:extLst>
               <a:ext uri="{91240B29-F687-4f45-9708-019B960494DF}">
-                <a14:hiddenLine xmlns="" xmlns:a14="http://schemas.microsoft.com/office/drawing/2010/main" w="9525">
+                <a14:hiddenLine xmlns:a14="http://schemas.microsoft.com/office/drawing/2010/main" xmlns="" w="9525">
                   <a:solidFill>
                     <a:srgbClr val="000000"/>
                   </a:solidFill>
@@ -3280,7 +3279,7 @@
             </a:ln>
             <a:extLst>
               <a:ext uri="{91240B29-F687-4f45-9708-019B960494DF}">
-                <a14:hiddenLine xmlns="" xmlns:a14="http://schemas.microsoft.com/office/drawing/2010/main" w="9525">
+                <a14:hiddenLine xmlns:a14="http://schemas.microsoft.com/office/drawing/2010/main" xmlns="" w="9525">
                   <a:solidFill>
                     <a:srgbClr val="000000"/>
                   </a:solidFill>
@@ -3342,7 +3341,7 @@
             </a:ln>
             <a:extLst>
               <a:ext uri="{91240B29-F687-4f45-9708-019B960494DF}">
-                <a14:hiddenLine xmlns="" xmlns:a14="http://schemas.microsoft.com/office/drawing/2010/main" w="9525">
+                <a14:hiddenLine xmlns:a14="http://schemas.microsoft.com/office/drawing/2010/main" xmlns="" w="9525">
                   <a:solidFill>
                     <a:srgbClr val="000000"/>
                   </a:solidFill>
@@ -3432,7 +3431,7 @@
             </a:ln>
             <a:extLst>
               <a:ext uri="{91240B29-F687-4f45-9708-019B960494DF}">
-                <a14:hiddenLine xmlns="" xmlns:a14="http://schemas.microsoft.com/office/drawing/2010/main" w="9525">
+                <a14:hiddenLine xmlns:a14="http://schemas.microsoft.com/office/drawing/2010/main" xmlns="" w="9525">
                   <a:solidFill>
                     <a:srgbClr val="000000"/>
                   </a:solidFill>
@@ -3494,7 +3493,7 @@
             </a:ln>
             <a:extLst>
               <a:ext uri="{91240B29-F687-4f45-9708-019B960494DF}">
-                <a14:hiddenLine xmlns="" xmlns:a14="http://schemas.microsoft.com/office/drawing/2010/main" w="9525">
+                <a14:hiddenLine xmlns:a14="http://schemas.microsoft.com/office/drawing/2010/main" xmlns="" w="9525">
                   <a:solidFill>
                     <a:srgbClr val="000000"/>
                   </a:solidFill>
@@ -3584,7 +3583,7 @@
             </a:ln>
             <a:extLst>
               <a:ext uri="{91240B29-F687-4f45-9708-019B960494DF}">
-                <a14:hiddenLine xmlns="" xmlns:a14="http://schemas.microsoft.com/office/drawing/2010/main" w="9525">
+                <a14:hiddenLine xmlns:a14="http://schemas.microsoft.com/office/drawing/2010/main" xmlns="" w="9525">
                   <a:solidFill>
                     <a:srgbClr val="000000"/>
                   </a:solidFill>
@@ -3646,7 +3645,7 @@
             </a:ln>
             <a:extLst>
               <a:ext uri="{91240B29-F687-4f45-9708-019B960494DF}">
-                <a14:hiddenLine xmlns="" xmlns:a14="http://schemas.microsoft.com/office/drawing/2010/main" w="9525">
+                <a14:hiddenLine xmlns:a14="http://schemas.microsoft.com/office/drawing/2010/main" xmlns="" w="9525">
                   <a:solidFill>
                     <a:srgbClr val="000000"/>
                   </a:solidFill>
@@ -3736,7 +3735,7 @@
             </a:ln>
             <a:extLst>
               <a:ext uri="{91240B29-F687-4f45-9708-019B960494DF}">
-                <a14:hiddenLine xmlns="" xmlns:a14="http://schemas.microsoft.com/office/drawing/2010/main" w="9525">
+                <a14:hiddenLine xmlns:a14="http://schemas.microsoft.com/office/drawing/2010/main" xmlns="" w="9525">
                   <a:solidFill>
                     <a:srgbClr val="000000"/>
                   </a:solidFill>
@@ -3770,7 +3769,7 @@
             </a:ln>
             <a:extLst>
               <a:ext uri="{91240B29-F687-4f45-9708-019B960494DF}">
-                <a14:hiddenLine xmlns="" xmlns:a14="http://schemas.microsoft.com/office/drawing/2010/main" w="9525">
+                <a14:hiddenLine xmlns:a14="http://schemas.microsoft.com/office/drawing/2010/main" xmlns="" w="9525">
                   <a:solidFill>
                     <a:srgbClr val="000000"/>
                   </a:solidFill>
@@ -3835,7 +3834,7 @@
             </a:ln>
             <a:extLst>
               <a:ext uri="{91240B29-F687-4f45-9708-019B960494DF}">
-                <a14:hiddenLine xmlns="" xmlns:a14="http://schemas.microsoft.com/office/drawing/2010/main" w="9525">
+                <a14:hiddenLine xmlns:a14="http://schemas.microsoft.com/office/drawing/2010/main" xmlns="" w="9525">
                   <a:solidFill>
                     <a:srgbClr val="000000"/>
                   </a:solidFill>
@@ -3925,7 +3924,7 @@
             </a:ln>
             <a:extLst>
               <a:ext uri="{91240B29-F687-4f45-9708-019B960494DF}">
-                <a14:hiddenLine xmlns="" xmlns:a14="http://schemas.microsoft.com/office/drawing/2010/main" w="9525">
+                <a14:hiddenLine xmlns:a14="http://schemas.microsoft.com/office/drawing/2010/main" xmlns="" w="9525">
                   <a:solidFill>
                     <a:srgbClr val="000000"/>
                   </a:solidFill>
@@ -3987,7 +3986,7 @@
             </a:ln>
             <a:extLst>
               <a:ext uri="{91240B29-F687-4f45-9708-019B960494DF}">
-                <a14:hiddenLine xmlns="" xmlns:a14="http://schemas.microsoft.com/office/drawing/2010/main" w="9525">
+                <a14:hiddenLine xmlns:a14="http://schemas.microsoft.com/office/drawing/2010/main" xmlns="" w="9525">
                   <a:solidFill>
                     <a:srgbClr val="000000"/>
                   </a:solidFill>
@@ -4077,7 +4076,7 @@
             </a:ln>
             <a:extLst>
               <a:ext uri="{91240B29-F687-4f45-9708-019B960494DF}">
-                <a14:hiddenLine xmlns="" xmlns:a14="http://schemas.microsoft.com/office/drawing/2010/main" w="9525">
+                <a14:hiddenLine xmlns:a14="http://schemas.microsoft.com/office/drawing/2010/main" xmlns="" w="9525">
                   <a:solidFill>
                     <a:srgbClr val="000000"/>
                   </a:solidFill>
@@ -4167,7 +4166,7 @@
             </a:ln>
             <a:extLst>
               <a:ext uri="{91240B29-F687-4f45-9708-019B960494DF}">
-                <a14:hiddenLine xmlns="" xmlns:a14="http://schemas.microsoft.com/office/drawing/2010/main" w="9525">
+                <a14:hiddenLine xmlns:a14="http://schemas.microsoft.com/office/drawing/2010/main" xmlns="" w="9525">
                   <a:solidFill>
                     <a:srgbClr val="000000"/>
                   </a:solidFill>
@@ -4232,7 +4231,7 @@
             </a:ln>
             <a:extLst>
               <a:ext uri="{91240B29-F687-4f45-9708-019B960494DF}">
-                <a14:hiddenLine xmlns="" xmlns:a14="http://schemas.microsoft.com/office/drawing/2010/main" w="9525">
+                <a14:hiddenLine xmlns:a14="http://schemas.microsoft.com/office/drawing/2010/main" xmlns="" w="9525">
                   <a:solidFill>
                     <a:srgbClr val="000000"/>
                   </a:solidFill>
@@ -4294,7 +4293,7 @@
             </a:ln>
             <a:extLst>
               <a:ext uri="{91240B29-F687-4f45-9708-019B960494DF}">
-                <a14:hiddenLine xmlns="" xmlns:a14="http://schemas.microsoft.com/office/drawing/2010/main" w="9525">
+                <a14:hiddenLine xmlns:a14="http://schemas.microsoft.com/office/drawing/2010/main" xmlns="" w="9525">
                   <a:solidFill>
                     <a:srgbClr val="000000"/>
                   </a:solidFill>
@@ -4384,7 +4383,7 @@
             </a:ln>
             <a:extLst>
               <a:ext uri="{91240B29-F687-4f45-9708-019B960494DF}">
-                <a14:hiddenLine xmlns="" xmlns:a14="http://schemas.microsoft.com/office/drawing/2010/main" w="9525">
+                <a14:hiddenLine xmlns:a14="http://schemas.microsoft.com/office/drawing/2010/main" xmlns="" w="9525">
                   <a:solidFill>
                     <a:srgbClr val="000000"/>
                   </a:solidFill>
@@ -4474,7 +4473,7 @@
             </a:ln>
             <a:extLst>
               <a:ext uri="{91240B29-F687-4f45-9708-019B960494DF}">
-                <a14:hiddenLine xmlns="" xmlns:a14="http://schemas.microsoft.com/office/drawing/2010/main" w="9525">
+                <a14:hiddenLine xmlns:a14="http://schemas.microsoft.com/office/drawing/2010/main" xmlns="" w="9525">
                   <a:solidFill>
                     <a:srgbClr val="000000"/>
                   </a:solidFill>
@@ -4536,7 +4535,7 @@
             </a:ln>
             <a:extLst>
               <a:ext uri="{91240B29-F687-4f45-9708-019B960494DF}">
-                <a14:hiddenLine xmlns="" xmlns:a14="http://schemas.microsoft.com/office/drawing/2010/main" w="9525">
+                <a14:hiddenLine xmlns:a14="http://schemas.microsoft.com/office/drawing/2010/main" xmlns="" w="9525">
                   <a:solidFill>
                     <a:srgbClr val="000000"/>
                   </a:solidFill>
@@ -4656,7 +4655,7 @@
             </a:ln>
             <a:extLst>
               <a:ext uri="{91240B29-F687-4f45-9708-019B960494DF}">
-                <a14:hiddenLine xmlns="" xmlns:a14="http://schemas.microsoft.com/office/drawing/2010/main" w="9525">
+                <a14:hiddenLine xmlns:a14="http://schemas.microsoft.com/office/drawing/2010/main" xmlns="" w="9525">
                   <a:solidFill>
                     <a:srgbClr val="000000"/>
                   </a:solidFill>
@@ -4724,7 +4723,7 @@
             </a:ln>
             <a:extLst>
               <a:ext uri="{91240B29-F687-4f45-9708-019B960494DF}">
-                <a14:hiddenLine xmlns="" xmlns:a14="http://schemas.microsoft.com/office/drawing/2010/main" w="9525">
+                <a14:hiddenLine xmlns:a14="http://schemas.microsoft.com/office/drawing/2010/main" xmlns="" w="9525">
                   <a:solidFill>
                     <a:srgbClr val="000000"/>
                   </a:solidFill>
@@ -4814,7 +4813,7 @@
             </a:ln>
             <a:extLst>
               <a:ext uri="{91240B29-F687-4f45-9708-019B960494DF}">
-                <a14:hiddenLine xmlns="" xmlns:a14="http://schemas.microsoft.com/office/drawing/2010/main" w="9525">
+                <a14:hiddenLine xmlns:a14="http://schemas.microsoft.com/office/drawing/2010/main" xmlns="" w="9525">
                   <a:solidFill>
                     <a:srgbClr val="000000"/>
                   </a:solidFill>
@@ -4954,7 +4953,7 @@
           <a:p>
             <a:fld id="{EC4347D3-4C9A-C240-8F14-750059DFEEB0}" type="datetimeFigureOut">
               <a:rPr lang="en-US" smtClean="0"/>
-              <a:t>1/8/25</a:t>
+              <a:t>1/13/25</a:t>
             </a:fld>
             <a:endParaRPr lang="en-US"/>
           </a:p>
@@ -5221,7 +5220,7 @@
           <a:p>
             <a:fld id="{EC4347D3-4C9A-C240-8F14-750059DFEEB0}" type="datetimeFigureOut">
               <a:rPr lang="en-US" smtClean="0"/>
-              <a:t>1/8/25</a:t>
+              <a:t>1/13/25</a:t>
             </a:fld>
             <a:endParaRPr lang="en-US"/>
           </a:p>
@@ -5417,7 +5416,7 @@
           <a:p>
             <a:fld id="{EC4347D3-4C9A-C240-8F14-750059DFEEB0}" type="datetimeFigureOut">
               <a:rPr lang="en-US" smtClean="0"/>
-              <a:t>1/8/25</a:t>
+              <a:t>1/13/25</a:t>
             </a:fld>
             <a:endParaRPr lang="en-US"/>
           </a:p>
@@ -5680,7 +5679,7 @@
           <a:p>
             <a:fld id="{EC4347D3-4C9A-C240-8F14-750059DFEEB0}" type="datetimeFigureOut">
               <a:rPr lang="en-US" smtClean="0"/>
-              <a:t>1/8/25</a:t>
+              <a:t>1/13/25</a:t>
             </a:fld>
             <a:endParaRPr lang="en-US"/>
           </a:p>
@@ -6114,7 +6113,7 @@
           <a:p>
             <a:fld id="{EC4347D3-4C9A-C240-8F14-750059DFEEB0}" type="datetimeFigureOut">
               <a:rPr lang="en-US" smtClean="0"/>
-              <a:t>1/8/25</a:t>
+              <a:t>1/13/25</a:t>
             </a:fld>
             <a:endParaRPr lang="en-US"/>
           </a:p>
@@ -6660,7 +6659,7 @@
           <a:p>
             <a:fld id="{EC4347D3-4C9A-C240-8F14-750059DFEEB0}" type="datetimeFigureOut">
               <a:rPr lang="en-US" smtClean="0"/>
-              <a:t>1/8/25</a:t>
+              <a:t>1/13/25</a:t>
             </a:fld>
             <a:endParaRPr lang="en-US"/>
           </a:p>
@@ -7380,7 +7379,7 @@
           <a:p>
             <a:fld id="{EC4347D3-4C9A-C240-8F14-750059DFEEB0}" type="datetimeFigureOut">
               <a:rPr lang="en-US" smtClean="0"/>
-              <a:t>1/8/25</a:t>
+              <a:t>1/13/25</a:t>
             </a:fld>
             <a:endParaRPr lang="en-US"/>
           </a:p>
@@ -7550,7 +7549,7 @@
           <a:p>
             <a:fld id="{EC4347D3-4C9A-C240-8F14-750059DFEEB0}" type="datetimeFigureOut">
               <a:rPr lang="en-US" smtClean="0"/>
-              <a:t>1/8/25</a:t>
+              <a:t>1/13/25</a:t>
             </a:fld>
             <a:endParaRPr lang="en-US"/>
           </a:p>
@@ -7730,7 +7729,7 @@
           <a:p>
             <a:fld id="{EC4347D3-4C9A-C240-8F14-750059DFEEB0}" type="datetimeFigureOut">
               <a:rPr lang="en-US" smtClean="0"/>
-              <a:t>1/8/25</a:t>
+              <a:t>1/13/25</a:t>
             </a:fld>
             <a:endParaRPr lang="en-US"/>
           </a:p>
@@ -7900,7 +7899,7 @@
           <a:p>
             <a:fld id="{EC4347D3-4C9A-C240-8F14-750059DFEEB0}" type="datetimeFigureOut">
               <a:rPr lang="en-US" smtClean="0"/>
-              <a:t>1/8/25</a:t>
+              <a:t>1/13/25</a:t>
             </a:fld>
             <a:endParaRPr lang="en-US"/>
           </a:p>
@@ -8150,7 +8149,7 @@
           <a:p>
             <a:fld id="{EC4347D3-4C9A-C240-8F14-750059DFEEB0}" type="datetimeFigureOut">
               <a:rPr lang="en-US" smtClean="0"/>
-              <a:t>1/8/25</a:t>
+              <a:t>1/13/25</a:t>
             </a:fld>
             <a:endParaRPr lang="en-US"/>
           </a:p>
@@ -8382,7 +8381,7 @@
           <a:p>
             <a:fld id="{EC4347D3-4C9A-C240-8F14-750059DFEEB0}" type="datetimeFigureOut">
               <a:rPr lang="en-US" smtClean="0"/>
-              <a:t>1/8/25</a:t>
+              <a:t>1/13/25</a:t>
             </a:fld>
             <a:endParaRPr lang="en-US"/>
           </a:p>
@@ -8768,7 +8767,7 @@
           <a:p>
             <a:fld id="{EC4347D3-4C9A-C240-8F14-750059DFEEB0}" type="datetimeFigureOut">
               <a:rPr lang="en-US" smtClean="0"/>
-              <a:t>1/8/25</a:t>
+              <a:t>1/13/25</a:t>
             </a:fld>
             <a:endParaRPr lang="en-US"/>
           </a:p>
@@ -8891,7 +8890,7 @@
           <a:p>
             <a:fld id="{EC4347D3-4C9A-C240-8F14-750059DFEEB0}" type="datetimeFigureOut">
               <a:rPr lang="en-US" smtClean="0"/>
-              <a:t>1/8/25</a:t>
+              <a:t>1/13/25</a:t>
             </a:fld>
             <a:endParaRPr lang="en-US"/>
           </a:p>
@@ -8986,7 +8985,7 @@
           <a:p>
             <a:fld id="{EC4347D3-4C9A-C240-8F14-750059DFEEB0}" type="datetimeFigureOut">
               <a:rPr lang="en-US" smtClean="0"/>
-              <a:t>1/8/25</a:t>
+              <a:t>1/13/25</a:t>
             </a:fld>
             <a:endParaRPr lang="en-US"/>
           </a:p>
@@ -9235,7 +9234,7 @@
           <a:p>
             <a:fld id="{EC4347D3-4C9A-C240-8F14-750059DFEEB0}" type="datetimeFigureOut">
               <a:rPr lang="en-US" smtClean="0"/>
-              <a:t>1/8/25</a:t>
+              <a:t>1/13/25</a:t>
             </a:fld>
             <a:endParaRPr lang="en-US"/>
           </a:p>
@@ -9520,7 +9519,7 @@
           <a:p>
             <a:fld id="{EC4347D3-4C9A-C240-8F14-750059DFEEB0}" type="datetimeFigureOut">
               <a:rPr lang="en-US" smtClean="0"/>
-              <a:t>1/8/25</a:t>
+              <a:t>1/13/25</a:t>
             </a:fld>
             <a:endParaRPr lang="en-US"/>
           </a:p>
@@ -9643,7 +9642,7 @@
           <a:noFill/>
           <a:extLst>
             <a:ext uri="{909E8E84-426E-40dd-AFC4-6F175D3DCCD1}">
-              <a14:hiddenFill xmlns="" xmlns:a14="http://schemas.microsoft.com/office/drawing/2010/main">
+              <a14:hiddenFill xmlns:a14="http://schemas.microsoft.com/office/drawing/2010/main" xmlns="">
                 <a:solidFill>
                   <a:srgbClr val="FFFFFF"/>
                 </a:solidFill>
@@ -9717,7 +9716,7 @@
               </a:ln>
               <a:extLst>
                 <a:ext uri="{91240B29-F687-4f45-9708-019B960494DF}">
-                  <a14:hiddenLine xmlns="" xmlns:a14="http://schemas.microsoft.com/office/drawing/2010/main" w="9525">
+                  <a14:hiddenLine xmlns:a14="http://schemas.microsoft.com/office/drawing/2010/main" xmlns="" w="9525">
                     <a:solidFill>
                       <a:srgbClr val="000000"/>
                     </a:solidFill>
@@ -9807,7 +9806,7 @@
               </a:ln>
               <a:extLst>
                 <a:ext uri="{91240B29-F687-4f45-9708-019B960494DF}">
-                  <a14:hiddenLine xmlns="" xmlns:a14="http://schemas.microsoft.com/office/drawing/2010/main" w="9525">
+                  <a14:hiddenLine xmlns:a14="http://schemas.microsoft.com/office/drawing/2010/main" xmlns="" w="9525">
                     <a:solidFill>
                       <a:srgbClr val="000000"/>
                     </a:solidFill>
@@ -9897,7 +9896,7 @@
               </a:ln>
               <a:extLst>
                 <a:ext uri="{91240B29-F687-4f45-9708-019B960494DF}">
-                  <a14:hiddenLine xmlns="" xmlns:a14="http://schemas.microsoft.com/office/drawing/2010/main" w="9525">
+                  <a14:hiddenLine xmlns:a14="http://schemas.microsoft.com/office/drawing/2010/main" xmlns="" w="9525">
                     <a:solidFill>
                       <a:srgbClr val="000000"/>
                     </a:solidFill>
@@ -9959,7 +9958,7 @@
               </a:ln>
               <a:extLst>
                 <a:ext uri="{91240B29-F687-4f45-9708-019B960494DF}">
-                  <a14:hiddenLine xmlns="" xmlns:a14="http://schemas.microsoft.com/office/drawing/2010/main" w="9525">
+                  <a14:hiddenLine xmlns:a14="http://schemas.microsoft.com/office/drawing/2010/main" xmlns="" w="9525">
                     <a:solidFill>
                       <a:srgbClr val="000000"/>
                     </a:solidFill>
@@ -10049,7 +10048,7 @@
               </a:ln>
               <a:extLst>
                 <a:ext uri="{91240B29-F687-4f45-9708-019B960494DF}">
-                  <a14:hiddenLine xmlns="" xmlns:a14="http://schemas.microsoft.com/office/drawing/2010/main" w="9525">
+                  <a14:hiddenLine xmlns:a14="http://schemas.microsoft.com/office/drawing/2010/main" xmlns="" w="9525">
                     <a:solidFill>
                       <a:srgbClr val="000000"/>
                     </a:solidFill>
@@ -10111,7 +10110,7 @@
               </a:ln>
               <a:extLst>
                 <a:ext uri="{91240B29-F687-4f45-9708-019B960494DF}">
-                  <a14:hiddenLine xmlns="" xmlns:a14="http://schemas.microsoft.com/office/drawing/2010/main" w="9525">
+                  <a14:hiddenLine xmlns:a14="http://schemas.microsoft.com/office/drawing/2010/main" xmlns="" w="9525">
                     <a:solidFill>
                       <a:srgbClr val="000000"/>
                     </a:solidFill>
@@ -10173,7 +10172,7 @@
               </a:ln>
               <a:extLst>
                 <a:ext uri="{91240B29-F687-4f45-9708-019B960494DF}">
-                  <a14:hiddenLine xmlns="" xmlns:a14="http://schemas.microsoft.com/office/drawing/2010/main" w="9525">
+                  <a14:hiddenLine xmlns:a14="http://schemas.microsoft.com/office/drawing/2010/main" xmlns="" w="9525">
                     <a:solidFill>
                       <a:srgbClr val="000000"/>
                     </a:solidFill>
@@ -10263,7 +10262,7 @@
               </a:ln>
               <a:extLst>
                 <a:ext uri="{91240B29-F687-4f45-9708-019B960494DF}">
-                  <a14:hiddenLine xmlns="" xmlns:a14="http://schemas.microsoft.com/office/drawing/2010/main" w="9525">
+                  <a14:hiddenLine xmlns:a14="http://schemas.microsoft.com/office/drawing/2010/main" xmlns="" w="9525">
                     <a:solidFill>
                       <a:srgbClr val="000000"/>
                     </a:solidFill>
@@ -10353,7 +10352,7 @@
               </a:ln>
               <a:extLst>
                 <a:ext uri="{91240B29-F687-4f45-9708-019B960494DF}">
-                  <a14:hiddenLine xmlns="" xmlns:a14="http://schemas.microsoft.com/office/drawing/2010/main" w="9525">
+                  <a14:hiddenLine xmlns:a14="http://schemas.microsoft.com/office/drawing/2010/main" xmlns="" w="9525">
                     <a:solidFill>
                       <a:srgbClr val="000000"/>
                     </a:solidFill>
@@ -10415,7 +10414,7 @@
               </a:ln>
               <a:extLst>
                 <a:ext uri="{91240B29-F687-4f45-9708-019B960494DF}">
-                  <a14:hiddenLine xmlns="" xmlns:a14="http://schemas.microsoft.com/office/drawing/2010/main" w="9525">
+                  <a14:hiddenLine xmlns:a14="http://schemas.microsoft.com/office/drawing/2010/main" xmlns="" w="9525">
                     <a:solidFill>
                       <a:srgbClr val="000000"/>
                     </a:solidFill>
@@ -10525,7 +10524,7 @@
               </a:ln>
               <a:extLst>
                 <a:ext uri="{91240B29-F687-4f45-9708-019B960494DF}">
-                  <a14:hiddenLine xmlns="" xmlns:a14="http://schemas.microsoft.com/office/drawing/2010/main" w="9525">
+                  <a14:hiddenLine xmlns:a14="http://schemas.microsoft.com/office/drawing/2010/main" xmlns="" w="9525">
                     <a:solidFill>
                       <a:srgbClr val="000000"/>
                     </a:solidFill>
@@ -10609,7 +10608,7 @@
               </a:ln>
               <a:extLst>
                 <a:ext uri="{91240B29-F687-4f45-9708-019B960494DF}">
-                  <a14:hiddenLine xmlns="" xmlns:a14="http://schemas.microsoft.com/office/drawing/2010/main" w="9525">
+                  <a14:hiddenLine xmlns:a14="http://schemas.microsoft.com/office/drawing/2010/main" xmlns="" w="9525">
                     <a:solidFill>
                       <a:srgbClr val="000000"/>
                     </a:solidFill>
@@ -10671,7 +10670,7 @@
               </a:ln>
               <a:extLst>
                 <a:ext uri="{91240B29-F687-4f45-9708-019B960494DF}">
-                  <a14:hiddenLine xmlns="" xmlns:a14="http://schemas.microsoft.com/office/drawing/2010/main" w="9525">
+                  <a14:hiddenLine xmlns:a14="http://schemas.microsoft.com/office/drawing/2010/main" xmlns="" w="9525">
                     <a:solidFill>
                       <a:srgbClr val="000000"/>
                     </a:solidFill>
@@ -10733,7 +10732,7 @@
               </a:ln>
               <a:extLst>
                 <a:ext uri="{91240B29-F687-4f45-9708-019B960494DF}">
-                  <a14:hiddenLine xmlns="" xmlns:a14="http://schemas.microsoft.com/office/drawing/2010/main" w="9525">
+                  <a14:hiddenLine xmlns:a14="http://schemas.microsoft.com/office/drawing/2010/main" xmlns="" w="9525">
                     <a:solidFill>
                       <a:srgbClr val="000000"/>
                     </a:solidFill>
@@ -10823,7 +10822,7 @@
               </a:ln>
               <a:extLst>
                 <a:ext uri="{91240B29-F687-4f45-9708-019B960494DF}">
-                  <a14:hiddenLine xmlns="" xmlns:a14="http://schemas.microsoft.com/office/drawing/2010/main" w="9525">
+                  <a14:hiddenLine xmlns:a14="http://schemas.microsoft.com/office/drawing/2010/main" xmlns="" w="9525">
                     <a:solidFill>
                       <a:srgbClr val="000000"/>
                     </a:solidFill>
@@ -10857,7 +10856,7 @@
               </a:ln>
               <a:extLst>
                 <a:ext uri="{91240B29-F687-4f45-9708-019B960494DF}">
-                  <a14:hiddenLine xmlns="" xmlns:a14="http://schemas.microsoft.com/office/drawing/2010/main" w="9525">
+                  <a14:hiddenLine xmlns:a14="http://schemas.microsoft.com/office/drawing/2010/main" xmlns="" w="9525">
                     <a:solidFill>
                       <a:srgbClr val="000000"/>
                     </a:solidFill>
@@ -10922,7 +10921,7 @@
               </a:ln>
               <a:extLst>
                 <a:ext uri="{91240B29-F687-4f45-9708-019B960494DF}">
-                  <a14:hiddenLine xmlns="" xmlns:a14="http://schemas.microsoft.com/office/drawing/2010/main" w="9525">
+                  <a14:hiddenLine xmlns:a14="http://schemas.microsoft.com/office/drawing/2010/main" xmlns="" w="9525">
                     <a:solidFill>
                       <a:srgbClr val="000000"/>
                     </a:solidFill>
@@ -11012,7 +11011,7 @@
               </a:ln>
               <a:extLst>
                 <a:ext uri="{91240B29-F687-4f45-9708-019B960494DF}">
-                  <a14:hiddenLine xmlns="" xmlns:a14="http://schemas.microsoft.com/office/drawing/2010/main" w="9525">
+                  <a14:hiddenLine xmlns:a14="http://schemas.microsoft.com/office/drawing/2010/main" xmlns="" w="9525">
                     <a:solidFill>
                       <a:srgbClr val="000000"/>
                     </a:solidFill>
@@ -11074,7 +11073,7 @@
               </a:ln>
               <a:extLst>
                 <a:ext uri="{91240B29-F687-4f45-9708-019B960494DF}">
-                  <a14:hiddenLine xmlns="" xmlns:a14="http://schemas.microsoft.com/office/drawing/2010/main" w="9525">
+                  <a14:hiddenLine xmlns:a14="http://schemas.microsoft.com/office/drawing/2010/main" xmlns="" w="9525">
                     <a:solidFill>
                       <a:srgbClr val="000000"/>
                     </a:solidFill>
@@ -11164,7 +11163,7 @@
               </a:ln>
               <a:extLst>
                 <a:ext uri="{91240B29-F687-4f45-9708-019B960494DF}">
-                  <a14:hiddenLine xmlns="" xmlns:a14="http://schemas.microsoft.com/office/drawing/2010/main" w="9525">
+                  <a14:hiddenLine xmlns:a14="http://schemas.microsoft.com/office/drawing/2010/main" xmlns="" w="9525">
                     <a:solidFill>
                       <a:srgbClr val="000000"/>
                     </a:solidFill>
@@ -11229,7 +11228,7 @@
               </a:ln>
               <a:extLst>
                 <a:ext uri="{91240B29-F687-4f45-9708-019B960494DF}">
-                  <a14:hiddenLine xmlns="" xmlns:a14="http://schemas.microsoft.com/office/drawing/2010/main" w="9525">
+                  <a14:hiddenLine xmlns:a14="http://schemas.microsoft.com/office/drawing/2010/main" xmlns="" w="9525">
                     <a:solidFill>
                       <a:srgbClr val="000000"/>
                     </a:solidFill>
@@ -11291,7 +11290,7 @@
               </a:ln>
               <a:extLst>
                 <a:ext uri="{91240B29-F687-4f45-9708-019B960494DF}">
-                  <a14:hiddenLine xmlns="" xmlns:a14="http://schemas.microsoft.com/office/drawing/2010/main" w="9525">
+                  <a14:hiddenLine xmlns:a14="http://schemas.microsoft.com/office/drawing/2010/main" xmlns="" w="9525">
                     <a:solidFill>
                       <a:srgbClr val="000000"/>
                     </a:solidFill>
@@ -11381,7 +11380,7 @@
               </a:ln>
               <a:extLst>
                 <a:ext uri="{91240B29-F687-4f45-9708-019B960494DF}">
-                  <a14:hiddenLine xmlns="" xmlns:a14="http://schemas.microsoft.com/office/drawing/2010/main" w="9525">
+                  <a14:hiddenLine xmlns:a14="http://schemas.microsoft.com/office/drawing/2010/main" xmlns="" w="9525">
                     <a:solidFill>
                       <a:srgbClr val="000000"/>
                     </a:solidFill>
@@ -11471,7 +11470,7 @@
               </a:ln>
               <a:extLst>
                 <a:ext uri="{91240B29-F687-4f45-9708-019B960494DF}">
-                  <a14:hiddenLine xmlns="" xmlns:a14="http://schemas.microsoft.com/office/drawing/2010/main" w="9525">
+                  <a14:hiddenLine xmlns:a14="http://schemas.microsoft.com/office/drawing/2010/main" xmlns="" w="9525">
                     <a:solidFill>
                       <a:srgbClr val="000000"/>
                     </a:solidFill>
@@ -11536,7 +11535,7 @@
               </a:ln>
               <a:extLst>
                 <a:ext uri="{91240B29-F687-4f45-9708-019B960494DF}">
-                  <a14:hiddenLine xmlns="" xmlns:a14="http://schemas.microsoft.com/office/drawing/2010/main" w="9525">
+                  <a14:hiddenLine xmlns:a14="http://schemas.microsoft.com/office/drawing/2010/main" xmlns="" w="9525">
                     <a:solidFill>
                       <a:srgbClr val="000000"/>
                     </a:solidFill>
@@ -11656,7 +11655,7 @@
               </a:ln>
               <a:extLst>
                 <a:ext uri="{91240B29-F687-4f45-9708-019B960494DF}">
-                  <a14:hiddenLine xmlns="" xmlns:a14="http://schemas.microsoft.com/office/drawing/2010/main" w="9525">
+                  <a14:hiddenLine xmlns:a14="http://schemas.microsoft.com/office/drawing/2010/main" xmlns="" w="9525">
                     <a:solidFill>
                       <a:srgbClr val="000000"/>
                     </a:solidFill>
@@ -11737,7 +11736,7 @@
               </a:ln>
               <a:extLst>
                 <a:ext uri="{91240B29-F687-4f45-9708-019B960494DF}">
-                  <a14:hiddenLine xmlns="" xmlns:a14="http://schemas.microsoft.com/office/drawing/2010/main" w="9525">
+                  <a14:hiddenLine xmlns:a14="http://schemas.microsoft.com/office/drawing/2010/main" xmlns="" w="9525">
                     <a:solidFill>
                       <a:srgbClr val="000000"/>
                     </a:solidFill>
@@ -11852,7 +11851,7 @@
               </a:ln>
               <a:extLst>
                 <a:ext uri="{91240B29-F687-4f45-9708-019B960494DF}">
-                  <a14:hiddenLine xmlns="" xmlns:a14="http://schemas.microsoft.com/office/drawing/2010/main" w="9525">
+                  <a14:hiddenLine xmlns:a14="http://schemas.microsoft.com/office/drawing/2010/main" xmlns="" w="9525">
                     <a:solidFill>
                       <a:srgbClr val="000000"/>
                     </a:solidFill>
@@ -11942,7 +11941,7 @@
               </a:ln>
               <a:extLst>
                 <a:ext uri="{91240B29-F687-4f45-9708-019B960494DF}">
-                  <a14:hiddenLine xmlns="" xmlns:a14="http://schemas.microsoft.com/office/drawing/2010/main" w="9525">
+                  <a14:hiddenLine xmlns:a14="http://schemas.microsoft.com/office/drawing/2010/main" xmlns="" w="9525">
                     <a:solidFill>
                       <a:srgbClr val="000000"/>
                     </a:solidFill>
@@ -12007,7 +12006,7 @@
               </a:ln>
               <a:extLst>
                 <a:ext uri="{91240B29-F687-4f45-9708-019B960494DF}">
-                  <a14:hiddenLine xmlns="" xmlns:a14="http://schemas.microsoft.com/office/drawing/2010/main" w="9525">
+                  <a14:hiddenLine xmlns:a14="http://schemas.microsoft.com/office/drawing/2010/main" xmlns="" w="9525">
                     <a:solidFill>
                       <a:srgbClr val="000000"/>
                     </a:solidFill>
@@ -12097,7 +12096,7 @@
               </a:ln>
               <a:extLst>
                 <a:ext uri="{91240B29-F687-4f45-9708-019B960494DF}">
-                  <a14:hiddenLine xmlns="" xmlns:a14="http://schemas.microsoft.com/office/drawing/2010/main" w="9525">
+                  <a14:hiddenLine xmlns:a14="http://schemas.microsoft.com/office/drawing/2010/main" xmlns="" w="9525">
                     <a:solidFill>
                       <a:srgbClr val="000000"/>
                     </a:solidFill>
@@ -12165,7 +12164,7 @@
               </a:ln>
               <a:extLst>
                 <a:ext uri="{91240B29-F687-4f45-9708-019B960494DF}">
-                  <a14:hiddenLine xmlns="" xmlns:a14="http://schemas.microsoft.com/office/drawing/2010/main" w="9525">
+                  <a14:hiddenLine xmlns:a14="http://schemas.microsoft.com/office/drawing/2010/main" xmlns="" w="9525">
                     <a:solidFill>
                       <a:srgbClr val="000000"/>
                     </a:solidFill>
@@ -12255,7 +12254,7 @@
               </a:ln>
               <a:extLst>
                 <a:ext uri="{91240B29-F687-4f45-9708-019B960494DF}">
-                  <a14:hiddenLine xmlns="" xmlns:a14="http://schemas.microsoft.com/office/drawing/2010/main" w="9525">
+                  <a14:hiddenLine xmlns:a14="http://schemas.microsoft.com/office/drawing/2010/main" xmlns="" w="9525">
                     <a:solidFill>
                       <a:srgbClr val="000000"/>
                     </a:solidFill>
@@ -12323,7 +12322,7 @@
               </a:ln>
               <a:extLst>
                 <a:ext uri="{91240B29-F687-4f45-9708-019B960494DF}">
-                  <a14:hiddenLine xmlns="" xmlns:a14="http://schemas.microsoft.com/office/drawing/2010/main" w="9525">
+                  <a14:hiddenLine xmlns:a14="http://schemas.microsoft.com/office/drawing/2010/main" xmlns="" w="9525">
                     <a:solidFill>
                       <a:srgbClr val="000000"/>
                     </a:solidFill>
@@ -12413,7 +12412,7 @@
               </a:ln>
               <a:extLst>
                 <a:ext uri="{91240B29-F687-4f45-9708-019B960494DF}">
-                  <a14:hiddenLine xmlns="" xmlns:a14="http://schemas.microsoft.com/office/drawing/2010/main" w="9525">
+                  <a14:hiddenLine xmlns:a14="http://schemas.microsoft.com/office/drawing/2010/main" xmlns="" w="9525">
                     <a:solidFill>
                       <a:srgbClr val="000000"/>
                     </a:solidFill>
@@ -12447,7 +12446,7 @@
               </a:ln>
               <a:extLst>
                 <a:ext uri="{91240B29-F687-4f45-9708-019B960494DF}">
-                  <a14:hiddenLine xmlns="" xmlns:a14="http://schemas.microsoft.com/office/drawing/2010/main" w="9525">
+                  <a14:hiddenLine xmlns:a14="http://schemas.microsoft.com/office/drawing/2010/main" xmlns="" w="9525">
                     <a:solidFill>
                       <a:srgbClr val="000000"/>
                     </a:solidFill>
@@ -12587,7 +12586,7 @@
           <a:p>
             <a:fld id="{EC4347D3-4C9A-C240-8F14-750059DFEEB0}" type="datetimeFigureOut">
               <a:rPr lang="en-US" smtClean="0"/>
-              <a:t>1/8/25</a:t>
+              <a:t>1/13/25</a:t>
             </a:fld>
             <a:endParaRPr lang="en-US"/>
           </a:p>
@@ -14240,6 +14239,13 @@
           </a:p>
           <a:p>
             <a:pPr lvl="1"/>
+            <a:r>
+              <a:rPr lang="en-US" b="1" i="1" u="sng" dirty="0"/>
+              <a:t>Some material (like extra examples or homework help) will NOT be in the recording</a:t>
+            </a:r>
+          </a:p>
+          <a:p>
+            <a:pPr lvl="1"/>
             <a:endParaRPr lang="en-US" dirty="0"/>
           </a:p>
           <a:p>
@@ -14893,58 +14899,24 @@
           <a:p>
             <a:r>
               <a:rPr lang="en-US" dirty="0"/>
-              <a:t>Two possible outcomes </a:t>
-            </a:r>
-            <a:r>
-              <a:rPr lang="en-US" b="1" i="1" u="sng" dirty="0"/>
-              <a:t>for each quiz (first attempt only)</a:t>
-            </a:r>
-            <a:r>
-              <a:rPr lang="en-US" dirty="0"/>
-              <a:t>:</a:t>
+              <a:t>You always receive the highest grade over all attempts (e.g., final exam retakes</a:t>
             </a:r>
           </a:p>
           <a:p>
             <a:pPr lvl="1"/>
             <a:r>
-              <a:rPr lang="en-US" b="1" i="1" u="sng" dirty="0"/>
-              <a:t>grade &lt;= 90 %</a:t>
-            </a:r>
-            <a:r>
-              <a:rPr lang="en-US" dirty="0"/>
-              <a:t>: You earn the grade as shown</a:t>
+              <a:rPr lang="en-US" dirty="0"/>
+              <a:t>E.g., if you receive a 16/20 during midterm, and 13/20 during retake you still earn the 16/20 on that quiz.</a:t>
             </a:r>
           </a:p>
           <a:p>
             <a:pPr lvl="1"/>
-            <a:r>
-              <a:rPr lang="en-US" b="1" i="1" u="sng" dirty="0"/>
-              <a:t>grade &gt; 90 %:</a:t>
-            </a:r>
-            <a:r>
-              <a:rPr lang="en-US" dirty="0"/>
-              <a:t> Grade is rounded up to a 100% (mastery!)</a:t>
-            </a:r>
-          </a:p>
-          <a:p>
             <a:endParaRPr lang="en-US" dirty="0"/>
           </a:p>
           <a:p>
             <a:r>
               <a:rPr lang="en-US" dirty="0"/>
-              <a:t>You always receive the highest grade over all attempts (e.g., final exam retakes</a:t>
-            </a:r>
-          </a:p>
-          <a:p>
-            <a:r>
-              <a:rPr lang="en-US" dirty="0"/>
-              <a:t>Quizzes taken during the final exam session do not round</a:t>
-            </a:r>
-          </a:p>
-          <a:p>
-            <a:r>
-              <a:rPr lang="en-US" dirty="0"/>
-              <a:t>If you earn above a 90%, rounding is meant to ensure you don’t take the retake on the final exam day if you did really well on the first attempt.</a:t>
+              <a:t>You should always prioritize retaking quizzes with the lowest grades (somewhat obvious).</a:t>
             </a:r>
           </a:p>
         </p:txBody>
@@ -16252,7 +16224,7 @@
       </p:grpSpPr>
       <p:sp>
         <p:nvSpPr>
-          <p:cNvPr id="16386" name="Title 1"/>
+          <p:cNvPr id="17410" name="Title 1"/>
           <p:cNvSpPr>
             <a:spLocks noGrp="1"/>
           </p:cNvSpPr>
@@ -16262,8 +16234,8 @@
         </p:nvSpPr>
         <p:spPr>
           <a:xfrm>
-            <a:off x="1141413" y="397455"/>
-            <a:ext cx="9905998" cy="828445"/>
+            <a:off x="1141413" y="457745"/>
+            <a:ext cx="9905998" cy="874078"/>
           </a:xfrm>
         </p:spPr>
         <p:txBody>
@@ -16273,14 +16245,14 @@
             <a:pPr algn="ctr"/>
             <a:r>
               <a:rPr lang="en-US" dirty="0"/>
-              <a:t>Homework: Programming Hints</a:t>
-            </a:r>
-          </a:p>
-        </p:txBody>
-      </p:sp>
-      <p:sp>
-        <p:nvSpPr>
-          <p:cNvPr id="16387" name="Content Placeholder 2"/>
+              <a:t>Homework: Written</a:t>
+            </a:r>
+          </a:p>
+        </p:txBody>
+      </p:sp>
+      <p:sp>
+        <p:nvSpPr>
+          <p:cNvPr id="17411" name="Content Placeholder 2"/>
           <p:cNvSpPr>
             <a:spLocks noGrp="1"/>
           </p:cNvSpPr>
@@ -16290,116 +16262,48 @@
         </p:nvSpPr>
         <p:spPr>
           <a:xfrm>
-            <a:off x="1371600" y="1526633"/>
-            <a:ext cx="9654176" cy="4950367"/>
+            <a:off x="1621861" y="1644997"/>
+            <a:ext cx="9274739" cy="4755803"/>
           </a:xfrm>
         </p:spPr>
         <p:txBody>
-          <a:bodyPr>
-            <a:normAutofit fontScale="92500" lnSpcReduction="10000"/>
-          </a:bodyPr>
+          <a:bodyPr/>
           <a:lstStyle/>
           <a:p>
             <a:r>
               <a:rPr lang="en-US" dirty="0"/>
-              <a:t>Understand the problem!</a:t>
-            </a:r>
-          </a:p>
-          <a:p>
-            <a:r>
-              <a:rPr lang="en-US" dirty="0"/>
-              <a:t>Consider all boundary cases</a:t>
-            </a:r>
-          </a:p>
-          <a:p>
-            <a:r>
-              <a:rPr lang="en-US" dirty="0"/>
-              <a:t>Use pre-existing library code</a:t>
-            </a:r>
-          </a:p>
-          <a:p>
-            <a:pPr lvl="1"/>
-            <a:r>
-              <a:rPr lang="en-US" dirty="0"/>
-              <a:t>Number formatting: </a:t>
+              <a:t>These assignments must be typeset in </a:t>
             </a:r>
             <a:r>
               <a:rPr lang="en-US" dirty="0" err="1"/>
-              <a:t>NumberFormat</a:t>
-            </a:r>
-            <a:r>
-              <a:rPr lang="en-US" dirty="0"/>
-              <a:t> in Java, </a:t>
-            </a:r>
-            <a:r>
-              <a:rPr lang="en-US" dirty="0" err="1"/>
-              <a:t>printf</a:t>
-            </a:r>
-            <a:r>
-              <a:rPr lang="en-US" dirty="0"/>
-              <a:t>() in C/C++</a:t>
-            </a:r>
-          </a:p>
-          <a:p>
-            <a:pPr lvl="1"/>
-            <a:r>
-              <a:rPr lang="en-US" dirty="0"/>
-              <a:t>Input: Scanner in Java, </a:t>
-            </a:r>
-            <a:r>
-              <a:rPr lang="en-US" dirty="0" err="1"/>
-              <a:t>scanf</a:t>
-            </a:r>
-            <a:r>
-              <a:rPr lang="en-US" dirty="0"/>
-              <a:t>() in C, </a:t>
-            </a:r>
-            <a:r>
-              <a:rPr lang="en-US" dirty="0" err="1"/>
-              <a:t>cin</a:t>
-            </a:r>
-            <a:r>
-              <a:rPr lang="en-US" dirty="0"/>
-              <a:t> in C++</a:t>
-            </a:r>
-          </a:p>
-          <a:p>
-            <a:r>
-              <a:rPr lang="en-US" dirty="0"/>
-              <a:t>Know how to handle floating point numbers</a:t>
-            </a:r>
-          </a:p>
-          <a:p>
-            <a:pPr lvl="1"/>
-            <a:r>
-              <a:rPr lang="en-US" dirty="0"/>
-              <a:t>Understand float/double precision issues</a:t>
-            </a:r>
-          </a:p>
-          <a:p>
-            <a:pPr lvl="1"/>
-            <a:r>
-              <a:rPr lang="en-US" dirty="0"/>
-              <a:t>Rounding, floating-point mod</a:t>
-            </a:r>
-          </a:p>
-          <a:p>
-            <a:r>
-              <a:rPr lang="en-US" dirty="0"/>
-              <a:t>Make sure it works for the provided test cases</a:t>
-            </a:r>
-          </a:p>
-          <a:p>
-            <a:r>
-              <a:rPr lang="en-US" dirty="0"/>
-              <a:t>Then write some of your own</a:t>
-            </a:r>
-          </a:p>
-          <a:p>
-            <a:r>
-              <a:rPr lang="en-US" dirty="0"/>
-              <a:t>Make sure you read the language specific details for submission!!!</a:t>
-            </a:r>
+              <a:t>LaTeX</a:t>
+            </a:r>
+            <a:endParaRPr lang="en-US" dirty="0"/>
+          </a:p>
+          <a:p>
+            <a:endParaRPr lang="en-US" dirty="0"/>
+          </a:p>
+          <a:p>
+            <a:r>
+              <a:rPr lang="en-US" dirty="0"/>
+              <a:t>I will provide a couple tutorials, guides, and templates when the first assignment is given out</a:t>
+            </a:r>
+          </a:p>
+          <a:p>
+            <a:endParaRPr lang="en-US" dirty="0"/>
+          </a:p>
+          <a:p>
+            <a:r>
+              <a:rPr lang="en-US" b="1" i="1" u="sng" dirty="0"/>
+              <a:t>You may not embed images of text or formulas</a:t>
+            </a:r>
+            <a:r>
+              <a:rPr lang="en-US" dirty="0"/>
+              <a:t>!</a:t>
+            </a:r>
+          </a:p>
+          <a:p>
+            <a:endParaRPr lang="en-US" dirty="0"/>
           </a:p>
         </p:txBody>
       </p:sp>
@@ -16430,7 +16334,7 @@
     </p:spTree>
     <p:extLst>
       <p:ext uri="{BB962C8B-B14F-4D97-AF65-F5344CB8AC3E}">
-        <p14:creationId xmlns:p14="http://schemas.microsoft.com/office/powerpoint/2010/main" val="1237736184"/>
+        <p14:creationId xmlns:p14="http://schemas.microsoft.com/office/powerpoint/2010/main" val="4248825475"/>
       </p:ext>
     </p:extLst>
   </p:cSld>
@@ -16459,7 +16363,13 @@
       </p:grpSpPr>
       <p:sp>
         <p:nvSpPr>
-          <p:cNvPr id="2" name="Title 1"/>
+          <p:cNvPr id="2" name="Title 1">
+            <a:extLst>
+              <a:ext uri="{FF2B5EF4-FFF2-40B4-BE49-F238E27FC236}">
+                <a16:creationId xmlns:a16="http://schemas.microsoft.com/office/drawing/2014/main" id="{8E5DC06E-652D-CD40-8782-E878E11BC092}"/>
+              </a:ext>
+            </a:extLst>
+          </p:cNvPr>
           <p:cNvSpPr>
             <a:spLocks noGrp="1"/>
           </p:cNvSpPr>
@@ -16469,8 +16379,8 @@
         </p:nvSpPr>
         <p:spPr>
           <a:xfrm>
-            <a:off x="1141413" y="437648"/>
-            <a:ext cx="9905998" cy="794787"/>
+            <a:off x="1141413" y="538132"/>
+            <a:ext cx="9905998" cy="799137"/>
           </a:xfrm>
         </p:spPr>
         <p:txBody>
@@ -16480,14 +16390,20 @@
             <a:pPr algn="ctr"/>
             <a:r>
               <a:rPr lang="en-US" dirty="0"/>
-              <a:t>Homework: Programming FAQ</a:t>
-            </a:r>
-          </a:p>
-        </p:txBody>
-      </p:sp>
-      <p:sp>
-        <p:nvSpPr>
-          <p:cNvPr id="4" name="Content Placeholder 3"/>
+              <a:t>Use of Online Code Etc.</a:t>
+            </a:r>
+          </a:p>
+        </p:txBody>
+      </p:sp>
+      <p:sp>
+        <p:nvSpPr>
+          <p:cNvPr id="4" name="Content Placeholder 3">
+            <a:extLst>
+              <a:ext uri="{FF2B5EF4-FFF2-40B4-BE49-F238E27FC236}">
+                <a16:creationId xmlns:a16="http://schemas.microsoft.com/office/drawing/2014/main" id="{8C2A69A9-9079-244C-BEAE-11CF7ACAB26E}"/>
+              </a:ext>
+            </a:extLst>
+          </p:cNvPr>
           <p:cNvSpPr>
             <a:spLocks noGrp="1"/>
           </p:cNvSpPr>
@@ -16497,26 +16413,44 @@
         </p:nvSpPr>
         <p:spPr>
           <a:xfrm>
-            <a:off x="1467229" y="1718106"/>
-            <a:ext cx="9429371" cy="4835094"/>
+            <a:off x="1447800" y="1722456"/>
+            <a:ext cx="9420888" cy="4830744"/>
           </a:xfrm>
         </p:spPr>
         <p:txBody>
           <a:bodyPr>
-            <a:normAutofit fontScale="92500" lnSpcReduction="10000"/>
+            <a:normAutofit fontScale="92500"/>
           </a:bodyPr>
           <a:lstStyle/>
           <a:p>
             <a:r>
-              <a:rPr lang="en-US" dirty="0"/>
-              <a:t>Do I need to write my own sorting methods.</a:t>
+              <a:rPr lang="en-US" u="sng" dirty="0"/>
+              <a:t>Studying</a:t>
+            </a:r>
+            <a:r>
+              <a:rPr lang="en-US" dirty="0"/>
+              <a:t> code or proofs online is permitted </a:t>
+            </a:r>
+            <a:r>
+              <a:rPr lang="en-US" u="sng" dirty="0"/>
+              <a:t>but only</a:t>
+            </a:r>
+            <a:r>
+              <a:rPr lang="en-US" dirty="0"/>
+              <a:t> for getting ideas</a:t>
+            </a:r>
+          </a:p>
+          <a:p>
+            <a:r>
+              <a:rPr lang="en-US" dirty="0"/>
+              <a:t>Copying or reusing code or proofs from an online source violates the pledge</a:t>
             </a:r>
           </a:p>
           <a:p>
             <a:pPr lvl="1"/>
             <a:r>
               <a:rPr lang="en-US" dirty="0"/>
-              <a:t>No, unless the point of that assignment is to write sorting methods, you can use libraries for this.</a:t>
+              <a:t>You must cite sources of any online code you use in this way in a comment in your source file(s)</a:t>
             </a:r>
           </a:p>
           <a:p>
@@ -16526,38 +16460,90 @@
           <a:p>
             <a:r>
               <a:rPr lang="en-US" dirty="0"/>
-              <a:t>Can I get the test cases from submission server?</a:t>
+              <a:t>Remember:  the purpose of the homework is</a:t>
             </a:r>
           </a:p>
           <a:p>
             <a:pPr lvl="1"/>
             <a:r>
               <a:rPr lang="en-US" dirty="0"/>
-              <a:t>No, part of the point is to work on brainstorming cases your code is missing without being told. Submission server will give limited feedback on purpose!</a:t>
+              <a:t>To </a:t>
+            </a:r>
+            <a:r>
+              <a:rPr lang="en-US" b="1" i="1" u="sng" dirty="0"/>
+              <a:t>practice</a:t>
+            </a:r>
+            <a:r>
+              <a:rPr lang="en-US" dirty="0"/>
+              <a:t> in an environment that is lower-stress</a:t>
             </a:r>
           </a:p>
           <a:p>
             <a:pPr lvl="1"/>
+            <a:r>
+              <a:rPr lang="en-US" dirty="0"/>
+              <a:t>To </a:t>
+            </a:r>
+            <a:r>
+              <a:rPr lang="en-US" b="1" i="1" u="sng" dirty="0"/>
+              <a:t>push yourself </a:t>
+            </a:r>
+            <a:r>
+              <a:rPr lang="en-US" dirty="0"/>
+              <a:t>to solve think about the theory of computation and to prepare you for the quizzes, NOT just to get a grade.</a:t>
+            </a:r>
+          </a:p>
+          <a:p>
+            <a:pPr lvl="1"/>
+            <a:r>
+              <a:rPr lang="en-US" dirty="0"/>
+              <a:t>To </a:t>
+            </a:r>
+            <a:r>
+              <a:rPr lang="en-US" b="1" i="1" u="sng" dirty="0"/>
+              <a:t>work out the logical part </a:t>
+            </a:r>
+            <a:r>
+              <a:rPr lang="en-US" dirty="0"/>
+              <a:t>of your brain </a:t>
+            </a:r>
+            <a:r>
+              <a:rPr lang="en-US" dirty="0">
+                <a:sym typeface="Wingdings" pitchFamily="2" charset="2"/>
+              </a:rPr>
+              <a:t></a:t>
+            </a:r>
             <a:endParaRPr lang="en-US" dirty="0"/>
           </a:p>
           <a:p>
-            <a:r>
-              <a:rPr lang="en-US" dirty="0"/>
-              <a:t>Will you help me debug my code?</a:t>
-            </a:r>
-          </a:p>
-          <a:p>
             <a:pPr lvl="1"/>
             <a:r>
               <a:rPr lang="en-US" dirty="0"/>
-              <a:t>No, we won’t. You need to learn how to do this on your own. I’m happy to give you advice on how to approach your debugging problems, but I will not sit down and debug code with you.</a:t>
-            </a:r>
-          </a:p>
-        </p:txBody>
-      </p:sp>
-      <p:sp>
-        <p:nvSpPr>
-          <p:cNvPr id="3" name="Slide Number Placeholder 2"/>
+              <a:t>To focus on </a:t>
+            </a:r>
+            <a:r>
+              <a:rPr lang="en-US" b="1" i="1" u="sng" dirty="0"/>
+              <a:t>attempting to solve problems yourself </a:t>
+            </a:r>
+            <a:r>
+              <a:rPr lang="en-US" dirty="0"/>
+              <a:t>before asking others for assistance.</a:t>
+            </a:r>
+          </a:p>
+          <a:p>
+            <a:endParaRPr lang="en-US" dirty="0"/>
+          </a:p>
+        </p:txBody>
+      </p:sp>
+      <p:sp>
+        <p:nvSpPr>
+          <p:cNvPr id="3" name="Slide Number Placeholder 2">
+            <a:extLst>
+              <a:ext uri="{FF2B5EF4-FFF2-40B4-BE49-F238E27FC236}">
+                <a16:creationId xmlns:a16="http://schemas.microsoft.com/office/drawing/2014/main" id="{56136DFE-FBB4-E24C-ABB6-77FCF4FCA26D}"/>
+              </a:ext>
+            </a:extLst>
+          </p:cNvPr>
           <p:cNvSpPr>
             <a:spLocks noGrp="1"/>
           </p:cNvSpPr>
@@ -16582,7 +16568,7 @@
     </p:spTree>
     <p:extLst>
       <p:ext uri="{BB962C8B-B14F-4D97-AF65-F5344CB8AC3E}">
-        <p14:creationId xmlns:p14="http://schemas.microsoft.com/office/powerpoint/2010/main" val="109002242"/>
+        <p14:creationId xmlns:p14="http://schemas.microsoft.com/office/powerpoint/2010/main" val="3316639139"/>
       </p:ext>
     </p:extLst>
   </p:cSld>
@@ -16611,7 +16597,7 @@
       </p:grpSpPr>
       <p:sp>
         <p:nvSpPr>
-          <p:cNvPr id="17410" name="Title 1"/>
+          <p:cNvPr id="18434" name="Title 1"/>
           <p:cNvSpPr>
             <a:spLocks noGrp="1"/>
           </p:cNvSpPr>
@@ -16621,8 +16607,8 @@
         </p:nvSpPr>
         <p:spPr>
           <a:xfrm>
-            <a:off x="1141413" y="457745"/>
-            <a:ext cx="9905998" cy="874078"/>
+            <a:off x="1141413" y="427600"/>
+            <a:ext cx="9905998" cy="823212"/>
           </a:xfrm>
         </p:spPr>
         <p:txBody>
@@ -16632,14 +16618,14 @@
             <a:pPr algn="ctr"/>
             <a:r>
               <a:rPr lang="en-US" dirty="0"/>
-              <a:t>Homework: Written</a:t>
-            </a:r>
-          </a:p>
-        </p:txBody>
-      </p:sp>
-      <p:sp>
-        <p:nvSpPr>
-          <p:cNvPr id="17411" name="Content Placeholder 2"/>
+              <a:t>Working in groups</a:t>
+            </a:r>
+          </a:p>
+        </p:txBody>
+      </p:sp>
+      <p:sp>
+        <p:nvSpPr>
+          <p:cNvPr id="18435" name="Content Placeholder 2"/>
           <p:cNvSpPr>
             <a:spLocks noGrp="1"/>
           </p:cNvSpPr>
@@ -16649,44 +16635,58 @@
         </p:nvSpPr>
         <p:spPr>
           <a:xfrm>
-            <a:off x="1621861" y="1644997"/>
-            <a:ext cx="9274739" cy="4755803"/>
+            <a:off x="1305446" y="1441730"/>
+            <a:ext cx="9819754" cy="5035270"/>
           </a:xfrm>
         </p:spPr>
         <p:txBody>
-          <a:bodyPr/>
+          <a:bodyPr>
+            <a:normAutofit/>
+          </a:bodyPr>
           <a:lstStyle/>
           <a:p>
             <a:r>
               <a:rPr lang="en-US" dirty="0"/>
-              <a:t>These assignments must be typeset in </a:t>
+              <a:t>For the homework, you may work together in groups of 3 or less (written assignments)</a:t>
+            </a:r>
+          </a:p>
+          <a:p>
+            <a:pPr lvl="1"/>
+            <a:r>
+              <a:rPr lang="en-US" dirty="0"/>
+              <a:t>Submit one homework per group (I believe </a:t>
             </a:r>
             <a:r>
               <a:rPr lang="en-US" dirty="0" err="1"/>
-              <a:t>LaTeX</a:t>
-            </a:r>
+              <a:t>Gradescope</a:t>
+            </a:r>
+            <a:r>
+              <a:rPr lang="en-US" dirty="0"/>
+              <a:t> supports this)</a:t>
+            </a:r>
+          </a:p>
+          <a:p>
             <a:endParaRPr lang="en-US" dirty="0"/>
           </a:p>
           <a:p>
-            <a:endParaRPr lang="en-US" dirty="0"/>
-          </a:p>
-          <a:p>
-            <a:r>
-              <a:rPr lang="en-US" dirty="0"/>
-              <a:t>I will provide a couple tutorials, guides, and templates when the first assignment is given out</a:t>
-            </a:r>
-          </a:p>
-          <a:p>
-            <a:endParaRPr lang="en-US" dirty="0"/>
-          </a:p>
-          <a:p>
-            <a:r>
-              <a:rPr lang="en-US" dirty="0"/>
-              <a:t>You may not embed images of text or formulas!</a:t>
-            </a:r>
-          </a:p>
-          <a:p>
-            <a:endParaRPr lang="en-US" dirty="0"/>
+            <a:r>
+              <a:rPr lang="en-US" dirty="0"/>
+              <a:t>For the programming homework, you may discuss the problems with your group of 3 or less, but you must:</a:t>
+            </a:r>
+          </a:p>
+          <a:p>
+            <a:pPr lvl="1"/>
+            <a:r>
+              <a:rPr lang="en-US" dirty="0"/>
+              <a:t>State who you worked with</a:t>
+            </a:r>
+          </a:p>
+          <a:p>
+            <a:pPr lvl="1"/>
+            <a:r>
+              <a:rPr lang="en-US" dirty="0"/>
+              <a:t>Type up your own implementation!</a:t>
+            </a:r>
           </a:p>
         </p:txBody>
       </p:sp>
@@ -16710,14 +16710,14 @@
               <a:pPr/>
               <a:t>27</a:t>
             </a:fld>
-            <a:endParaRPr lang="en-US"/>
+            <a:endParaRPr lang="en-US" dirty="0"/>
           </a:p>
         </p:txBody>
       </p:sp>
     </p:spTree>
     <p:extLst>
       <p:ext uri="{BB962C8B-B14F-4D97-AF65-F5344CB8AC3E}">
-        <p14:creationId xmlns:p14="http://schemas.microsoft.com/office/powerpoint/2010/main" val="4248825475"/>
+        <p14:creationId xmlns:p14="http://schemas.microsoft.com/office/powerpoint/2010/main" val="1292368053"/>
       </p:ext>
     </p:extLst>
   </p:cSld>
@@ -16746,13 +16746,7 @@
       </p:grpSpPr>
       <p:sp>
         <p:nvSpPr>
-          <p:cNvPr id="2" name="Title 1">
-            <a:extLst>
-              <a:ext uri="{FF2B5EF4-FFF2-40B4-BE49-F238E27FC236}">
-                <a16:creationId xmlns:a16="http://schemas.microsoft.com/office/drawing/2014/main" id="{8E5DC06E-652D-CD40-8782-E878E11BC092}"/>
-              </a:ext>
-            </a:extLst>
-          </p:cNvPr>
+          <p:cNvPr id="18434" name="Title 1"/>
           <p:cNvSpPr>
             <a:spLocks noGrp="1"/>
           </p:cNvSpPr>
@@ -16762,31 +16756,27 @@
         </p:nvSpPr>
         <p:spPr>
           <a:xfrm>
-            <a:off x="1141413" y="538132"/>
-            <a:ext cx="9905998" cy="799137"/>
+            <a:off x="1141413" y="427600"/>
+            <a:ext cx="9905998" cy="823212"/>
           </a:xfrm>
         </p:spPr>
         <p:txBody>
-          <a:bodyPr/>
+          <a:bodyPr>
+            <a:normAutofit fontScale="90000"/>
+          </a:bodyPr>
           <a:lstStyle/>
           <a:p>
             <a:pPr algn="ctr"/>
             <a:r>
               <a:rPr lang="en-US" dirty="0"/>
-              <a:t>Use of Online Code Etc.</a:t>
-            </a:r>
-          </a:p>
-        </p:txBody>
-      </p:sp>
-      <p:sp>
-        <p:nvSpPr>
-          <p:cNvPr id="4" name="Content Placeholder 3">
-            <a:extLst>
-              <a:ext uri="{FF2B5EF4-FFF2-40B4-BE49-F238E27FC236}">
-                <a16:creationId xmlns:a16="http://schemas.microsoft.com/office/drawing/2014/main" id="{8C2A69A9-9079-244C-BEAE-11CF7ACAB26E}"/>
-              </a:ext>
-            </a:extLst>
-          </p:cNvPr>
+              <a:t>On the subject of extensions and Attendance</a:t>
+            </a:r>
+          </a:p>
+        </p:txBody>
+      </p:sp>
+      <p:sp>
+        <p:nvSpPr>
+          <p:cNvPr id="18435" name="Content Placeholder 2"/>
           <p:cNvSpPr>
             <a:spLocks noGrp="1"/>
           </p:cNvSpPr>
@@ -16796,44 +16786,38 @@
         </p:nvSpPr>
         <p:spPr>
           <a:xfrm>
-            <a:off x="1447800" y="1722456"/>
-            <a:ext cx="9420888" cy="4830744"/>
+            <a:off x="1227656" y="1350290"/>
+            <a:ext cx="9819754" cy="5035270"/>
           </a:xfrm>
         </p:spPr>
         <p:txBody>
           <a:bodyPr>
-            <a:normAutofit fontScale="92500"/>
+            <a:normAutofit lnSpcReduction="10000"/>
           </a:bodyPr>
           <a:lstStyle/>
           <a:p>
             <a:r>
-              <a:rPr lang="en-US" u="sng" dirty="0"/>
-              <a:t>Studying</a:t>
-            </a:r>
-            <a:r>
-              <a:rPr lang="en-US" dirty="0"/>
-              <a:t> code or proofs online is permitted </a:t>
-            </a:r>
-            <a:r>
-              <a:rPr lang="en-US" u="sng" dirty="0"/>
-              <a:t>but only</a:t>
-            </a:r>
-            <a:r>
-              <a:rPr lang="en-US" dirty="0"/>
-              <a:t> for getting ideas</a:t>
-            </a:r>
-          </a:p>
-          <a:p>
-            <a:r>
-              <a:rPr lang="en-US" dirty="0"/>
-              <a:t>Copying or reusing code or proofs from an online source violates the pledge</a:t>
+              <a:rPr lang="en-US" b="1" i="1" u="sng" dirty="0"/>
+              <a:t>Attendance</a:t>
+            </a:r>
+            <a:r>
+              <a:rPr lang="en-US" dirty="0"/>
+              <a:t>: I want you to attend lecture, obviously. Don’t want to be strict about it…but do want to provide incentive for you to be here, which is good for your learning.</a:t>
             </a:r>
           </a:p>
           <a:p>
             <a:pPr lvl="1"/>
             <a:r>
               <a:rPr lang="en-US" dirty="0"/>
-              <a:t>You must cite sources of any online code you use in this way in a comment in your source file(s)</a:t>
+              <a:t>I will secretly keep track of the </a:t>
+            </a:r>
+            <a:r>
+              <a:rPr lang="en-US" b="1" i="1" u="sng" dirty="0"/>
+              <a:t>number of lectures in which less than 50 percent</a:t>
+            </a:r>
+            <a:r>
+              <a:rPr lang="en-US" dirty="0"/>
+              <a:t> of the class is present.</a:t>
             </a:r>
           </a:p>
           <a:p>
@@ -16843,90 +16827,44 @@
           <a:p>
             <a:r>
               <a:rPr lang="en-US" dirty="0"/>
-              <a:t>Remember:  the purpose of the homework is</a:t>
+              <a:t>Extensions: You should not use these unless you ABSOLUTELY need to.</a:t>
             </a:r>
           </a:p>
           <a:p>
             <a:pPr lvl="1"/>
             <a:r>
               <a:rPr lang="en-US" dirty="0"/>
-              <a:t>To </a:t>
+              <a:t>I will keep track of the </a:t>
             </a:r>
             <a:r>
               <a:rPr lang="en-US" b="1" i="1" u="sng" dirty="0"/>
-              <a:t>practice</a:t>
-            </a:r>
-            <a:r>
-              <a:rPr lang="en-US" dirty="0"/>
-              <a:t> in an environment that is lower-stress</a:t>
-            </a:r>
-          </a:p>
-          <a:p>
-            <a:pPr lvl="1"/>
-            <a:r>
-              <a:rPr lang="en-US" dirty="0"/>
-              <a:t>To </a:t>
-            </a:r>
-            <a:r>
-              <a:rPr lang="en-US" b="1" i="1" u="sng" dirty="0"/>
-              <a:t>push yourself </a:t>
-            </a:r>
-            <a:r>
-              <a:rPr lang="en-US" dirty="0"/>
-              <a:t>to solve think about the theory of computation and to prepare you for the quizzes, NOT just to get a grade.</a:t>
-            </a:r>
-          </a:p>
-          <a:p>
-            <a:pPr lvl="1"/>
-            <a:r>
-              <a:rPr lang="en-US" dirty="0"/>
-              <a:t>To </a:t>
-            </a:r>
-            <a:r>
-              <a:rPr lang="en-US" b="1" i="1" u="sng" dirty="0"/>
-              <a:t>work out the logical part </a:t>
-            </a:r>
-            <a:r>
-              <a:rPr lang="en-US" dirty="0"/>
-              <a:t>of your brain </a:t>
-            </a:r>
-            <a:r>
-              <a:rPr lang="en-US" dirty="0">
-                <a:sym typeface="Wingdings" pitchFamily="2" charset="2"/>
-              </a:rPr>
-              <a:t></a:t>
-            </a:r>
+              <a:t>percentage of assignments that are late</a:t>
+            </a:r>
+            <a:r>
+              <a:rPr lang="en-US" dirty="0"/>
+              <a:t>.</a:t>
+            </a:r>
+          </a:p>
+          <a:p>
             <a:endParaRPr lang="en-US" dirty="0"/>
           </a:p>
           <a:p>
-            <a:pPr lvl="1"/>
-            <a:r>
-              <a:rPr lang="en-US" dirty="0"/>
-              <a:t>To focus on </a:t>
-            </a:r>
-            <a:r>
-              <a:rPr lang="en-US" b="1" i="1" u="sng" dirty="0"/>
-              <a:t>attempting to solve problems yourself </a:t>
-            </a:r>
-            <a:r>
-              <a:rPr lang="en-US" dirty="0"/>
-              <a:t>before asking others for assistance.</a:t>
+            <a:r>
+              <a:rPr lang="en-US" dirty="0"/>
+              <a:t>Both of these numbers will be used in calculating your course curve at the end of the semester.</a:t>
             </a:r>
           </a:p>
           <a:p>
             <a:endParaRPr lang="en-US" dirty="0"/>
           </a:p>
-        </p:txBody>
-      </p:sp>
-      <p:sp>
-        <p:nvSpPr>
-          <p:cNvPr id="3" name="Slide Number Placeholder 2">
-            <a:extLst>
-              <a:ext uri="{FF2B5EF4-FFF2-40B4-BE49-F238E27FC236}">
-                <a16:creationId xmlns:a16="http://schemas.microsoft.com/office/drawing/2014/main" id="{56136DFE-FBB4-E24C-ABB6-77FCF4FCA26D}"/>
-              </a:ext>
-            </a:extLst>
-          </p:cNvPr>
+          <a:p>
+            <a:endParaRPr lang="en-US" dirty="0"/>
+          </a:p>
+        </p:txBody>
+      </p:sp>
+      <p:sp>
+        <p:nvSpPr>
+          <p:cNvPr id="4" name="Slide Number Placeholder 3"/>
           <p:cNvSpPr>
             <a:spLocks noGrp="1"/>
           </p:cNvSpPr>
@@ -16944,14 +16882,14 @@
               <a:pPr/>
               <a:t>28</a:t>
             </a:fld>
-            <a:endParaRPr lang="en-US"/>
+            <a:endParaRPr lang="en-US" dirty="0"/>
           </a:p>
         </p:txBody>
       </p:sp>
     </p:spTree>
     <p:extLst>
       <p:ext uri="{BB962C8B-B14F-4D97-AF65-F5344CB8AC3E}">
-        <p14:creationId xmlns:p14="http://schemas.microsoft.com/office/powerpoint/2010/main" val="3316639139"/>
+        <p14:creationId xmlns:p14="http://schemas.microsoft.com/office/powerpoint/2010/main" val="474709066"/>
       </p:ext>
     </p:extLst>
   </p:cSld>
@@ -17001,7 +16939,7 @@
             <a:pPr algn="ctr"/>
             <a:r>
               <a:rPr lang="en-US" dirty="0"/>
-              <a:t>Working in groups</a:t>
+              <a:t>I think that is all…</a:t>
             </a:r>
           </a:p>
         </p:txBody>
@@ -17030,45 +16968,7 @@
           <a:p>
             <a:r>
               <a:rPr lang="en-US" dirty="0"/>
-              <a:t>For the homework, you may work together in groups of 3 or less (written assignments)</a:t>
-            </a:r>
-          </a:p>
-          <a:p>
-            <a:pPr lvl="1"/>
-            <a:r>
-              <a:rPr lang="en-US" dirty="0"/>
-              <a:t>Submit one homework per group (I believe </a:t>
-            </a:r>
-            <a:r>
-              <a:rPr lang="en-US" dirty="0" err="1"/>
-              <a:t>Gradescope</a:t>
-            </a:r>
-            <a:r>
-              <a:rPr lang="en-US" dirty="0"/>
-              <a:t> supports this)</a:t>
-            </a:r>
-          </a:p>
-          <a:p>
-            <a:endParaRPr lang="en-US" dirty="0"/>
-          </a:p>
-          <a:p>
-            <a:r>
-              <a:rPr lang="en-US" dirty="0"/>
-              <a:t>For the programming homework, you may discuss the problems with your group of 3 or less, but you must:</a:t>
-            </a:r>
-          </a:p>
-          <a:p>
-            <a:pPr lvl="1"/>
-            <a:r>
-              <a:rPr lang="en-US" dirty="0"/>
-              <a:t>State who you worked with</a:t>
-            </a:r>
-          </a:p>
-          <a:p>
-            <a:pPr lvl="1"/>
-            <a:r>
-              <a:rPr lang="en-US" dirty="0"/>
-              <a:t>Type up your own implementation!</a:t>
+              <a:t>Any questions…</a:t>
             </a:r>
           </a:p>
         </p:txBody>
@@ -17100,7 +17000,7 @@
     </p:spTree>
     <p:extLst>
       <p:ext uri="{BB962C8B-B14F-4D97-AF65-F5344CB8AC3E}">
-        <p14:creationId xmlns:p14="http://schemas.microsoft.com/office/powerpoint/2010/main" val="1292368053"/>
+        <p14:creationId xmlns:p14="http://schemas.microsoft.com/office/powerpoint/2010/main" val="755208883"/>
       </p:ext>
     </p:extLst>
   </p:cSld>
@@ -17303,117 +17203,6 @@
     <p:extLst>
       <p:ext uri="{BB962C8B-B14F-4D97-AF65-F5344CB8AC3E}">
         <p14:creationId xmlns:p14="http://schemas.microsoft.com/office/powerpoint/2010/main" val="3749058203"/>
-      </p:ext>
-    </p:extLst>
-  </p:cSld>
-  <p:clrMapOvr>
-    <a:masterClrMapping/>
-  </p:clrMapOvr>
-</p:sld>
-</file>
-
-<file path=ppt/slides/slide30.xml><?xml version="1.0" encoding="utf-8"?>
-<p:sld xmlns:a="http://schemas.openxmlformats.org/drawingml/2006/main" xmlns:r="http://schemas.openxmlformats.org/officeDocument/2006/relationships" xmlns:p="http://schemas.openxmlformats.org/presentationml/2006/main">
-  <p:cSld>
-    <p:spTree>
-      <p:nvGrpSpPr>
-        <p:cNvPr id="1" name=""/>
-        <p:cNvGrpSpPr/>
-        <p:nvPr/>
-      </p:nvGrpSpPr>
-      <p:grpSpPr>
-        <a:xfrm>
-          <a:off x="0" y="0"/>
-          <a:ext cx="0" cy="0"/>
-          <a:chOff x="0" y="0"/>
-          <a:chExt cx="0" cy="0"/>
-        </a:xfrm>
-      </p:grpSpPr>
-      <p:sp>
-        <p:nvSpPr>
-          <p:cNvPr id="18434" name="Title 1"/>
-          <p:cNvSpPr>
-            <a:spLocks noGrp="1"/>
-          </p:cNvSpPr>
-          <p:nvPr>
-            <p:ph type="title"/>
-          </p:nvPr>
-        </p:nvSpPr>
-        <p:spPr>
-          <a:xfrm>
-            <a:off x="1141413" y="427600"/>
-            <a:ext cx="9905998" cy="823212"/>
-          </a:xfrm>
-        </p:spPr>
-        <p:txBody>
-          <a:bodyPr/>
-          <a:lstStyle/>
-          <a:p>
-            <a:pPr algn="ctr"/>
-            <a:r>
-              <a:rPr lang="en-US" dirty="0"/>
-              <a:t>I think that is all…</a:t>
-            </a:r>
-          </a:p>
-        </p:txBody>
-      </p:sp>
-      <p:sp>
-        <p:nvSpPr>
-          <p:cNvPr id="18435" name="Content Placeholder 2"/>
-          <p:cNvSpPr>
-            <a:spLocks noGrp="1"/>
-          </p:cNvSpPr>
-          <p:nvPr>
-            <p:ph idx="1"/>
-          </p:nvPr>
-        </p:nvSpPr>
-        <p:spPr>
-          <a:xfrm>
-            <a:off x="1305446" y="1441730"/>
-            <a:ext cx="9819754" cy="5035270"/>
-          </a:xfrm>
-        </p:spPr>
-        <p:txBody>
-          <a:bodyPr>
-            <a:normAutofit/>
-          </a:bodyPr>
-          <a:lstStyle/>
-          <a:p>
-            <a:r>
-              <a:rPr lang="en-US" dirty="0"/>
-              <a:t>Any questions…</a:t>
-            </a:r>
-          </a:p>
-        </p:txBody>
-      </p:sp>
-      <p:sp>
-        <p:nvSpPr>
-          <p:cNvPr id="4" name="Slide Number Placeholder 3"/>
-          <p:cNvSpPr>
-            <a:spLocks noGrp="1"/>
-          </p:cNvSpPr>
-          <p:nvPr>
-            <p:ph type="sldNum" sz="quarter" idx="12"/>
-          </p:nvPr>
-        </p:nvSpPr>
-        <p:spPr/>
-        <p:txBody>
-          <a:bodyPr/>
-          <a:lstStyle/>
-          <a:p>
-            <a:fld id="{F26D9103-0C5C-48AC-B68E-3ED2C1647047}" type="slidenum">
-              <a:rPr lang="en-US" smtClean="0"/>
-              <a:pPr/>
-              <a:t>30</a:t>
-            </a:fld>
-            <a:endParaRPr lang="en-US" dirty="0"/>
-          </a:p>
-        </p:txBody>
-      </p:sp>
-    </p:spTree>
-    <p:extLst>
-      <p:ext uri="{BB962C8B-B14F-4D97-AF65-F5344CB8AC3E}">
-        <p14:creationId xmlns:p14="http://schemas.microsoft.com/office/powerpoint/2010/main" val="755208883"/>
       </p:ext>
     </p:extLst>
   </p:cSld>

</xml_diff>

<commit_message>
small changes to intro
</commit_message>
<xml_diff>
--- a/slides/00-CourseIntroduction.pptx
+++ b/slides/00-CourseIntroduction.pptx
@@ -225,7 +225,7 @@
           <a:p>
             <a:fld id="{C5B45307-6ED4-B142-BD64-10F739779302}" type="datetimeFigureOut">
               <a:rPr lang="en-US" smtClean="0"/>
-              <a:t>8/20/25</a:t>
+              <a:t>8/25/25</a:t>
             </a:fld>
             <a:endParaRPr lang="en-US"/>
           </a:p>
@@ -728,7 +728,7 @@
           <a:noFill/>
           <a:extLst>
             <a:ext uri="{909E8E84-426E-40dd-AFC4-6F175D3DCCD1}">
-              <a14:hiddenFill xmlns="" xmlns:a14="http://schemas.microsoft.com/office/drawing/2010/main">
+              <a14:hiddenFill xmlns:a14="http://schemas.microsoft.com/office/drawing/2010/main" xmlns="">
                 <a:solidFill>
                   <a:srgbClr val="FFFFFF"/>
                 </a:solidFill>
@@ -787,7 +787,7 @@
             </a:ln>
             <a:extLst>
               <a:ext uri="{91240B29-F687-4f45-9708-019B960494DF}">
-                <a14:hiddenLine xmlns="" xmlns:a14="http://schemas.microsoft.com/office/drawing/2010/main" w="9525">
+                <a14:hiddenLine xmlns:a14="http://schemas.microsoft.com/office/drawing/2010/main" xmlns="" w="9525">
                   <a:solidFill>
                     <a:srgbClr val="000000"/>
                   </a:solidFill>
@@ -877,7 +877,7 @@
             </a:ln>
             <a:extLst>
               <a:ext uri="{91240B29-F687-4f45-9708-019B960494DF}">
-                <a14:hiddenLine xmlns="" xmlns:a14="http://schemas.microsoft.com/office/drawing/2010/main" w="9525">
+                <a14:hiddenLine xmlns:a14="http://schemas.microsoft.com/office/drawing/2010/main" xmlns="" w="9525">
                   <a:solidFill>
                     <a:srgbClr val="000000"/>
                   </a:solidFill>
@@ -967,7 +967,7 @@
             </a:ln>
             <a:extLst>
               <a:ext uri="{91240B29-F687-4f45-9708-019B960494DF}">
-                <a14:hiddenLine xmlns="" xmlns:a14="http://schemas.microsoft.com/office/drawing/2010/main" w="9525">
+                <a14:hiddenLine xmlns:a14="http://schemas.microsoft.com/office/drawing/2010/main" xmlns="" w="9525">
                   <a:solidFill>
                     <a:srgbClr val="000000"/>
                   </a:solidFill>
@@ -1001,7 +1001,7 @@
             </a:ln>
             <a:extLst>
               <a:ext uri="{91240B29-F687-4f45-9708-019B960494DF}">
-                <a14:hiddenLine xmlns="" xmlns:a14="http://schemas.microsoft.com/office/drawing/2010/main" w="9525">
+                <a14:hiddenLine xmlns:a14="http://schemas.microsoft.com/office/drawing/2010/main" xmlns="" w="9525">
                   <a:solidFill>
                     <a:srgbClr val="000000"/>
                   </a:solidFill>
@@ -1091,7 +1091,7 @@
             </a:ln>
             <a:extLst>
               <a:ext uri="{91240B29-F687-4f45-9708-019B960494DF}">
-                <a14:hiddenLine xmlns="" xmlns:a14="http://schemas.microsoft.com/office/drawing/2010/main" w="9525">
+                <a14:hiddenLine xmlns:a14="http://schemas.microsoft.com/office/drawing/2010/main" xmlns="" w="9525">
                   <a:solidFill>
                     <a:srgbClr val="000000"/>
                   </a:solidFill>
@@ -1153,7 +1153,7 @@
             </a:ln>
             <a:extLst>
               <a:ext uri="{91240B29-F687-4f45-9708-019B960494DF}">
-                <a14:hiddenLine xmlns="" xmlns:a14="http://schemas.microsoft.com/office/drawing/2010/main" w="9525">
+                <a14:hiddenLine xmlns:a14="http://schemas.microsoft.com/office/drawing/2010/main" xmlns="" w="9525">
                   <a:solidFill>
                     <a:srgbClr val="000000"/>
                   </a:solidFill>
@@ -1215,7 +1215,7 @@
             </a:ln>
             <a:extLst>
               <a:ext uri="{91240B29-F687-4f45-9708-019B960494DF}">
-                <a14:hiddenLine xmlns="" xmlns:a14="http://schemas.microsoft.com/office/drawing/2010/main" w="9525">
+                <a14:hiddenLine xmlns:a14="http://schemas.microsoft.com/office/drawing/2010/main" xmlns="" w="9525">
                   <a:solidFill>
                     <a:srgbClr val="000000"/>
                   </a:solidFill>
@@ -1305,7 +1305,7 @@
             </a:ln>
             <a:extLst>
               <a:ext uri="{91240B29-F687-4f45-9708-019B960494DF}">
-                <a14:hiddenLine xmlns="" xmlns:a14="http://schemas.microsoft.com/office/drawing/2010/main" w="9525">
+                <a14:hiddenLine xmlns:a14="http://schemas.microsoft.com/office/drawing/2010/main" xmlns="" w="9525">
                   <a:solidFill>
                     <a:srgbClr val="000000"/>
                   </a:solidFill>
@@ -1367,7 +1367,7 @@
             </a:ln>
             <a:extLst>
               <a:ext uri="{91240B29-F687-4f45-9708-019B960494DF}">
-                <a14:hiddenLine xmlns="" xmlns:a14="http://schemas.microsoft.com/office/drawing/2010/main" w="9525">
+                <a14:hiddenLine xmlns:a14="http://schemas.microsoft.com/office/drawing/2010/main" xmlns="" w="9525">
                   <a:solidFill>
                     <a:srgbClr val="000000"/>
                   </a:solidFill>
@@ -1429,7 +1429,7 @@
             </a:ln>
             <a:extLst>
               <a:ext uri="{91240B29-F687-4f45-9708-019B960494DF}">
-                <a14:hiddenLine xmlns="" xmlns:a14="http://schemas.microsoft.com/office/drawing/2010/main" w="9525">
+                <a14:hiddenLine xmlns:a14="http://schemas.microsoft.com/office/drawing/2010/main" xmlns="" w="9525">
                   <a:solidFill>
                     <a:srgbClr val="000000"/>
                   </a:solidFill>
@@ -1519,7 +1519,7 @@
             </a:ln>
             <a:extLst>
               <a:ext uri="{91240B29-F687-4f45-9708-019B960494DF}">
-                <a14:hiddenLine xmlns="" xmlns:a14="http://schemas.microsoft.com/office/drawing/2010/main" w="9525">
+                <a14:hiddenLine xmlns:a14="http://schemas.microsoft.com/office/drawing/2010/main" xmlns="" w="9525">
                   <a:solidFill>
                     <a:srgbClr val="000000"/>
                   </a:solidFill>
@@ -1609,7 +1609,7 @@
             </a:ln>
             <a:extLst>
               <a:ext uri="{91240B29-F687-4f45-9708-019B960494DF}">
-                <a14:hiddenLine xmlns="" xmlns:a14="http://schemas.microsoft.com/office/drawing/2010/main" w="9525">
+                <a14:hiddenLine xmlns:a14="http://schemas.microsoft.com/office/drawing/2010/main" xmlns="" w="9525">
                   <a:solidFill>
                     <a:srgbClr val="000000"/>
                   </a:solidFill>
@@ -1671,7 +1671,7 @@
             </a:ln>
             <a:extLst>
               <a:ext uri="{91240B29-F687-4f45-9708-019B960494DF}">
-                <a14:hiddenLine xmlns="" xmlns:a14="http://schemas.microsoft.com/office/drawing/2010/main" w="9525">
+                <a14:hiddenLine xmlns:a14="http://schemas.microsoft.com/office/drawing/2010/main" xmlns="" w="9525">
                   <a:solidFill>
                     <a:srgbClr val="000000"/>
                   </a:solidFill>
@@ -1781,7 +1781,7 @@
             </a:ln>
             <a:extLst>
               <a:ext uri="{91240B29-F687-4f45-9708-019B960494DF}">
-                <a14:hiddenLine xmlns="" xmlns:a14="http://schemas.microsoft.com/office/drawing/2010/main" w="9525">
+                <a14:hiddenLine xmlns:a14="http://schemas.microsoft.com/office/drawing/2010/main" xmlns="" w="9525">
                   <a:solidFill>
                     <a:srgbClr val="000000"/>
                   </a:solidFill>
@@ -1843,7 +1843,7 @@
             </a:ln>
             <a:extLst>
               <a:ext uri="{91240B29-F687-4f45-9708-019B960494DF}">
-                <a14:hiddenLine xmlns="" xmlns:a14="http://schemas.microsoft.com/office/drawing/2010/main" w="9525">
+                <a14:hiddenLine xmlns:a14="http://schemas.microsoft.com/office/drawing/2010/main" xmlns="" w="9525">
                   <a:solidFill>
                     <a:srgbClr val="000000"/>
                   </a:solidFill>
@@ -1933,7 +1933,7 @@
             </a:ln>
             <a:extLst>
               <a:ext uri="{91240B29-F687-4f45-9708-019B960494DF}">
-                <a14:hiddenLine xmlns="" xmlns:a14="http://schemas.microsoft.com/office/drawing/2010/main" w="9525">
+                <a14:hiddenLine xmlns:a14="http://schemas.microsoft.com/office/drawing/2010/main" xmlns="" w="9525">
                   <a:solidFill>
                     <a:srgbClr val="000000"/>
                   </a:solidFill>
@@ -2023,7 +2023,7 @@
             </a:ln>
             <a:extLst>
               <a:ext uri="{91240B29-F687-4f45-9708-019B960494DF}">
-                <a14:hiddenLine xmlns="" xmlns:a14="http://schemas.microsoft.com/office/drawing/2010/main" w="9525">
+                <a14:hiddenLine xmlns:a14="http://schemas.microsoft.com/office/drawing/2010/main" xmlns="" w="9525">
                   <a:solidFill>
                     <a:srgbClr val="000000"/>
                   </a:solidFill>
@@ -2085,7 +2085,7 @@
             </a:ln>
             <a:extLst>
               <a:ext uri="{91240B29-F687-4f45-9708-019B960494DF}">
-                <a14:hiddenLine xmlns="" xmlns:a14="http://schemas.microsoft.com/office/drawing/2010/main" w="9525">
+                <a14:hiddenLine xmlns:a14="http://schemas.microsoft.com/office/drawing/2010/main" xmlns="" w="9525">
                   <a:solidFill>
                     <a:srgbClr val="000000"/>
                   </a:solidFill>
@@ -2175,7 +2175,7 @@
             </a:ln>
             <a:extLst>
               <a:ext uri="{91240B29-F687-4f45-9708-019B960494DF}">
-                <a14:hiddenLine xmlns="" xmlns:a14="http://schemas.microsoft.com/office/drawing/2010/main" w="9525">
+                <a14:hiddenLine xmlns:a14="http://schemas.microsoft.com/office/drawing/2010/main" xmlns="" w="9525">
                   <a:solidFill>
                     <a:srgbClr val="000000"/>
                   </a:solidFill>
@@ -2265,7 +2265,7 @@
             </a:ln>
             <a:extLst>
               <a:ext uri="{91240B29-F687-4f45-9708-019B960494DF}">
-                <a14:hiddenLine xmlns="" xmlns:a14="http://schemas.microsoft.com/office/drawing/2010/main" w="9525">
+                <a14:hiddenLine xmlns:a14="http://schemas.microsoft.com/office/drawing/2010/main" xmlns="" w="9525">
                   <a:solidFill>
                     <a:srgbClr val="000000"/>
                   </a:solidFill>
@@ -2321,7 +2321,7 @@
             </a:ln>
             <a:extLst>
               <a:ext uri="{91240B29-F687-4f45-9708-019B960494DF}">
-                <a14:hiddenLine xmlns="" xmlns:a14="http://schemas.microsoft.com/office/drawing/2010/main" w="9525">
+                <a14:hiddenLine xmlns:a14="http://schemas.microsoft.com/office/drawing/2010/main" xmlns="" w="9525">
                   <a:solidFill>
                     <a:srgbClr val="000000"/>
                   </a:solidFill>
@@ -2411,7 +2411,7 @@
             </a:ln>
             <a:extLst>
               <a:ext uri="{91240B29-F687-4f45-9708-019B960494DF}">
-                <a14:hiddenLine xmlns="" xmlns:a14="http://schemas.microsoft.com/office/drawing/2010/main" w="9525">
+                <a14:hiddenLine xmlns:a14="http://schemas.microsoft.com/office/drawing/2010/main" xmlns="" w="9525">
                   <a:solidFill>
                     <a:srgbClr val="000000"/>
                   </a:solidFill>
@@ -2467,7 +2467,7 @@
             </a:ln>
             <a:extLst>
               <a:ext uri="{91240B29-F687-4f45-9708-019B960494DF}">
-                <a14:hiddenLine xmlns="" xmlns:a14="http://schemas.microsoft.com/office/drawing/2010/main" w="9525">
+                <a14:hiddenLine xmlns:a14="http://schemas.microsoft.com/office/drawing/2010/main" xmlns="" w="9525">
                   <a:solidFill>
                     <a:srgbClr val="000000"/>
                   </a:solidFill>
@@ -2557,7 +2557,7 @@
             </a:ln>
             <a:extLst>
               <a:ext uri="{91240B29-F687-4f45-9708-019B960494DF}">
-                <a14:hiddenLine xmlns="" xmlns:a14="http://schemas.microsoft.com/office/drawing/2010/main" w="9525">
+                <a14:hiddenLine xmlns:a14="http://schemas.microsoft.com/office/drawing/2010/main" xmlns="" w="9525">
                   <a:solidFill>
                     <a:srgbClr val="000000"/>
                   </a:solidFill>
@@ -2625,7 +2625,7 @@
             </a:ln>
             <a:extLst>
               <a:ext uri="{91240B29-F687-4f45-9708-019B960494DF}">
-                <a14:hiddenLine xmlns="" xmlns:a14="http://schemas.microsoft.com/office/drawing/2010/main" w="9525">
+                <a14:hiddenLine xmlns:a14="http://schemas.microsoft.com/office/drawing/2010/main" xmlns="" w="9525">
                   <a:solidFill>
                     <a:srgbClr val="000000"/>
                   </a:solidFill>
@@ -2715,7 +2715,7 @@
             </a:ln>
             <a:extLst>
               <a:ext uri="{91240B29-F687-4f45-9708-019B960494DF}">
-                <a14:hiddenLine xmlns="" xmlns:a14="http://schemas.microsoft.com/office/drawing/2010/main" w="9525">
+                <a14:hiddenLine xmlns:a14="http://schemas.microsoft.com/office/drawing/2010/main" xmlns="" w="9525">
                   <a:solidFill>
                     <a:srgbClr val="000000"/>
                   </a:solidFill>
@@ -2783,7 +2783,7 @@
             </a:ln>
             <a:extLst>
               <a:ext uri="{91240B29-F687-4f45-9708-019B960494DF}">
-                <a14:hiddenLine xmlns="" xmlns:a14="http://schemas.microsoft.com/office/drawing/2010/main" w="9525">
+                <a14:hiddenLine xmlns:a14="http://schemas.microsoft.com/office/drawing/2010/main" xmlns="" w="9525">
                   <a:solidFill>
                     <a:srgbClr val="000000"/>
                   </a:solidFill>
@@ -2873,7 +2873,7 @@
             </a:ln>
             <a:extLst>
               <a:ext uri="{91240B29-F687-4f45-9708-019B960494DF}">
-                <a14:hiddenLine xmlns="" xmlns:a14="http://schemas.microsoft.com/office/drawing/2010/main" w="9525">
+                <a14:hiddenLine xmlns:a14="http://schemas.microsoft.com/office/drawing/2010/main" xmlns="" w="9525">
                   <a:solidFill>
                     <a:srgbClr val="000000"/>
                   </a:solidFill>
@@ -2907,7 +2907,7 @@
             </a:ln>
             <a:extLst>
               <a:ext uri="{91240B29-F687-4f45-9708-019B960494DF}">
-                <a14:hiddenLine xmlns="" xmlns:a14="http://schemas.microsoft.com/office/drawing/2010/main" w="9525">
+                <a14:hiddenLine xmlns:a14="http://schemas.microsoft.com/office/drawing/2010/main" xmlns="" w="9525">
                   <a:solidFill>
                     <a:srgbClr val="000000"/>
                   </a:solidFill>
@@ -2997,7 +2997,7 @@
             </a:ln>
             <a:extLst>
               <a:ext uri="{91240B29-F687-4f45-9708-019B960494DF}">
-                <a14:hiddenLine xmlns="" xmlns:a14="http://schemas.microsoft.com/office/drawing/2010/main" w="9525">
+                <a14:hiddenLine xmlns:a14="http://schemas.microsoft.com/office/drawing/2010/main" xmlns="" w="9525">
                   <a:solidFill>
                     <a:srgbClr val="000000"/>
                   </a:solidFill>
@@ -3059,7 +3059,7 @@
             </a:ln>
             <a:extLst>
               <a:ext uri="{91240B29-F687-4f45-9708-019B960494DF}">
-                <a14:hiddenLine xmlns="" xmlns:a14="http://schemas.microsoft.com/office/drawing/2010/main" w="9525">
+                <a14:hiddenLine xmlns:a14="http://schemas.microsoft.com/office/drawing/2010/main" xmlns="" w="9525">
                   <a:solidFill>
                     <a:srgbClr val="000000"/>
                   </a:solidFill>
@@ -3121,7 +3121,7 @@
             </a:ln>
             <a:extLst>
               <a:ext uri="{91240B29-F687-4f45-9708-019B960494DF}">
-                <a14:hiddenLine xmlns="" xmlns:a14="http://schemas.microsoft.com/office/drawing/2010/main" w="9525">
+                <a14:hiddenLine xmlns:a14="http://schemas.microsoft.com/office/drawing/2010/main" xmlns="" w="9525">
                   <a:solidFill>
                     <a:srgbClr val="000000"/>
                   </a:solidFill>
@@ -3211,7 +3211,7 @@
             </a:ln>
             <a:extLst>
               <a:ext uri="{91240B29-F687-4f45-9708-019B960494DF}">
-                <a14:hiddenLine xmlns="" xmlns:a14="http://schemas.microsoft.com/office/drawing/2010/main" w="9525">
+                <a14:hiddenLine xmlns:a14="http://schemas.microsoft.com/office/drawing/2010/main" xmlns="" w="9525">
                   <a:solidFill>
                     <a:srgbClr val="000000"/>
                   </a:solidFill>
@@ -3279,7 +3279,7 @@
             </a:ln>
             <a:extLst>
               <a:ext uri="{91240B29-F687-4f45-9708-019B960494DF}">
-                <a14:hiddenLine xmlns="" xmlns:a14="http://schemas.microsoft.com/office/drawing/2010/main" w="9525">
+                <a14:hiddenLine xmlns:a14="http://schemas.microsoft.com/office/drawing/2010/main" xmlns="" w="9525">
                   <a:solidFill>
                     <a:srgbClr val="000000"/>
                   </a:solidFill>
@@ -3341,7 +3341,7 @@
             </a:ln>
             <a:extLst>
               <a:ext uri="{91240B29-F687-4f45-9708-019B960494DF}">
-                <a14:hiddenLine xmlns="" xmlns:a14="http://schemas.microsoft.com/office/drawing/2010/main" w="9525">
+                <a14:hiddenLine xmlns:a14="http://schemas.microsoft.com/office/drawing/2010/main" xmlns="" w="9525">
                   <a:solidFill>
                     <a:srgbClr val="000000"/>
                   </a:solidFill>
@@ -3431,7 +3431,7 @@
             </a:ln>
             <a:extLst>
               <a:ext uri="{91240B29-F687-4f45-9708-019B960494DF}">
-                <a14:hiddenLine xmlns="" xmlns:a14="http://schemas.microsoft.com/office/drawing/2010/main" w="9525">
+                <a14:hiddenLine xmlns:a14="http://schemas.microsoft.com/office/drawing/2010/main" xmlns="" w="9525">
                   <a:solidFill>
                     <a:srgbClr val="000000"/>
                   </a:solidFill>
@@ -3493,7 +3493,7 @@
             </a:ln>
             <a:extLst>
               <a:ext uri="{91240B29-F687-4f45-9708-019B960494DF}">
-                <a14:hiddenLine xmlns="" xmlns:a14="http://schemas.microsoft.com/office/drawing/2010/main" w="9525">
+                <a14:hiddenLine xmlns:a14="http://schemas.microsoft.com/office/drawing/2010/main" xmlns="" w="9525">
                   <a:solidFill>
                     <a:srgbClr val="000000"/>
                   </a:solidFill>
@@ -3583,7 +3583,7 @@
             </a:ln>
             <a:extLst>
               <a:ext uri="{91240B29-F687-4f45-9708-019B960494DF}">
-                <a14:hiddenLine xmlns="" xmlns:a14="http://schemas.microsoft.com/office/drawing/2010/main" w="9525">
+                <a14:hiddenLine xmlns:a14="http://schemas.microsoft.com/office/drawing/2010/main" xmlns="" w="9525">
                   <a:solidFill>
                     <a:srgbClr val="000000"/>
                   </a:solidFill>
@@ -3645,7 +3645,7 @@
             </a:ln>
             <a:extLst>
               <a:ext uri="{91240B29-F687-4f45-9708-019B960494DF}">
-                <a14:hiddenLine xmlns="" xmlns:a14="http://schemas.microsoft.com/office/drawing/2010/main" w="9525">
+                <a14:hiddenLine xmlns:a14="http://schemas.microsoft.com/office/drawing/2010/main" xmlns="" w="9525">
                   <a:solidFill>
                     <a:srgbClr val="000000"/>
                   </a:solidFill>
@@ -3735,7 +3735,7 @@
             </a:ln>
             <a:extLst>
               <a:ext uri="{91240B29-F687-4f45-9708-019B960494DF}">
-                <a14:hiddenLine xmlns="" xmlns:a14="http://schemas.microsoft.com/office/drawing/2010/main" w="9525">
+                <a14:hiddenLine xmlns:a14="http://schemas.microsoft.com/office/drawing/2010/main" xmlns="" w="9525">
                   <a:solidFill>
                     <a:srgbClr val="000000"/>
                   </a:solidFill>
@@ -3769,7 +3769,7 @@
             </a:ln>
             <a:extLst>
               <a:ext uri="{91240B29-F687-4f45-9708-019B960494DF}">
-                <a14:hiddenLine xmlns="" xmlns:a14="http://schemas.microsoft.com/office/drawing/2010/main" w="9525">
+                <a14:hiddenLine xmlns:a14="http://schemas.microsoft.com/office/drawing/2010/main" xmlns="" w="9525">
                   <a:solidFill>
                     <a:srgbClr val="000000"/>
                   </a:solidFill>
@@ -3834,7 +3834,7 @@
             </a:ln>
             <a:extLst>
               <a:ext uri="{91240B29-F687-4f45-9708-019B960494DF}">
-                <a14:hiddenLine xmlns="" xmlns:a14="http://schemas.microsoft.com/office/drawing/2010/main" w="9525">
+                <a14:hiddenLine xmlns:a14="http://schemas.microsoft.com/office/drawing/2010/main" xmlns="" w="9525">
                   <a:solidFill>
                     <a:srgbClr val="000000"/>
                   </a:solidFill>
@@ -3924,7 +3924,7 @@
             </a:ln>
             <a:extLst>
               <a:ext uri="{91240B29-F687-4f45-9708-019B960494DF}">
-                <a14:hiddenLine xmlns="" xmlns:a14="http://schemas.microsoft.com/office/drawing/2010/main" w="9525">
+                <a14:hiddenLine xmlns:a14="http://schemas.microsoft.com/office/drawing/2010/main" xmlns="" w="9525">
                   <a:solidFill>
                     <a:srgbClr val="000000"/>
                   </a:solidFill>
@@ -3986,7 +3986,7 @@
             </a:ln>
             <a:extLst>
               <a:ext uri="{91240B29-F687-4f45-9708-019B960494DF}">
-                <a14:hiddenLine xmlns="" xmlns:a14="http://schemas.microsoft.com/office/drawing/2010/main" w="9525">
+                <a14:hiddenLine xmlns:a14="http://schemas.microsoft.com/office/drawing/2010/main" xmlns="" w="9525">
                   <a:solidFill>
                     <a:srgbClr val="000000"/>
                   </a:solidFill>
@@ -4076,7 +4076,7 @@
             </a:ln>
             <a:extLst>
               <a:ext uri="{91240B29-F687-4f45-9708-019B960494DF}">
-                <a14:hiddenLine xmlns="" xmlns:a14="http://schemas.microsoft.com/office/drawing/2010/main" w="9525">
+                <a14:hiddenLine xmlns:a14="http://schemas.microsoft.com/office/drawing/2010/main" xmlns="" w="9525">
                   <a:solidFill>
                     <a:srgbClr val="000000"/>
                   </a:solidFill>
@@ -4166,7 +4166,7 @@
             </a:ln>
             <a:extLst>
               <a:ext uri="{91240B29-F687-4f45-9708-019B960494DF}">
-                <a14:hiddenLine xmlns="" xmlns:a14="http://schemas.microsoft.com/office/drawing/2010/main" w="9525">
+                <a14:hiddenLine xmlns:a14="http://schemas.microsoft.com/office/drawing/2010/main" xmlns="" w="9525">
                   <a:solidFill>
                     <a:srgbClr val="000000"/>
                   </a:solidFill>
@@ -4231,7 +4231,7 @@
             </a:ln>
             <a:extLst>
               <a:ext uri="{91240B29-F687-4f45-9708-019B960494DF}">
-                <a14:hiddenLine xmlns="" xmlns:a14="http://schemas.microsoft.com/office/drawing/2010/main" w="9525">
+                <a14:hiddenLine xmlns:a14="http://schemas.microsoft.com/office/drawing/2010/main" xmlns="" w="9525">
                   <a:solidFill>
                     <a:srgbClr val="000000"/>
                   </a:solidFill>
@@ -4293,7 +4293,7 @@
             </a:ln>
             <a:extLst>
               <a:ext uri="{91240B29-F687-4f45-9708-019B960494DF}">
-                <a14:hiddenLine xmlns="" xmlns:a14="http://schemas.microsoft.com/office/drawing/2010/main" w="9525">
+                <a14:hiddenLine xmlns:a14="http://schemas.microsoft.com/office/drawing/2010/main" xmlns="" w="9525">
                   <a:solidFill>
                     <a:srgbClr val="000000"/>
                   </a:solidFill>
@@ -4383,7 +4383,7 @@
             </a:ln>
             <a:extLst>
               <a:ext uri="{91240B29-F687-4f45-9708-019B960494DF}">
-                <a14:hiddenLine xmlns="" xmlns:a14="http://schemas.microsoft.com/office/drawing/2010/main" w="9525">
+                <a14:hiddenLine xmlns:a14="http://schemas.microsoft.com/office/drawing/2010/main" xmlns="" w="9525">
                   <a:solidFill>
                     <a:srgbClr val="000000"/>
                   </a:solidFill>
@@ -4473,7 +4473,7 @@
             </a:ln>
             <a:extLst>
               <a:ext uri="{91240B29-F687-4f45-9708-019B960494DF}">
-                <a14:hiddenLine xmlns="" xmlns:a14="http://schemas.microsoft.com/office/drawing/2010/main" w="9525">
+                <a14:hiddenLine xmlns:a14="http://schemas.microsoft.com/office/drawing/2010/main" xmlns="" w="9525">
                   <a:solidFill>
                     <a:srgbClr val="000000"/>
                   </a:solidFill>
@@ -4535,7 +4535,7 @@
             </a:ln>
             <a:extLst>
               <a:ext uri="{91240B29-F687-4f45-9708-019B960494DF}">
-                <a14:hiddenLine xmlns="" xmlns:a14="http://schemas.microsoft.com/office/drawing/2010/main" w="9525">
+                <a14:hiddenLine xmlns:a14="http://schemas.microsoft.com/office/drawing/2010/main" xmlns="" w="9525">
                   <a:solidFill>
                     <a:srgbClr val="000000"/>
                   </a:solidFill>
@@ -4655,7 +4655,7 @@
             </a:ln>
             <a:extLst>
               <a:ext uri="{91240B29-F687-4f45-9708-019B960494DF}">
-                <a14:hiddenLine xmlns="" xmlns:a14="http://schemas.microsoft.com/office/drawing/2010/main" w="9525">
+                <a14:hiddenLine xmlns:a14="http://schemas.microsoft.com/office/drawing/2010/main" xmlns="" w="9525">
                   <a:solidFill>
                     <a:srgbClr val="000000"/>
                   </a:solidFill>
@@ -4723,7 +4723,7 @@
             </a:ln>
             <a:extLst>
               <a:ext uri="{91240B29-F687-4f45-9708-019B960494DF}">
-                <a14:hiddenLine xmlns="" xmlns:a14="http://schemas.microsoft.com/office/drawing/2010/main" w="9525">
+                <a14:hiddenLine xmlns:a14="http://schemas.microsoft.com/office/drawing/2010/main" xmlns="" w="9525">
                   <a:solidFill>
                     <a:srgbClr val="000000"/>
                   </a:solidFill>
@@ -4813,7 +4813,7 @@
             </a:ln>
             <a:extLst>
               <a:ext uri="{91240B29-F687-4f45-9708-019B960494DF}">
-                <a14:hiddenLine xmlns="" xmlns:a14="http://schemas.microsoft.com/office/drawing/2010/main" w="9525">
+                <a14:hiddenLine xmlns:a14="http://schemas.microsoft.com/office/drawing/2010/main" xmlns="" w="9525">
                   <a:solidFill>
                     <a:srgbClr val="000000"/>
                   </a:solidFill>
@@ -4953,7 +4953,7 @@
           <a:p>
             <a:fld id="{402D7A8C-E8C9-C044-B17F-4F3BDC02CA13}" type="datetime1">
               <a:rPr lang="en-US" smtClean="0"/>
-              <a:t>8/20/25</a:t>
+              <a:t>8/25/25</a:t>
             </a:fld>
             <a:endParaRPr lang="en-US"/>
           </a:p>
@@ -5220,7 +5220,7 @@
           <a:p>
             <a:fld id="{37F8A4E9-907E-024F-942D-1027DBDB6B95}" type="datetime1">
               <a:rPr lang="en-US" smtClean="0"/>
-              <a:t>8/20/25</a:t>
+              <a:t>8/25/25</a:t>
             </a:fld>
             <a:endParaRPr lang="en-US"/>
           </a:p>
@@ -5416,7 +5416,7 @@
           <a:p>
             <a:fld id="{0FE75626-F07C-1141-9EC1-D81C02E85261}" type="datetime1">
               <a:rPr lang="en-US" smtClean="0"/>
-              <a:t>8/20/25</a:t>
+              <a:t>8/25/25</a:t>
             </a:fld>
             <a:endParaRPr lang="en-US"/>
           </a:p>
@@ -5679,7 +5679,7 @@
           <a:p>
             <a:fld id="{A542032B-A565-A745-AD03-A3A1AE898D44}" type="datetime1">
               <a:rPr lang="en-US" smtClean="0"/>
-              <a:t>8/20/25</a:t>
+              <a:t>8/25/25</a:t>
             </a:fld>
             <a:endParaRPr lang="en-US"/>
           </a:p>
@@ -6113,7 +6113,7 @@
           <a:p>
             <a:fld id="{D07DFA05-D8BC-F743-AAC8-830078F9EC2E}" type="datetime1">
               <a:rPr lang="en-US" smtClean="0"/>
-              <a:t>8/20/25</a:t>
+              <a:t>8/25/25</a:t>
             </a:fld>
             <a:endParaRPr lang="en-US"/>
           </a:p>
@@ -6659,7 +6659,7 @@
           <a:p>
             <a:fld id="{A30ACE03-F6AA-B648-AEDA-6D288BF5F57D}" type="datetime1">
               <a:rPr lang="en-US" smtClean="0"/>
-              <a:t>8/20/25</a:t>
+              <a:t>8/25/25</a:t>
             </a:fld>
             <a:endParaRPr lang="en-US"/>
           </a:p>
@@ -7379,7 +7379,7 @@
           <a:p>
             <a:fld id="{00CC296A-FFCD-5143-BB88-7498A31860D8}" type="datetime1">
               <a:rPr lang="en-US" smtClean="0"/>
-              <a:t>8/20/25</a:t>
+              <a:t>8/25/25</a:t>
             </a:fld>
             <a:endParaRPr lang="en-US"/>
           </a:p>
@@ -7549,7 +7549,7 @@
           <a:p>
             <a:fld id="{C6A5FF73-2E33-5542-B000-2DC2E7840EBF}" type="datetime1">
               <a:rPr lang="en-US" smtClean="0"/>
-              <a:t>8/20/25</a:t>
+              <a:t>8/25/25</a:t>
             </a:fld>
             <a:endParaRPr lang="en-US"/>
           </a:p>
@@ -7729,7 +7729,7 @@
           <a:p>
             <a:fld id="{02F42606-263B-9C4F-8747-C46201865648}" type="datetime1">
               <a:rPr lang="en-US" smtClean="0"/>
-              <a:t>8/20/25</a:t>
+              <a:t>8/25/25</a:t>
             </a:fld>
             <a:endParaRPr lang="en-US"/>
           </a:p>
@@ -7899,7 +7899,7 @@
           <a:p>
             <a:fld id="{5F8D537B-242B-6E4B-B3AA-5700AD130DAB}" type="datetime1">
               <a:rPr lang="en-US" smtClean="0"/>
-              <a:t>8/20/25</a:t>
+              <a:t>8/25/25</a:t>
             </a:fld>
             <a:endParaRPr lang="en-US"/>
           </a:p>
@@ -8149,7 +8149,7 @@
           <a:p>
             <a:fld id="{7BE0DB53-1439-2E4C-8FEF-8A4982596F3C}" type="datetime1">
               <a:rPr lang="en-US" smtClean="0"/>
-              <a:t>8/20/25</a:t>
+              <a:t>8/25/25</a:t>
             </a:fld>
             <a:endParaRPr lang="en-US"/>
           </a:p>
@@ -8381,7 +8381,7 @@
           <a:p>
             <a:fld id="{DC68B4C4-E214-B54E-A5C2-DF036DC63B34}" type="datetime1">
               <a:rPr lang="en-US" smtClean="0"/>
-              <a:t>8/20/25</a:t>
+              <a:t>8/25/25</a:t>
             </a:fld>
             <a:endParaRPr lang="en-US"/>
           </a:p>
@@ -8767,7 +8767,7 @@
           <a:p>
             <a:fld id="{7FAC456D-E6B2-0642-9BEB-83D0B9BAC47F}" type="datetime1">
               <a:rPr lang="en-US" smtClean="0"/>
-              <a:t>8/20/25</a:t>
+              <a:t>8/25/25</a:t>
             </a:fld>
             <a:endParaRPr lang="en-US"/>
           </a:p>
@@ -8890,7 +8890,7 @@
           <a:p>
             <a:fld id="{16AA1968-45EA-A240-A17F-44B2A8A0BB1D}" type="datetime1">
               <a:rPr lang="en-US" smtClean="0"/>
-              <a:t>8/20/25</a:t>
+              <a:t>8/25/25</a:t>
             </a:fld>
             <a:endParaRPr lang="en-US"/>
           </a:p>
@@ -8985,7 +8985,7 @@
           <a:p>
             <a:fld id="{26CFB313-9C91-AB4A-9BD3-BE60645D454E}" type="datetime1">
               <a:rPr lang="en-US" smtClean="0"/>
-              <a:t>8/20/25</a:t>
+              <a:t>8/25/25</a:t>
             </a:fld>
             <a:endParaRPr lang="en-US"/>
           </a:p>
@@ -9234,7 +9234,7 @@
           <a:p>
             <a:fld id="{400DE57A-C1B2-FD48-B4C3-5BEA75776498}" type="datetime1">
               <a:rPr lang="en-US" smtClean="0"/>
-              <a:t>8/20/25</a:t>
+              <a:t>8/25/25</a:t>
             </a:fld>
             <a:endParaRPr lang="en-US"/>
           </a:p>
@@ -9519,7 +9519,7 @@
           <a:p>
             <a:fld id="{A982DE63-F783-CF4C-A886-D3D65D6D3AA3}" type="datetime1">
               <a:rPr lang="en-US" smtClean="0"/>
-              <a:t>8/20/25</a:t>
+              <a:t>8/25/25</a:t>
             </a:fld>
             <a:endParaRPr lang="en-US"/>
           </a:p>
@@ -9642,7 +9642,7 @@
           <a:noFill/>
           <a:extLst>
             <a:ext uri="{909E8E84-426E-40dd-AFC4-6F175D3DCCD1}">
-              <a14:hiddenFill xmlns="" xmlns:a14="http://schemas.microsoft.com/office/drawing/2010/main">
+              <a14:hiddenFill xmlns:a14="http://schemas.microsoft.com/office/drawing/2010/main" xmlns="">
                 <a:solidFill>
                   <a:srgbClr val="FFFFFF"/>
                 </a:solidFill>
@@ -9716,7 +9716,7 @@
               </a:ln>
               <a:extLst>
                 <a:ext uri="{91240B29-F687-4f45-9708-019B960494DF}">
-                  <a14:hiddenLine xmlns="" xmlns:a14="http://schemas.microsoft.com/office/drawing/2010/main" w="9525">
+                  <a14:hiddenLine xmlns:a14="http://schemas.microsoft.com/office/drawing/2010/main" xmlns="" w="9525">
                     <a:solidFill>
                       <a:srgbClr val="000000"/>
                     </a:solidFill>
@@ -9806,7 +9806,7 @@
               </a:ln>
               <a:extLst>
                 <a:ext uri="{91240B29-F687-4f45-9708-019B960494DF}">
-                  <a14:hiddenLine xmlns="" xmlns:a14="http://schemas.microsoft.com/office/drawing/2010/main" w="9525">
+                  <a14:hiddenLine xmlns:a14="http://schemas.microsoft.com/office/drawing/2010/main" xmlns="" w="9525">
                     <a:solidFill>
                       <a:srgbClr val="000000"/>
                     </a:solidFill>
@@ -9896,7 +9896,7 @@
               </a:ln>
               <a:extLst>
                 <a:ext uri="{91240B29-F687-4f45-9708-019B960494DF}">
-                  <a14:hiddenLine xmlns="" xmlns:a14="http://schemas.microsoft.com/office/drawing/2010/main" w="9525">
+                  <a14:hiddenLine xmlns:a14="http://schemas.microsoft.com/office/drawing/2010/main" xmlns="" w="9525">
                     <a:solidFill>
                       <a:srgbClr val="000000"/>
                     </a:solidFill>
@@ -9958,7 +9958,7 @@
               </a:ln>
               <a:extLst>
                 <a:ext uri="{91240B29-F687-4f45-9708-019B960494DF}">
-                  <a14:hiddenLine xmlns="" xmlns:a14="http://schemas.microsoft.com/office/drawing/2010/main" w="9525">
+                  <a14:hiddenLine xmlns:a14="http://schemas.microsoft.com/office/drawing/2010/main" xmlns="" w="9525">
                     <a:solidFill>
                       <a:srgbClr val="000000"/>
                     </a:solidFill>
@@ -10048,7 +10048,7 @@
               </a:ln>
               <a:extLst>
                 <a:ext uri="{91240B29-F687-4f45-9708-019B960494DF}">
-                  <a14:hiddenLine xmlns="" xmlns:a14="http://schemas.microsoft.com/office/drawing/2010/main" w="9525">
+                  <a14:hiddenLine xmlns:a14="http://schemas.microsoft.com/office/drawing/2010/main" xmlns="" w="9525">
                     <a:solidFill>
                       <a:srgbClr val="000000"/>
                     </a:solidFill>
@@ -10110,7 +10110,7 @@
               </a:ln>
               <a:extLst>
                 <a:ext uri="{91240B29-F687-4f45-9708-019B960494DF}">
-                  <a14:hiddenLine xmlns="" xmlns:a14="http://schemas.microsoft.com/office/drawing/2010/main" w="9525">
+                  <a14:hiddenLine xmlns:a14="http://schemas.microsoft.com/office/drawing/2010/main" xmlns="" w="9525">
                     <a:solidFill>
                       <a:srgbClr val="000000"/>
                     </a:solidFill>
@@ -10172,7 +10172,7 @@
               </a:ln>
               <a:extLst>
                 <a:ext uri="{91240B29-F687-4f45-9708-019B960494DF}">
-                  <a14:hiddenLine xmlns="" xmlns:a14="http://schemas.microsoft.com/office/drawing/2010/main" w="9525">
+                  <a14:hiddenLine xmlns:a14="http://schemas.microsoft.com/office/drawing/2010/main" xmlns="" w="9525">
                     <a:solidFill>
                       <a:srgbClr val="000000"/>
                     </a:solidFill>
@@ -10262,7 +10262,7 @@
               </a:ln>
               <a:extLst>
                 <a:ext uri="{91240B29-F687-4f45-9708-019B960494DF}">
-                  <a14:hiddenLine xmlns="" xmlns:a14="http://schemas.microsoft.com/office/drawing/2010/main" w="9525">
+                  <a14:hiddenLine xmlns:a14="http://schemas.microsoft.com/office/drawing/2010/main" xmlns="" w="9525">
                     <a:solidFill>
                       <a:srgbClr val="000000"/>
                     </a:solidFill>
@@ -10352,7 +10352,7 @@
               </a:ln>
               <a:extLst>
                 <a:ext uri="{91240B29-F687-4f45-9708-019B960494DF}">
-                  <a14:hiddenLine xmlns="" xmlns:a14="http://schemas.microsoft.com/office/drawing/2010/main" w="9525">
+                  <a14:hiddenLine xmlns:a14="http://schemas.microsoft.com/office/drawing/2010/main" xmlns="" w="9525">
                     <a:solidFill>
                       <a:srgbClr val="000000"/>
                     </a:solidFill>
@@ -10414,7 +10414,7 @@
               </a:ln>
               <a:extLst>
                 <a:ext uri="{91240B29-F687-4f45-9708-019B960494DF}">
-                  <a14:hiddenLine xmlns="" xmlns:a14="http://schemas.microsoft.com/office/drawing/2010/main" w="9525">
+                  <a14:hiddenLine xmlns:a14="http://schemas.microsoft.com/office/drawing/2010/main" xmlns="" w="9525">
                     <a:solidFill>
                       <a:srgbClr val="000000"/>
                     </a:solidFill>
@@ -10524,7 +10524,7 @@
               </a:ln>
               <a:extLst>
                 <a:ext uri="{91240B29-F687-4f45-9708-019B960494DF}">
-                  <a14:hiddenLine xmlns="" xmlns:a14="http://schemas.microsoft.com/office/drawing/2010/main" w="9525">
+                  <a14:hiddenLine xmlns:a14="http://schemas.microsoft.com/office/drawing/2010/main" xmlns="" w="9525">
                     <a:solidFill>
                       <a:srgbClr val="000000"/>
                     </a:solidFill>
@@ -10608,7 +10608,7 @@
               </a:ln>
               <a:extLst>
                 <a:ext uri="{91240B29-F687-4f45-9708-019B960494DF}">
-                  <a14:hiddenLine xmlns="" xmlns:a14="http://schemas.microsoft.com/office/drawing/2010/main" w="9525">
+                  <a14:hiddenLine xmlns:a14="http://schemas.microsoft.com/office/drawing/2010/main" xmlns="" w="9525">
                     <a:solidFill>
                       <a:srgbClr val="000000"/>
                     </a:solidFill>
@@ -10670,7 +10670,7 @@
               </a:ln>
               <a:extLst>
                 <a:ext uri="{91240B29-F687-4f45-9708-019B960494DF}">
-                  <a14:hiddenLine xmlns="" xmlns:a14="http://schemas.microsoft.com/office/drawing/2010/main" w="9525">
+                  <a14:hiddenLine xmlns:a14="http://schemas.microsoft.com/office/drawing/2010/main" xmlns="" w="9525">
                     <a:solidFill>
                       <a:srgbClr val="000000"/>
                     </a:solidFill>
@@ -10732,7 +10732,7 @@
               </a:ln>
               <a:extLst>
                 <a:ext uri="{91240B29-F687-4f45-9708-019B960494DF}">
-                  <a14:hiddenLine xmlns="" xmlns:a14="http://schemas.microsoft.com/office/drawing/2010/main" w="9525">
+                  <a14:hiddenLine xmlns:a14="http://schemas.microsoft.com/office/drawing/2010/main" xmlns="" w="9525">
                     <a:solidFill>
                       <a:srgbClr val="000000"/>
                     </a:solidFill>
@@ -10822,7 +10822,7 @@
               </a:ln>
               <a:extLst>
                 <a:ext uri="{91240B29-F687-4f45-9708-019B960494DF}">
-                  <a14:hiddenLine xmlns="" xmlns:a14="http://schemas.microsoft.com/office/drawing/2010/main" w="9525">
+                  <a14:hiddenLine xmlns:a14="http://schemas.microsoft.com/office/drawing/2010/main" xmlns="" w="9525">
                     <a:solidFill>
                       <a:srgbClr val="000000"/>
                     </a:solidFill>
@@ -10856,7 +10856,7 @@
               </a:ln>
               <a:extLst>
                 <a:ext uri="{91240B29-F687-4f45-9708-019B960494DF}">
-                  <a14:hiddenLine xmlns="" xmlns:a14="http://schemas.microsoft.com/office/drawing/2010/main" w="9525">
+                  <a14:hiddenLine xmlns:a14="http://schemas.microsoft.com/office/drawing/2010/main" xmlns="" w="9525">
                     <a:solidFill>
                       <a:srgbClr val="000000"/>
                     </a:solidFill>
@@ -10921,7 +10921,7 @@
               </a:ln>
               <a:extLst>
                 <a:ext uri="{91240B29-F687-4f45-9708-019B960494DF}">
-                  <a14:hiddenLine xmlns="" xmlns:a14="http://schemas.microsoft.com/office/drawing/2010/main" w="9525">
+                  <a14:hiddenLine xmlns:a14="http://schemas.microsoft.com/office/drawing/2010/main" xmlns="" w="9525">
                     <a:solidFill>
                       <a:srgbClr val="000000"/>
                     </a:solidFill>
@@ -11011,7 +11011,7 @@
               </a:ln>
               <a:extLst>
                 <a:ext uri="{91240B29-F687-4f45-9708-019B960494DF}">
-                  <a14:hiddenLine xmlns="" xmlns:a14="http://schemas.microsoft.com/office/drawing/2010/main" w="9525">
+                  <a14:hiddenLine xmlns:a14="http://schemas.microsoft.com/office/drawing/2010/main" xmlns="" w="9525">
                     <a:solidFill>
                       <a:srgbClr val="000000"/>
                     </a:solidFill>
@@ -11073,7 +11073,7 @@
               </a:ln>
               <a:extLst>
                 <a:ext uri="{91240B29-F687-4f45-9708-019B960494DF}">
-                  <a14:hiddenLine xmlns="" xmlns:a14="http://schemas.microsoft.com/office/drawing/2010/main" w="9525">
+                  <a14:hiddenLine xmlns:a14="http://schemas.microsoft.com/office/drawing/2010/main" xmlns="" w="9525">
                     <a:solidFill>
                       <a:srgbClr val="000000"/>
                     </a:solidFill>
@@ -11163,7 +11163,7 @@
               </a:ln>
               <a:extLst>
                 <a:ext uri="{91240B29-F687-4f45-9708-019B960494DF}">
-                  <a14:hiddenLine xmlns="" xmlns:a14="http://schemas.microsoft.com/office/drawing/2010/main" w="9525">
+                  <a14:hiddenLine xmlns:a14="http://schemas.microsoft.com/office/drawing/2010/main" xmlns="" w="9525">
                     <a:solidFill>
                       <a:srgbClr val="000000"/>
                     </a:solidFill>
@@ -11228,7 +11228,7 @@
               </a:ln>
               <a:extLst>
                 <a:ext uri="{91240B29-F687-4f45-9708-019B960494DF}">
-                  <a14:hiddenLine xmlns="" xmlns:a14="http://schemas.microsoft.com/office/drawing/2010/main" w="9525">
+                  <a14:hiddenLine xmlns:a14="http://schemas.microsoft.com/office/drawing/2010/main" xmlns="" w="9525">
                     <a:solidFill>
                       <a:srgbClr val="000000"/>
                     </a:solidFill>
@@ -11290,7 +11290,7 @@
               </a:ln>
               <a:extLst>
                 <a:ext uri="{91240B29-F687-4f45-9708-019B960494DF}">
-                  <a14:hiddenLine xmlns="" xmlns:a14="http://schemas.microsoft.com/office/drawing/2010/main" w="9525">
+                  <a14:hiddenLine xmlns:a14="http://schemas.microsoft.com/office/drawing/2010/main" xmlns="" w="9525">
                     <a:solidFill>
                       <a:srgbClr val="000000"/>
                     </a:solidFill>
@@ -11380,7 +11380,7 @@
               </a:ln>
               <a:extLst>
                 <a:ext uri="{91240B29-F687-4f45-9708-019B960494DF}">
-                  <a14:hiddenLine xmlns="" xmlns:a14="http://schemas.microsoft.com/office/drawing/2010/main" w="9525">
+                  <a14:hiddenLine xmlns:a14="http://schemas.microsoft.com/office/drawing/2010/main" xmlns="" w="9525">
                     <a:solidFill>
                       <a:srgbClr val="000000"/>
                     </a:solidFill>
@@ -11470,7 +11470,7 @@
               </a:ln>
               <a:extLst>
                 <a:ext uri="{91240B29-F687-4f45-9708-019B960494DF}">
-                  <a14:hiddenLine xmlns="" xmlns:a14="http://schemas.microsoft.com/office/drawing/2010/main" w="9525">
+                  <a14:hiddenLine xmlns:a14="http://schemas.microsoft.com/office/drawing/2010/main" xmlns="" w="9525">
                     <a:solidFill>
                       <a:srgbClr val="000000"/>
                     </a:solidFill>
@@ -11535,7 +11535,7 @@
               </a:ln>
               <a:extLst>
                 <a:ext uri="{91240B29-F687-4f45-9708-019B960494DF}">
-                  <a14:hiddenLine xmlns="" xmlns:a14="http://schemas.microsoft.com/office/drawing/2010/main" w="9525">
+                  <a14:hiddenLine xmlns:a14="http://schemas.microsoft.com/office/drawing/2010/main" xmlns="" w="9525">
                     <a:solidFill>
                       <a:srgbClr val="000000"/>
                     </a:solidFill>
@@ -11655,7 +11655,7 @@
               </a:ln>
               <a:extLst>
                 <a:ext uri="{91240B29-F687-4f45-9708-019B960494DF}">
-                  <a14:hiddenLine xmlns="" xmlns:a14="http://schemas.microsoft.com/office/drawing/2010/main" w="9525">
+                  <a14:hiddenLine xmlns:a14="http://schemas.microsoft.com/office/drawing/2010/main" xmlns="" w="9525">
                     <a:solidFill>
                       <a:srgbClr val="000000"/>
                     </a:solidFill>
@@ -11736,7 +11736,7 @@
               </a:ln>
               <a:extLst>
                 <a:ext uri="{91240B29-F687-4f45-9708-019B960494DF}">
-                  <a14:hiddenLine xmlns="" xmlns:a14="http://schemas.microsoft.com/office/drawing/2010/main" w="9525">
+                  <a14:hiddenLine xmlns:a14="http://schemas.microsoft.com/office/drawing/2010/main" xmlns="" w="9525">
                     <a:solidFill>
                       <a:srgbClr val="000000"/>
                     </a:solidFill>
@@ -11851,7 +11851,7 @@
               </a:ln>
               <a:extLst>
                 <a:ext uri="{91240B29-F687-4f45-9708-019B960494DF}">
-                  <a14:hiddenLine xmlns="" xmlns:a14="http://schemas.microsoft.com/office/drawing/2010/main" w="9525">
+                  <a14:hiddenLine xmlns:a14="http://schemas.microsoft.com/office/drawing/2010/main" xmlns="" w="9525">
                     <a:solidFill>
                       <a:srgbClr val="000000"/>
                     </a:solidFill>
@@ -11941,7 +11941,7 @@
               </a:ln>
               <a:extLst>
                 <a:ext uri="{91240B29-F687-4f45-9708-019B960494DF}">
-                  <a14:hiddenLine xmlns="" xmlns:a14="http://schemas.microsoft.com/office/drawing/2010/main" w="9525">
+                  <a14:hiddenLine xmlns:a14="http://schemas.microsoft.com/office/drawing/2010/main" xmlns="" w="9525">
                     <a:solidFill>
                       <a:srgbClr val="000000"/>
                     </a:solidFill>
@@ -12006,7 +12006,7 @@
               </a:ln>
               <a:extLst>
                 <a:ext uri="{91240B29-F687-4f45-9708-019B960494DF}">
-                  <a14:hiddenLine xmlns="" xmlns:a14="http://schemas.microsoft.com/office/drawing/2010/main" w="9525">
+                  <a14:hiddenLine xmlns:a14="http://schemas.microsoft.com/office/drawing/2010/main" xmlns="" w="9525">
                     <a:solidFill>
                       <a:srgbClr val="000000"/>
                     </a:solidFill>
@@ -12096,7 +12096,7 @@
               </a:ln>
               <a:extLst>
                 <a:ext uri="{91240B29-F687-4f45-9708-019B960494DF}">
-                  <a14:hiddenLine xmlns="" xmlns:a14="http://schemas.microsoft.com/office/drawing/2010/main" w="9525">
+                  <a14:hiddenLine xmlns:a14="http://schemas.microsoft.com/office/drawing/2010/main" xmlns="" w="9525">
                     <a:solidFill>
                       <a:srgbClr val="000000"/>
                     </a:solidFill>
@@ -12164,7 +12164,7 @@
               </a:ln>
               <a:extLst>
                 <a:ext uri="{91240B29-F687-4f45-9708-019B960494DF}">
-                  <a14:hiddenLine xmlns="" xmlns:a14="http://schemas.microsoft.com/office/drawing/2010/main" w="9525">
+                  <a14:hiddenLine xmlns:a14="http://schemas.microsoft.com/office/drawing/2010/main" xmlns="" w="9525">
                     <a:solidFill>
                       <a:srgbClr val="000000"/>
                     </a:solidFill>
@@ -12254,7 +12254,7 @@
               </a:ln>
               <a:extLst>
                 <a:ext uri="{91240B29-F687-4f45-9708-019B960494DF}">
-                  <a14:hiddenLine xmlns="" xmlns:a14="http://schemas.microsoft.com/office/drawing/2010/main" w="9525">
+                  <a14:hiddenLine xmlns:a14="http://schemas.microsoft.com/office/drawing/2010/main" xmlns="" w="9525">
                     <a:solidFill>
                       <a:srgbClr val="000000"/>
                     </a:solidFill>
@@ -12322,7 +12322,7 @@
               </a:ln>
               <a:extLst>
                 <a:ext uri="{91240B29-F687-4f45-9708-019B960494DF}">
-                  <a14:hiddenLine xmlns="" xmlns:a14="http://schemas.microsoft.com/office/drawing/2010/main" w="9525">
+                  <a14:hiddenLine xmlns:a14="http://schemas.microsoft.com/office/drawing/2010/main" xmlns="" w="9525">
                     <a:solidFill>
                       <a:srgbClr val="000000"/>
                     </a:solidFill>
@@ -12412,7 +12412,7 @@
               </a:ln>
               <a:extLst>
                 <a:ext uri="{91240B29-F687-4f45-9708-019B960494DF}">
-                  <a14:hiddenLine xmlns="" xmlns:a14="http://schemas.microsoft.com/office/drawing/2010/main" w="9525">
+                  <a14:hiddenLine xmlns:a14="http://schemas.microsoft.com/office/drawing/2010/main" xmlns="" w="9525">
                     <a:solidFill>
                       <a:srgbClr val="000000"/>
                     </a:solidFill>
@@ -12446,7 +12446,7 @@
               </a:ln>
               <a:extLst>
                 <a:ext uri="{91240B29-F687-4f45-9708-019B960494DF}">
-                  <a14:hiddenLine xmlns="" xmlns:a14="http://schemas.microsoft.com/office/drawing/2010/main" w="9525">
+                  <a14:hiddenLine xmlns:a14="http://schemas.microsoft.com/office/drawing/2010/main" xmlns="" w="9525">
                     <a:solidFill>
                       <a:srgbClr val="000000"/>
                     </a:solidFill>
@@ -12586,7 +12586,7 @@
           <a:p>
             <a:fld id="{59173DD1-A275-4445-AB1E-9DFF752BE39B}" type="datetime1">
               <a:rPr lang="en-US" smtClean="0"/>
-              <a:t>8/20/25</a:t>
+              <a:t>8/25/25</a:t>
             </a:fld>
             <a:endParaRPr lang="en-US"/>
           </a:p>
@@ -15340,14 +15340,14 @@
             <a:pPr lvl="1"/>
             <a:r>
               <a:rPr lang="en-US" dirty="0"/>
-              <a:t>Anyone can fill out an online form to request a 7 day extension. Extensions will be granted for any reason as long as you articulate why you need extra time and when you plan to finish the homework by.</a:t>
+              <a:t>Anyone can fill out an online form to request a 5 day extension. Extensions will be granted for any reason as long as you articulate why you need extra time and when you plan to finish the homework by.</a:t>
             </a:r>
           </a:p>
           <a:p>
             <a:pPr lvl="1"/>
             <a:r>
               <a:rPr lang="en-US" dirty="0"/>
-              <a:t>NO submissions beyond this already generous 7 day window for any reason. That window IS your flexibility should anything arise.</a:t>
+              <a:t>NO submissions beyond this already generous 5 day window for any reason. That window IS your flexibility should anything arise.</a:t>
             </a:r>
           </a:p>
           <a:p>
@@ -17112,14 +17112,22 @@
             <a:pPr lvl="2"/>
             <a:r>
               <a:rPr lang="en-US" dirty="0"/>
-              <a:t>TBD</a:t>
+              <a:t>Chase </a:t>
+            </a:r>
+            <a:r>
+              <a:rPr lang="en-US" dirty="0" err="1"/>
+              <a:t>Fickles</a:t>
+            </a:r>
+            <a:r>
+              <a:rPr lang="en-US" dirty="0"/>
+              <a:t> (See course website for contact info)</a:t>
             </a:r>
           </a:p>
           <a:p>
             <a:pPr lvl="1"/>
             <a:r>
               <a:rPr lang="en-US" dirty="0"/>
-              <a:t>Undergraduates (~27)</a:t>
+              <a:t>Undergraduates (~17)</a:t>
             </a:r>
           </a:p>
           <a:p>

</xml_diff>